<commit_message>
Se corrige requerimientos y casos de uso-1.9
</commit_message>
<xml_diff>
--- a/Presentación - Proyecto.pptx
+++ b/Presentación - Proyecto.pptx
@@ -5,10 +5,10 @@
     <p:sldMasterId id="2147483648" r:id="rId1"/>
   </p:sldMasterIdLst>
   <p:notesMasterIdLst>
-    <p:notesMasterId r:id="rId31"/>
+    <p:notesMasterId r:id="rId30"/>
   </p:notesMasterIdLst>
   <p:handoutMasterIdLst>
-    <p:handoutMasterId r:id="rId32"/>
+    <p:handoutMasterId r:id="rId31"/>
   </p:handoutMasterIdLst>
   <p:sldIdLst>
     <p:sldId id="323" r:id="rId2"/>
@@ -28,18 +28,17 @@
     <p:sldId id="349" r:id="rId16"/>
     <p:sldId id="350" r:id="rId17"/>
     <p:sldId id="336" r:id="rId18"/>
-    <p:sldId id="352" r:id="rId19"/>
-    <p:sldId id="353" r:id="rId20"/>
-    <p:sldId id="354" r:id="rId21"/>
-    <p:sldId id="355" r:id="rId22"/>
-    <p:sldId id="359" r:id="rId23"/>
-    <p:sldId id="360" r:id="rId24"/>
-    <p:sldId id="356" r:id="rId25"/>
-    <p:sldId id="357" r:id="rId26"/>
-    <p:sldId id="361" r:id="rId27"/>
-    <p:sldId id="358" r:id="rId28"/>
-    <p:sldId id="362" r:id="rId29"/>
-    <p:sldId id="335" r:id="rId30"/>
+    <p:sldId id="353" r:id="rId19"/>
+    <p:sldId id="354" r:id="rId20"/>
+    <p:sldId id="355" r:id="rId21"/>
+    <p:sldId id="359" r:id="rId22"/>
+    <p:sldId id="360" r:id="rId23"/>
+    <p:sldId id="356" r:id="rId24"/>
+    <p:sldId id="357" r:id="rId25"/>
+    <p:sldId id="361" r:id="rId26"/>
+    <p:sldId id="358" r:id="rId27"/>
+    <p:sldId id="362" r:id="rId28"/>
+    <p:sldId id="335" r:id="rId29"/>
   </p:sldIdLst>
   <p:sldSz cx="9144000" cy="6858000" type="screen4x3"/>
   <p:notesSz cx="6858000" cy="9144000"/>
@@ -253,7 +252,7 @@
           <a:p>
             <a:fld id="{4E4206E0-8F38-491F-8DD8-9DEF31DAB11E}" type="datetimeFigureOut">
               <a:rPr lang="es-CO" smtClean="0"/>
-              <a:t>3/07/2019</a:t>
+              <a:t>5/07/2019</a:t>
             </a:fld>
             <a:endParaRPr lang="es-CO"/>
           </a:p>
@@ -418,7 +417,7 @@
           <a:p>
             <a:fld id="{AE7E15B5-955E-4B5B-9E1F-B3C4B4C6AE0C}" type="datetimeFigureOut">
               <a:rPr lang="es-CO" smtClean="0"/>
-              <a:t>3/07/2019</a:t>
+              <a:t>5/07/2019</a:t>
             </a:fld>
             <a:endParaRPr lang="es-CO"/>
           </a:p>
@@ -759,7 +758,7 @@
           <a:p>
             <a:fld id="{483D03DC-5ED8-7A42-A55E-C10C004AFC42}" type="datetimeFigureOut">
               <a:rPr lang="es-ES" smtClean="0"/>
-              <a:t>03/07/2019</a:t>
+              <a:t>05/07/2019</a:t>
             </a:fld>
             <a:endParaRPr lang="es-ES"/>
           </a:p>
@@ -1428,7 +1427,7 @@
           <a:p>
             <a:fld id="{483D03DC-5ED8-7A42-A55E-C10C004AFC42}" type="datetimeFigureOut">
               <a:rPr lang="es-ES" smtClean="0"/>
-              <a:t>03/07/2019</a:t>
+              <a:t>05/07/2019</a:t>
             </a:fld>
             <a:endParaRPr lang="es-ES" dirty="0"/>
           </a:p>
@@ -1587,7 +1586,7 @@
           <a:p>
             <a:fld id="{483D03DC-5ED8-7A42-A55E-C10C004AFC42}" type="datetimeFigureOut">
               <a:rPr lang="es-ES" smtClean="0"/>
-              <a:t>03/07/2019</a:t>
+              <a:t>05/07/2019</a:t>
             </a:fld>
             <a:endParaRPr lang="es-ES"/>
           </a:p>
@@ -2117,7 +2116,7 @@
           <a:p>
             <a:fld id="{483D03DC-5ED8-7A42-A55E-C10C004AFC42}" type="datetimeFigureOut">
               <a:rPr lang="es-ES" smtClean="0"/>
-              <a:t>03/07/2019</a:t>
+              <a:t>05/07/2019</a:t>
             </a:fld>
             <a:endParaRPr lang="es-ES"/>
           </a:p>
@@ -2650,7 +2649,7 @@
           <a:p>
             <a:fld id="{483D03DC-5ED8-7A42-A55E-C10C004AFC42}" type="datetimeFigureOut">
               <a:rPr lang="es-ES" smtClean="0"/>
-              <a:t>03/07/2019</a:t>
+              <a:t>05/07/2019</a:t>
             </a:fld>
             <a:endParaRPr lang="es-ES"/>
           </a:p>
@@ -2880,7 +2879,7 @@
           <a:p>
             <a:fld id="{483D03DC-5ED8-7A42-A55E-C10C004AFC42}" type="datetimeFigureOut">
               <a:rPr lang="es-ES" smtClean="0"/>
-              <a:t>03/07/2019</a:t>
+              <a:t>05/07/2019</a:t>
             </a:fld>
             <a:endParaRPr lang="es-ES"/>
           </a:p>
@@ -3558,7 +3557,7 @@
           <a:p>
             <a:fld id="{483D03DC-5ED8-7A42-A55E-C10C004AFC42}" type="datetimeFigureOut">
               <a:rPr lang="es-ES" smtClean="0"/>
-              <a:t>03/07/2019</a:t>
+              <a:t>05/07/2019</a:t>
             </a:fld>
             <a:endParaRPr lang="es-ES" dirty="0"/>
           </a:p>
@@ -3653,7 +3652,7 @@
           <a:p>
             <a:fld id="{483D03DC-5ED8-7A42-A55E-C10C004AFC42}" type="datetimeFigureOut">
               <a:rPr lang="es-ES" smtClean="0"/>
-              <a:t>03/07/2019</a:t>
+              <a:t>05/07/2019</a:t>
             </a:fld>
             <a:endParaRPr lang="es-ES"/>
           </a:p>
@@ -4198,7 +4197,7 @@
           <a:p>
             <a:fld id="{483D03DC-5ED8-7A42-A55E-C10C004AFC42}" type="datetimeFigureOut">
               <a:rPr lang="es-ES" smtClean="0"/>
-              <a:t>03/07/2019</a:t>
+              <a:t>05/07/2019</a:t>
             </a:fld>
             <a:endParaRPr lang="es-ES"/>
           </a:p>
@@ -5115,7 +5114,7 @@
           <a:p>
             <a:fld id="{483D03DC-5ED8-7A42-A55E-C10C004AFC42}" type="datetimeFigureOut">
               <a:rPr lang="es-ES" smtClean="0"/>
-              <a:t>03/07/2019</a:t>
+              <a:t>05/07/2019</a:t>
             </a:fld>
             <a:endParaRPr lang="es-ES" dirty="0"/>
           </a:p>
@@ -5274,7 +5273,7 @@
           <a:p>
             <a:fld id="{483D03DC-5ED8-7A42-A55E-C10C004AFC42}" type="datetimeFigureOut">
               <a:rPr lang="es-ES" smtClean="0"/>
-              <a:t>03/07/2019</a:t>
+              <a:t>05/07/2019</a:t>
             </a:fld>
             <a:endParaRPr lang="es-ES"/>
           </a:p>
@@ -5804,7 +5803,7 @@
           <a:p>
             <a:fld id="{483D03DC-5ED8-7A42-A55E-C10C004AFC42}" type="datetimeFigureOut">
               <a:rPr lang="es-ES" smtClean="0"/>
-              <a:t>03/07/2019</a:t>
+              <a:t>05/07/2019</a:t>
             </a:fld>
             <a:endParaRPr lang="es-ES"/>
           </a:p>
@@ -6363,7 +6362,7 @@
           <a:p>
             <a:fld id="{483D03DC-5ED8-7A42-A55E-C10C004AFC42}" type="datetimeFigureOut">
               <a:rPr lang="es-ES" smtClean="0"/>
-              <a:t>03/07/2019</a:t>
+              <a:t>05/07/2019</a:t>
             </a:fld>
             <a:endParaRPr lang="es-ES"/>
           </a:p>
@@ -6820,7 +6819,25 @@
                 </a:solidFill>
                 <a:latin typeface="Arial Narrow" panose="020B0606020202030204" pitchFamily="34" charset="0"/>
               </a:rPr>
-              <a:t>CENTRO DE ELECTRICIDAD, ELECTRÓNICA Y TELECOMUNICACIONES</a:t>
+              <a:t>CENTRO </a:t>
+            </a:r>
+            <a:r>
+              <a:rPr lang="es-ES" sz="2400" b="1" dirty="0" smtClean="0">
+                <a:solidFill>
+                  <a:schemeClr val="bg1"/>
+                </a:solidFill>
+                <a:latin typeface="Arial Narrow" panose="020B0606020202030204" pitchFamily="34" charset="0"/>
+              </a:rPr>
+              <a:t>DE ELECTRICIDAD, </a:t>
+            </a:r>
+            <a:r>
+              <a:rPr lang="es-ES" sz="2400" b="1" dirty="0">
+                <a:solidFill>
+                  <a:schemeClr val="bg1"/>
+                </a:solidFill>
+                <a:latin typeface="Arial Narrow" panose="020B0606020202030204" pitchFamily="34" charset="0"/>
+              </a:rPr>
+              <a:t>ELECTRÓNICA Y TELECOMUNICACIONES</a:t>
             </a:r>
           </a:p>
         </p:txBody>
@@ -8501,7 +8518,7 @@
           <p:nvPr>
             <p:extLst>
               <p:ext uri="{D42A27DB-BD31-4B8C-83A1-F6EECF244321}">
-                <p14:modId xmlns:p14="http://schemas.microsoft.com/office/powerpoint/2010/main" val="3266604649"/>
+                <p14:modId xmlns:p14="http://schemas.microsoft.com/office/powerpoint/2010/main" val="448673931"/>
               </p:ext>
             </p:extLst>
           </p:nvPr>
@@ -8639,12 +8656,12 @@
                         </a:spcAft>
                       </a:pPr>
                       <a:r>
-                        <a:rPr lang="es-ES_tradnl" sz="1000">
-                          <a:effectLst/>
-                        </a:rPr>
-                        <a:t>Crear Producto.</a:t>
-                      </a:r>
-                      <a:endParaRPr lang="es-AR" sz="1100">
+                        <a:rPr lang="es-ES_tradnl" sz="1000" dirty="0" smtClean="0">
+                          <a:effectLst/>
+                        </a:rPr>
+                        <a:t>Gestionar productos</a:t>
+                      </a:r>
+                      <a:endParaRPr lang="es-AR" sz="1100" dirty="0">
                         <a:effectLst/>
                         <a:latin typeface="Calibri" panose="020F0502020204030204" pitchFamily="34" charset="0"/>
                         <a:ea typeface="Calibri" panose="020F0502020204030204" pitchFamily="34" charset="0"/>
@@ -9141,36 +9158,36 @@
           <p:nvPr>
             <p:extLst>
               <p:ext uri="{D42A27DB-BD31-4B8C-83A1-F6EECF244321}">
-                <p14:modId xmlns:p14="http://schemas.microsoft.com/office/powerpoint/2010/main" val="936973551"/>
+                <p14:modId xmlns:p14="http://schemas.microsoft.com/office/powerpoint/2010/main" val="4062411383"/>
               </p:ext>
             </p:extLst>
           </p:nvPr>
         </p:nvGraphicFramePr>
         <p:xfrm>
-          <a:off x="609600" y="1875084"/>
-          <a:ext cx="8100985" cy="4693882"/>
+          <a:off x="1187669" y="1844181"/>
+          <a:ext cx="7346731" cy="4913414"/>
         </p:xfrm>
         <a:graphic>
           <a:graphicData uri="http://schemas.openxmlformats.org/drawingml/2006/table">
             <a:tbl>
               <a:tblPr firstRow="1" firstCol="1" bandRow="1"/>
               <a:tblGrid>
-                <a:gridCol w="1828439">
+                <a:gridCol w="1658200">
                   <a:extLst>
                     <a:ext uri="{9D8B030D-6E8A-4147-A177-3AD203B41FA5}">
-                      <a16:colId xmlns:a16="http://schemas.microsoft.com/office/drawing/2014/main" val="2650950600"/>
+                      <a16:colId xmlns:a16="http://schemas.microsoft.com/office/drawing/2014/main" val="3352072748"/>
                     </a:ext>
                   </a:extLst>
                 </a:gridCol>
-                <a:gridCol w="6272546">
+                <a:gridCol w="5688531">
                   <a:extLst>
                     <a:ext uri="{9D8B030D-6E8A-4147-A177-3AD203B41FA5}">
-                      <a16:colId xmlns:a16="http://schemas.microsoft.com/office/drawing/2014/main" val="2430988303"/>
+                      <a16:colId xmlns:a16="http://schemas.microsoft.com/office/drawing/2014/main" val="1728892642"/>
                     </a:ext>
                   </a:extLst>
                 </a:gridCol>
               </a:tblGrid>
-              <a:tr h="586736">
+              <a:tr h="755328">
                 <a:tc>
                   <a:txBody>
                     <a:bodyPr/>
@@ -9217,7 +9234,7 @@
                         <a:rPr lang="es-ES_tradnl" sz="1000">
                           <a:effectLst/>
                         </a:rPr>
-                        <a:t>RF03</a:t>
+                        <a:t>RF04</a:t>
                       </a:r>
                       <a:endParaRPr lang="es-AR" sz="1100">
                         <a:effectLst/>
@@ -9231,11 +9248,11 @@
                 </a:tc>
                 <a:extLst>
                   <a:ext uri="{0D108BD9-81ED-4DB2-BD59-A6C34878D82A}">
-                    <a16:rowId xmlns:a16="http://schemas.microsoft.com/office/drawing/2014/main" val="2789334805"/>
+                    <a16:rowId xmlns:a16="http://schemas.microsoft.com/office/drawing/2014/main" val="3143357126"/>
                   </a:ext>
                 </a:extLst>
               </a:tr>
-              <a:tr h="586736">
+              <a:tr h="574765">
                 <a:tc>
                   <a:txBody>
                     <a:bodyPr/>
@@ -9279,12 +9296,24 @@
                         </a:spcAft>
                       </a:pPr>
                       <a:r>
-                        <a:rPr lang="es-ES_tradnl" sz="1000">
-                          <a:effectLst/>
-                        </a:rPr>
-                        <a:t>Consultar producto.</a:t>
-                      </a:r>
-                      <a:endParaRPr lang="es-AR" sz="1100">
+                        <a:rPr lang="es-ES_tradnl" sz="1000" dirty="0" smtClean="0">
+                          <a:effectLst/>
+                          <a:latin typeface="+mn-lt"/>
+                          <a:ea typeface="+mn-ea"/>
+                          <a:cs typeface="+mn-cs"/>
+                        </a:rPr>
+                        <a:t>Gestionar</a:t>
+                      </a:r>
+                      <a:r>
+                        <a:rPr lang="es-ES_tradnl" sz="1000" baseline="0" dirty="0" smtClean="0">
+                          <a:effectLst/>
+                          <a:latin typeface="+mn-lt"/>
+                          <a:ea typeface="+mn-ea"/>
+                          <a:cs typeface="+mn-cs"/>
+                        </a:rPr>
+                        <a:t> usuarios.</a:t>
+                      </a:r>
+                      <a:endParaRPr lang="es-AR" sz="1100" dirty="0">
                         <a:effectLst/>
                         <a:latin typeface="Calibri" panose="020F0502020204030204" pitchFamily="34" charset="0"/>
                         <a:ea typeface="Calibri" panose="020F0502020204030204" pitchFamily="34" charset="0"/>
@@ -9296,11 +9325,11 @@
                 </a:tc>
                 <a:extLst>
                   <a:ext uri="{0D108BD9-81ED-4DB2-BD59-A6C34878D82A}">
-                    <a16:rowId xmlns:a16="http://schemas.microsoft.com/office/drawing/2014/main" val="1411983814"/>
+                    <a16:rowId xmlns:a16="http://schemas.microsoft.com/office/drawing/2014/main" val="3453327573"/>
                   </a:ext>
                 </a:extLst>
               </a:tr>
-              <a:tr h="293367">
+              <a:tr h="646931">
                 <a:tc>
                   <a:txBody>
                     <a:bodyPr/>
@@ -9315,12 +9344,18 @@
                         </a:spcAft>
                       </a:pPr>
                       <a:r>
-                        <a:rPr lang="es-ES_tradnl" sz="1000" kern="1200">
-                          <a:effectLst/>
-                        </a:rPr>
-                        <a:t>Características: </a:t>
-                      </a:r>
-                      <a:endParaRPr lang="es-AR" sz="1100">
+                        <a:rPr lang="es-ES_tradnl" sz="1000" kern="1200" dirty="0" smtClean="0">
+                          <a:effectLst/>
+                        </a:rPr>
+                        <a:t>Características</a:t>
+                      </a:r>
+                      <a:r>
+                        <a:rPr lang="es-ES_tradnl" sz="1000" kern="1200" dirty="0">
+                          <a:effectLst/>
+                        </a:rPr>
+                        <a:t>: </a:t>
+                      </a:r>
+                      <a:endParaRPr lang="es-AR" sz="1100" dirty="0">
                         <a:effectLst/>
                         <a:latin typeface="Calibri" panose="020F0502020204030204" pitchFamily="34" charset="0"/>
                         <a:ea typeface="Calibri" panose="020F0502020204030204" pitchFamily="34" charset="0"/>
@@ -9344,12 +9379,36 @@
                         </a:spcAft>
                       </a:pPr>
                       <a:r>
-                        <a:rPr lang="es-ES_tradnl" sz="1000">
-                          <a:effectLst/>
-                        </a:rPr>
-                        <a:t>Permite gestionar información referente al producto.</a:t>
-                      </a:r>
-                      <a:endParaRPr lang="es-AR" sz="1100">
+                        <a:rPr lang="es-ES_tradnl" sz="1000" dirty="0">
+                          <a:effectLst/>
+                        </a:rPr>
+                        <a:t>El sistema permitirá al </a:t>
+                      </a:r>
+                      <a:r>
+                        <a:rPr lang="es-ES_tradnl" sz="1000" dirty="0" smtClean="0">
+                          <a:effectLst/>
+                        </a:rPr>
+                        <a:t>administrador modificar </a:t>
+                      </a:r>
+                      <a:r>
+                        <a:rPr lang="es-ES_tradnl" sz="1000" dirty="0">
+                          <a:effectLst/>
+                        </a:rPr>
+                        <a:t>los datos de los </a:t>
+                      </a:r>
+                      <a:r>
+                        <a:rPr lang="es-ES_tradnl" sz="1000" dirty="0" smtClean="0">
+                          <a:effectLst/>
+                        </a:rPr>
+                        <a:t>usuarios </a:t>
+                      </a:r>
+                      <a:r>
+                        <a:rPr lang="es-ES_tradnl" sz="1000" dirty="0">
+                          <a:effectLst/>
+                        </a:rPr>
+                        <a:t>registrados.</a:t>
+                      </a:r>
+                      <a:endParaRPr lang="es-AR" sz="1100" dirty="0">
                         <a:effectLst/>
                         <a:latin typeface="Calibri" panose="020F0502020204030204" pitchFamily="34" charset="0"/>
                         <a:ea typeface="Calibri" panose="020F0502020204030204" pitchFamily="34" charset="0"/>
@@ -9361,11 +9420,11 @@
                 </a:tc>
                 <a:extLst>
                   <a:ext uri="{0D108BD9-81ED-4DB2-BD59-A6C34878D82A}">
-                    <a16:rowId xmlns:a16="http://schemas.microsoft.com/office/drawing/2014/main" val="330170132"/>
+                    <a16:rowId xmlns:a16="http://schemas.microsoft.com/office/drawing/2014/main" val="2929380274"/>
                   </a:ext>
                 </a:extLst>
               </a:tr>
-              <a:tr h="880102">
+              <a:tr h="646931">
                 <a:tc>
                   <a:txBody>
                     <a:bodyPr/>
@@ -9412,7 +9471,19 @@
                         <a:rPr lang="es-ES_tradnl" sz="1000" dirty="0">
                           <a:effectLst/>
                         </a:rPr>
-                        <a:t>Consultar producto: El usuario podrá consultar información detallada acerca de un producto específico mediante una sección del sistema que mostrará esos detalles.</a:t>
+                        <a:t>Actualizar: Permite al usuario actualizar datos de los elementos registrados en el </a:t>
+                      </a:r>
+                      <a:r>
+                        <a:rPr lang="es-ES_tradnl" sz="1000" dirty="0" smtClean="0">
+                          <a:effectLst/>
+                        </a:rPr>
+                        <a:t>sistema</a:t>
+                      </a:r>
+                      <a:r>
+                        <a:rPr lang="es-ES_tradnl" sz="1000" baseline="0" dirty="0" smtClean="0">
+                          <a:effectLst/>
+                        </a:rPr>
+                        <a:t> reemplazando los viejos datos con los nuevos ingresados.</a:t>
                       </a:r>
                       <a:endParaRPr lang="es-AR" sz="1100" dirty="0">
                         <a:effectLst/>
@@ -9426,11 +9497,11 @@
                 </a:tc>
                 <a:extLst>
                   <a:ext uri="{0D108BD9-81ED-4DB2-BD59-A6C34878D82A}">
-                    <a16:rowId xmlns:a16="http://schemas.microsoft.com/office/drawing/2014/main" val="1268440376"/>
+                    <a16:rowId xmlns:a16="http://schemas.microsoft.com/office/drawing/2014/main" val="70470551"/>
                   </a:ext>
                 </a:extLst>
               </a:tr>
-              <a:tr h="1760205">
+              <a:tr h="1642528">
                 <a:tc>
                   <a:txBody>
                     <a:bodyPr/>
@@ -9445,12 +9516,12 @@
                         </a:spcAft>
                       </a:pPr>
                       <a:r>
-                        <a:rPr lang="es-ES_tradnl" sz="1000" kern="1200" dirty="0">
+                        <a:rPr lang="es-ES_tradnl" sz="1000" kern="1200">
                           <a:effectLst/>
                         </a:rPr>
                         <a:t>Requerimiento NO funcional: </a:t>
                       </a:r>
-                      <a:endParaRPr lang="es-AR" sz="1100" dirty="0">
+                      <a:endParaRPr lang="es-AR" sz="1100">
                         <a:effectLst/>
                         <a:latin typeface="Calibri" panose="020F0502020204030204" pitchFamily="34" charset="0"/>
                         <a:ea typeface="Calibri" panose="020F0502020204030204" pitchFamily="34" charset="0"/>
@@ -9521,27 +9592,6 @@
                         <a:rPr lang="es-ES_tradnl" sz="1000">
                           <a:effectLst/>
                         </a:rPr>
-                        <a:t>RNF04</a:t>
-                      </a:r>
-                      <a:endParaRPr lang="es-AR" sz="1100">
-                        <a:effectLst/>
-                      </a:endParaRPr>
-                    </a:p>
-                    <a:p>
-                      <a:pPr marL="342900" lvl="0" indent="-342900" algn="just">
-                        <a:lnSpc>
-                          <a:spcPct val="107000"/>
-                        </a:lnSpc>
-                        <a:spcAft>
-                          <a:spcPts val="0"/>
-                        </a:spcAft>
-                        <a:buFont typeface="Symbol" panose="05050102010706020507" pitchFamily="18" charset="2"/>
-                        <a:buChar char=""/>
-                      </a:pPr>
-                      <a:r>
-                        <a:rPr lang="es-ES_tradnl" sz="1000">
-                          <a:effectLst/>
-                        </a:rPr>
                         <a:t>RNF05</a:t>
                       </a:r>
                       <a:endParaRPr lang="es-AR" sz="1100">
@@ -9598,11 +9648,11 @@
                 </a:tc>
                 <a:extLst>
                   <a:ext uri="{0D108BD9-81ED-4DB2-BD59-A6C34878D82A}">
-                    <a16:rowId xmlns:a16="http://schemas.microsoft.com/office/drawing/2014/main" val="4226622566"/>
+                    <a16:rowId xmlns:a16="http://schemas.microsoft.com/office/drawing/2014/main" val="304867186"/>
                   </a:ext>
                 </a:extLst>
               </a:tr>
-              <a:tr h="586736">
+              <a:tr h="646931">
                 <a:tc gridSpan="2">
                   <a:txBody>
                     <a:bodyPr/>
@@ -9663,7 +9713,7 @@
                 </a:tc>
                 <a:extLst>
                   <a:ext uri="{0D108BD9-81ED-4DB2-BD59-A6C34878D82A}">
-                    <a16:rowId xmlns:a16="http://schemas.microsoft.com/office/drawing/2014/main" val="3685234315"/>
+                    <a16:rowId xmlns:a16="http://schemas.microsoft.com/office/drawing/2014/main" val="3531261014"/>
                   </a:ext>
                 </a:extLst>
               </a:tr>
@@ -9674,7 +9724,7 @@
     </p:spTree>
     <p:extLst>
       <p:ext uri="{BB962C8B-B14F-4D97-AF65-F5344CB8AC3E}">
-        <p14:creationId xmlns:p14="http://schemas.microsoft.com/office/powerpoint/2010/main" val="2277800202"/>
+        <p14:creationId xmlns:p14="http://schemas.microsoft.com/office/powerpoint/2010/main" val="718083291"/>
       </p:ext>
     </p:extLst>
   </p:cSld>
@@ -9710,43 +9760,45 @@
       </p:grpSpPr>
       <p:graphicFrame>
         <p:nvGraphicFramePr>
-          <p:cNvPr id="2" name="Tabla 1"/>
+          <p:cNvPr id="3" name="Tabla 2"/>
           <p:cNvGraphicFramePr>
             <a:graphicFrameLocks noGrp="1"/>
           </p:cNvGraphicFramePr>
           <p:nvPr>
             <p:extLst>
               <p:ext uri="{D42A27DB-BD31-4B8C-83A1-F6EECF244321}">
-                <p14:modId xmlns:p14="http://schemas.microsoft.com/office/powerpoint/2010/main" val="1997916755"/>
+                <p14:modId xmlns:p14="http://schemas.microsoft.com/office/powerpoint/2010/main" val="711014922"/>
               </p:ext>
             </p:extLst>
           </p:nvPr>
         </p:nvGraphicFramePr>
         <p:xfrm>
-          <a:off x="1187669" y="1844181"/>
-          <a:ext cx="7346731" cy="4877183"/>
+          <a:off x="274320" y="1815738"/>
+          <a:ext cx="8869680" cy="4741815"/>
         </p:xfrm>
         <a:graphic>
           <a:graphicData uri="http://schemas.openxmlformats.org/drawingml/2006/table">
             <a:tbl>
-              <a:tblPr firstRow="1" firstCol="1" bandRow="1"/>
+              <a:tblPr firstRow="1" firstCol="1" bandRow="1">
+                <a:tableStyleId>{5C22544A-7EE6-4342-B048-85BDC9FD1C3A}</a:tableStyleId>
+              </a:tblPr>
               <a:tblGrid>
-                <a:gridCol w="1658200">
+                <a:gridCol w="2001937">
                   <a:extLst>
                     <a:ext uri="{9D8B030D-6E8A-4147-A177-3AD203B41FA5}">
-                      <a16:colId xmlns:a16="http://schemas.microsoft.com/office/drawing/2014/main" val="3352072748"/>
+                      <a16:colId xmlns:a16="http://schemas.microsoft.com/office/drawing/2014/main" val="3225631443"/>
                     </a:ext>
                   </a:extLst>
                 </a:gridCol>
-                <a:gridCol w="5688531">
+                <a:gridCol w="6867743">
                   <a:extLst>
                     <a:ext uri="{9D8B030D-6E8A-4147-A177-3AD203B41FA5}">
-                      <a16:colId xmlns:a16="http://schemas.microsoft.com/office/drawing/2014/main" val="1728892642"/>
+                      <a16:colId xmlns:a16="http://schemas.microsoft.com/office/drawing/2014/main" val="2625051681"/>
                     </a:ext>
                   </a:extLst>
                 </a:gridCol>
               </a:tblGrid>
-              <a:tr h="646931">
+              <a:tr h="589382">
                 <a:tc>
                   <a:txBody>
                     <a:bodyPr/>
@@ -9766,7 +9818,7 @@
                         </a:rPr>
                         <a:t>Identificación del requerimiento: </a:t>
                       </a:r>
-                      <a:endParaRPr lang="es-AR" sz="1100">
+                      <a:endParaRPr lang="es-419" sz="1100">
                         <a:effectLst/>
                         <a:latin typeface="Calibri" panose="020F0502020204030204" pitchFamily="34" charset="0"/>
                         <a:ea typeface="Calibri" panose="020F0502020204030204" pitchFamily="34" charset="0"/>
@@ -9793,9 +9845,9 @@
                         <a:rPr lang="es-ES_tradnl" sz="1000">
                           <a:effectLst/>
                         </a:rPr>
-                        <a:t>RF04</a:t>
-                      </a:r>
-                      <a:endParaRPr lang="es-AR" sz="1100">
+                        <a:t>RF14</a:t>
+                      </a:r>
+                      <a:endParaRPr lang="es-419" sz="1100">
                         <a:effectLst/>
                         <a:latin typeface="Calibri" panose="020F0502020204030204" pitchFamily="34" charset="0"/>
                         <a:ea typeface="Calibri" panose="020F0502020204030204" pitchFamily="34" charset="0"/>
@@ -9807,11 +9859,11 @@
                 </a:tc>
                 <a:extLst>
                   <a:ext uri="{0D108BD9-81ED-4DB2-BD59-A6C34878D82A}">
-                    <a16:rowId xmlns:a16="http://schemas.microsoft.com/office/drawing/2014/main" val="3143357126"/>
+                    <a16:rowId xmlns:a16="http://schemas.microsoft.com/office/drawing/2014/main" val="2847263748"/>
                   </a:ext>
                 </a:extLst>
               </a:tr>
-              <a:tr h="646931">
+              <a:tr h="589382">
                 <a:tc>
                   <a:txBody>
                     <a:bodyPr/>
@@ -9831,7 +9883,7 @@
                         </a:rPr>
                         <a:t>Nombre del Requerimiento: </a:t>
                       </a:r>
-                      <a:endParaRPr lang="es-AR" sz="1100">
+                      <a:endParaRPr lang="es-419" sz="1100">
                         <a:effectLst/>
                         <a:latin typeface="Calibri" panose="020F0502020204030204" pitchFamily="34" charset="0"/>
                         <a:ea typeface="Calibri" panose="020F0502020204030204" pitchFamily="34" charset="0"/>
@@ -9858,9 +9910,9 @@
                         <a:rPr lang="es-ES_tradnl" sz="1000">
                           <a:effectLst/>
                         </a:rPr>
-                        <a:t>Actualizar productos.</a:t>
-                      </a:r>
-                      <a:endParaRPr lang="es-AR" sz="1100">
+                        <a:t>Graficas.</a:t>
+                      </a:r>
+                      <a:endParaRPr lang="es-419" sz="1100">
                         <a:effectLst/>
                         <a:latin typeface="Calibri" panose="020F0502020204030204" pitchFamily="34" charset="0"/>
                         <a:ea typeface="Calibri" panose="020F0502020204030204" pitchFamily="34" charset="0"/>
@@ -9872,11 +9924,11 @@
                 </a:tc>
                 <a:extLst>
                   <a:ext uri="{0D108BD9-81ED-4DB2-BD59-A6C34878D82A}">
-                    <a16:rowId xmlns:a16="http://schemas.microsoft.com/office/drawing/2014/main" val="3453327573"/>
+                    <a16:rowId xmlns:a16="http://schemas.microsoft.com/office/drawing/2014/main" val="665010900"/>
                   </a:ext>
                 </a:extLst>
               </a:tr>
-              <a:tr h="646931">
+              <a:tr h="589382">
                 <a:tc>
                   <a:txBody>
                     <a:bodyPr/>
@@ -9896,7 +9948,7 @@
                         </a:rPr>
                         <a:t>Características: </a:t>
                       </a:r>
-                      <a:endParaRPr lang="es-AR" sz="1100">
+                      <a:endParaRPr lang="es-419" sz="1100">
                         <a:effectLst/>
                         <a:latin typeface="Calibri" panose="020F0502020204030204" pitchFamily="34" charset="0"/>
                         <a:ea typeface="Calibri" panose="020F0502020204030204" pitchFamily="34" charset="0"/>
@@ -9923,9 +9975,9 @@
                         <a:rPr lang="es-ES_tradnl" sz="1000">
                           <a:effectLst/>
                         </a:rPr>
-                        <a:t>El sistema permitirá al usuario actualizar los datos de los elementos registrados.</a:t>
-                      </a:r>
-                      <a:endParaRPr lang="es-AR" sz="1100">
+                        <a:t>Permite ver información referente a los productos de inventario, frecuencia de uso y productos prestados y regresados</a:t>
+                      </a:r>
+                      <a:endParaRPr lang="es-419" sz="1100">
                         <a:effectLst/>
                         <a:latin typeface="Calibri" panose="020F0502020204030204" pitchFamily="34" charset="0"/>
                         <a:ea typeface="Calibri" panose="020F0502020204030204" pitchFamily="34" charset="0"/>
@@ -9937,11 +9989,11 @@
                 </a:tc>
                 <a:extLst>
                   <a:ext uri="{0D108BD9-81ED-4DB2-BD59-A6C34878D82A}">
-                    <a16:rowId xmlns:a16="http://schemas.microsoft.com/office/drawing/2014/main" val="2929380274"/>
+                    <a16:rowId xmlns:a16="http://schemas.microsoft.com/office/drawing/2014/main" val="1811301389"/>
                   </a:ext>
                 </a:extLst>
               </a:tr>
-              <a:tr h="646931">
+              <a:tr h="589382">
                 <a:tc>
                   <a:txBody>
                     <a:bodyPr/>
@@ -9961,7 +10013,7 @@
                         </a:rPr>
                         <a:t>Descripción del requerimiento: </a:t>
                       </a:r>
-                      <a:endParaRPr lang="es-AR" sz="1100">
+                      <a:endParaRPr lang="es-419" sz="1100">
                         <a:effectLst/>
                         <a:latin typeface="Calibri" panose="020F0502020204030204" pitchFamily="34" charset="0"/>
                         <a:ea typeface="Calibri" panose="020F0502020204030204" pitchFamily="34" charset="0"/>
@@ -9985,28 +10037,16 @@
                         </a:spcAft>
                       </a:pPr>
                       <a:r>
-                        <a:rPr lang="es-ES_tradnl" sz="1000" dirty="0">
-                          <a:effectLst/>
-                        </a:rPr>
-                        <a:t>Actualizar: Permite al usuario actualizar datos de los elementos registrados en el </a:t>
-                      </a:r>
-                      <a:r>
-                        <a:rPr lang="es-ES_tradnl" sz="1000" dirty="0" smtClean="0">
-                          <a:effectLst/>
-                        </a:rPr>
-                        <a:t>sistema</a:t>
-                      </a:r>
-                      <a:r>
-                        <a:rPr lang="es-ES_tradnl" sz="1000" baseline="0" dirty="0" smtClean="0">
-                          <a:effectLst/>
-                        </a:rPr>
-                        <a:t> reemplazando los viejos datos con los nuevos ingresados.</a:t>
-                      </a:r>
-                      <a:endParaRPr lang="es-AR" sz="1100" dirty="0">
+                        <a:rPr lang="es-ES_tradnl" sz="1000">
+                          <a:effectLst/>
+                        </a:rPr>
+                        <a:t>El sistema permitirá al ver información acerca de los productos en forma de gráfica.</a:t>
+                      </a:r>
+                      <a:endParaRPr lang="es-419" sz="1100">
                         <a:effectLst/>
                         <a:latin typeface="Calibri" panose="020F0502020204030204" pitchFamily="34" charset="0"/>
                         <a:ea typeface="Calibri" panose="020F0502020204030204" pitchFamily="34" charset="0"/>
-                        <a:cs typeface="Tunga" panose="020B0502040204020203" pitchFamily="34" charset="0"/>
+                        <a:cs typeface="Tunga" panose="020B0502040204020203"/>
                       </a:endParaRPr>
                     </a:p>
                   </a:txBody>
@@ -10014,11 +10054,11 @@
                 </a:tc>
                 <a:extLst>
                   <a:ext uri="{0D108BD9-81ED-4DB2-BD59-A6C34878D82A}">
-                    <a16:rowId xmlns:a16="http://schemas.microsoft.com/office/drawing/2014/main" val="70470551"/>
+                    <a16:rowId xmlns:a16="http://schemas.microsoft.com/office/drawing/2014/main" val="1546163281"/>
                   </a:ext>
                 </a:extLst>
               </a:tr>
-              <a:tr h="1642528">
+              <a:tr h="1794905">
                 <a:tc>
                   <a:txBody>
                     <a:bodyPr/>
@@ -10038,7 +10078,7 @@
                         </a:rPr>
                         <a:t>Requerimiento NO funcional: </a:t>
                       </a:r>
-                      <a:endParaRPr lang="es-AR" sz="1100">
+                      <a:endParaRPr lang="es-419" sz="1100">
                         <a:effectLst/>
                         <a:latin typeface="Calibri" panose="020F0502020204030204" pitchFamily="34" charset="0"/>
                         <a:ea typeface="Calibri" panose="020F0502020204030204" pitchFamily="34" charset="0"/>
@@ -10062,6 +10102,9 @@
                         </a:spcAft>
                         <a:buFont typeface="Symbol" panose="05050102010706020507" pitchFamily="18" charset="2"/>
                         <a:buChar char=""/>
+                        <a:tabLst>
+                          <a:tab pos="450215" algn="l"/>
+                        </a:tabLst>
                       </a:pPr>
                       <a:r>
                         <a:rPr lang="es-ES_tradnl" sz="1000">
@@ -10069,7 +10112,7 @@
                         </a:rPr>
                         <a:t>RNF01</a:t>
                       </a:r>
-                      <a:endParaRPr lang="es-AR" sz="1100">
+                      <a:endParaRPr lang="es-419" sz="1100">
                         <a:effectLst/>
                       </a:endParaRPr>
                     </a:p>
@@ -10083,6 +10126,9 @@
                         </a:spcAft>
                         <a:buFont typeface="Symbol" panose="05050102010706020507" pitchFamily="18" charset="2"/>
                         <a:buChar char=""/>
+                        <a:tabLst>
+                          <a:tab pos="450215" algn="l"/>
+                        </a:tabLst>
                       </a:pPr>
                       <a:r>
                         <a:rPr lang="es-ES_tradnl" sz="1000">
@@ -10090,7 +10136,7 @@
                         </a:rPr>
                         <a:t>RNF03</a:t>
                       </a:r>
-                      <a:endParaRPr lang="es-AR" sz="1100">
+                      <a:endParaRPr lang="es-419" sz="1100">
                         <a:effectLst/>
                       </a:endParaRPr>
                     </a:p>
@@ -10104,14 +10150,17 @@
                         </a:spcAft>
                         <a:buFont typeface="Symbol" panose="05050102010706020507" pitchFamily="18" charset="2"/>
                         <a:buChar char=""/>
+                        <a:tabLst>
+                          <a:tab pos="450215" algn="l"/>
+                        </a:tabLst>
                       </a:pPr>
                       <a:r>
                         <a:rPr lang="es-ES_tradnl" sz="1000">
                           <a:effectLst/>
                         </a:rPr>
-                        <a:t>RNF05</a:t>
-                      </a:r>
-                      <a:endParaRPr lang="es-AR" sz="1100">
+                        <a:t>RNF04</a:t>
+                      </a:r>
+                      <a:endParaRPr lang="es-419" sz="1100">
                         <a:effectLst/>
                       </a:endParaRPr>
                     </a:p>
@@ -10125,14 +10174,17 @@
                         </a:spcAft>
                         <a:buFont typeface="Symbol" panose="05050102010706020507" pitchFamily="18" charset="2"/>
                         <a:buChar char=""/>
+                        <a:tabLst>
+                          <a:tab pos="450215" algn="l"/>
+                        </a:tabLst>
                       </a:pPr>
                       <a:r>
                         <a:rPr lang="es-ES_tradnl" sz="1000">
                           <a:effectLst/>
                         </a:rPr>
-                        <a:t>RNF08</a:t>
-                      </a:r>
-                      <a:endParaRPr lang="es-AR" sz="1100">
+                        <a:t>RNF05</a:t>
+                      </a:r>
+                      <a:endParaRPr lang="es-419" sz="1100">
                         <a:effectLst/>
                       </a:endParaRPr>
                     </a:p>
@@ -10151,9 +10203,30 @@
                         <a:rPr lang="es-ES_tradnl" sz="1000">
                           <a:effectLst/>
                         </a:rPr>
+                        <a:t>RNF08</a:t>
+                      </a:r>
+                      <a:endParaRPr lang="es-419" sz="1100">
+                        <a:effectLst/>
+                      </a:endParaRPr>
+                    </a:p>
+                    <a:p>
+                      <a:pPr marL="342900" lvl="0" indent="-342900" algn="just">
+                        <a:lnSpc>
+                          <a:spcPct val="107000"/>
+                        </a:lnSpc>
+                        <a:spcAft>
+                          <a:spcPts val="0"/>
+                        </a:spcAft>
+                        <a:buFont typeface="Symbol" panose="05050102010706020507" pitchFamily="18" charset="2"/>
+                        <a:buChar char=""/>
+                      </a:pPr>
+                      <a:r>
+                        <a:rPr lang="es-ES_tradnl" sz="1000">
+                          <a:effectLst/>
+                        </a:rPr>
                         <a:t>RNF10</a:t>
                       </a:r>
-                      <a:endParaRPr lang="es-AR" sz="1100">
+                      <a:endParaRPr lang="es-419" sz="1100">
                         <a:effectLst/>
                         <a:latin typeface="Calibri" panose="020F0502020204030204" pitchFamily="34" charset="0"/>
                         <a:ea typeface="Calibri" panose="020F0502020204030204" pitchFamily="34" charset="0"/>
@@ -10165,11 +10238,11 @@
                 </a:tc>
                 <a:extLst>
                   <a:ext uri="{0D108BD9-81ED-4DB2-BD59-A6C34878D82A}">
-                    <a16:rowId xmlns:a16="http://schemas.microsoft.com/office/drawing/2014/main" val="304867186"/>
+                    <a16:rowId xmlns:a16="http://schemas.microsoft.com/office/drawing/2014/main" val="725769447"/>
                   </a:ext>
                 </a:extLst>
               </a:tr>
-              <a:tr h="646931">
+              <a:tr h="589382">
                 <a:tc gridSpan="2">
                   <a:txBody>
                     <a:bodyPr/>
@@ -10189,7 +10262,7 @@
                         </a:rPr>
                         <a:t>Prioridad del requerimiento:     </a:t>
                       </a:r>
-                      <a:endParaRPr lang="es-AR" sz="1100" dirty="0">
+                      <a:endParaRPr lang="es-419" sz="1100" dirty="0">
                         <a:effectLst/>
                       </a:endParaRPr>
                     </a:p>
@@ -10208,11 +10281,11 @@
                         </a:rPr>
                         <a:t>Alta</a:t>
                       </a:r>
-                      <a:endParaRPr lang="es-AR" sz="1100" dirty="0">
+                      <a:endParaRPr lang="es-419" sz="1100" dirty="0">
                         <a:effectLst/>
                         <a:latin typeface="Calibri" panose="020F0502020204030204" pitchFamily="34" charset="0"/>
                         <a:ea typeface="Calibri" panose="020F0502020204030204" pitchFamily="34" charset="0"/>
-                        <a:cs typeface="Tunga" panose="020B0502040204020203" pitchFamily="34" charset="0"/>
+                        <a:cs typeface="Tunga" panose="020B0502040204020203"/>
                       </a:endParaRPr>
                     </a:p>
                   </a:txBody>
@@ -10223,14 +10296,14 @@
                     <a:bodyPr/>
                     <a:lstStyle/>
                     <a:p>
-                      <a:endParaRPr lang="es-AR"/>
+                      <a:endParaRPr lang="es-419"/>
                     </a:p>
                   </a:txBody>
                   <a:tcPr/>
                 </a:tc>
                 <a:extLst>
                   <a:ext uri="{0D108BD9-81ED-4DB2-BD59-A6C34878D82A}">
-                    <a16:rowId xmlns:a16="http://schemas.microsoft.com/office/drawing/2014/main" val="3531261014"/>
+                    <a16:rowId xmlns:a16="http://schemas.microsoft.com/office/drawing/2014/main" val="2930186393"/>
                   </a:ext>
                 </a:extLst>
               </a:tr>
@@ -10241,7 +10314,7 @@
     </p:spTree>
     <p:extLst>
       <p:ext uri="{BB962C8B-B14F-4D97-AF65-F5344CB8AC3E}">
-        <p14:creationId xmlns:p14="http://schemas.microsoft.com/office/powerpoint/2010/main" val="718083291"/>
+        <p14:creationId xmlns:p14="http://schemas.microsoft.com/office/powerpoint/2010/main" val="1250483121"/>
       </p:ext>
     </p:extLst>
   </p:cSld>
@@ -10582,567 +10655,6 @@
           <a:chExt cx="0" cy="0"/>
         </a:xfrm>
       </p:grpSpPr>
-      <p:graphicFrame>
-        <p:nvGraphicFramePr>
-          <p:cNvPr id="2" name="Tabla 1"/>
-          <p:cNvGraphicFramePr>
-            <a:graphicFrameLocks noGrp="1"/>
-          </p:cNvGraphicFramePr>
-          <p:nvPr>
-            <p:extLst>
-              <p:ext uri="{D42A27DB-BD31-4B8C-83A1-F6EECF244321}">
-                <p14:modId xmlns:p14="http://schemas.microsoft.com/office/powerpoint/2010/main" val="113092419"/>
-              </p:ext>
-            </p:extLst>
-          </p:nvPr>
-        </p:nvGraphicFramePr>
-        <p:xfrm>
-          <a:off x="1061545" y="1765739"/>
-          <a:ext cx="7683816" cy="5013433"/>
-        </p:xfrm>
-        <a:graphic>
-          <a:graphicData uri="http://schemas.openxmlformats.org/drawingml/2006/table">
-            <a:tbl>
-              <a:tblPr firstRow="1" firstCol="1" bandRow="1"/>
-              <a:tblGrid>
-                <a:gridCol w="1734281">
-                  <a:extLst>
-                    <a:ext uri="{9D8B030D-6E8A-4147-A177-3AD203B41FA5}">
-                      <a16:colId xmlns:a16="http://schemas.microsoft.com/office/drawing/2014/main" val="681498033"/>
-                    </a:ext>
-                  </a:extLst>
-                </a:gridCol>
-                <a:gridCol w="5949535">
-                  <a:extLst>
-                    <a:ext uri="{9D8B030D-6E8A-4147-A177-3AD203B41FA5}">
-                      <a16:colId xmlns:a16="http://schemas.microsoft.com/office/drawing/2014/main" val="3041195940"/>
-                    </a:ext>
-                  </a:extLst>
-                </a:gridCol>
-              </a:tblGrid>
-              <a:tr h="769760">
-                <a:tc>
-                  <a:txBody>
-                    <a:bodyPr/>
-                    <a:lstStyle/>
-                    <a:p>
-                      <a:pPr>
-                        <a:lnSpc>
-                          <a:spcPct val="107000"/>
-                        </a:lnSpc>
-                        <a:spcAft>
-                          <a:spcPts val="0"/>
-                        </a:spcAft>
-                      </a:pPr>
-                      <a:r>
-                        <a:rPr lang="es-ES_tradnl" sz="1000" kern="1200">
-                          <a:effectLst/>
-                        </a:rPr>
-                        <a:t>Identificación del requerimiento: </a:t>
-                      </a:r>
-                      <a:endParaRPr lang="es-AR" sz="1100">
-                        <a:effectLst/>
-                        <a:latin typeface="Calibri" panose="020F0502020204030204" pitchFamily="34" charset="0"/>
-                        <a:ea typeface="Calibri" panose="020F0502020204030204" pitchFamily="34" charset="0"/>
-                        <a:cs typeface="Times New Roman" panose="02020603050405020304" pitchFamily="18" charset="0"/>
-                      </a:endParaRPr>
-                    </a:p>
-                  </a:txBody>
-                  <a:tcPr marL="68580" marR="68580" marT="0" marB="0"/>
-                </a:tc>
-                <a:tc>
-                  <a:txBody>
-                    <a:bodyPr/>
-                    <a:lstStyle/>
-                    <a:p>
-                      <a:pPr algn="just">
-                        <a:lnSpc>
-                          <a:spcPct val="107000"/>
-                        </a:lnSpc>
-                        <a:spcAft>
-                          <a:spcPts val="0"/>
-                        </a:spcAft>
-                      </a:pPr>
-                      <a:r>
-                        <a:rPr lang="es-ES_tradnl" sz="1000">
-                          <a:effectLst/>
-                        </a:rPr>
-                        <a:t>RF09</a:t>
-                      </a:r>
-                      <a:endParaRPr lang="es-AR" sz="1100">
-                        <a:effectLst/>
-                        <a:latin typeface="Calibri" panose="020F0502020204030204" pitchFamily="34" charset="0"/>
-                        <a:ea typeface="Calibri" panose="020F0502020204030204" pitchFamily="34" charset="0"/>
-                        <a:cs typeface="Times New Roman" panose="02020603050405020304" pitchFamily="18" charset="0"/>
-                      </a:endParaRPr>
-                    </a:p>
-                  </a:txBody>
-                  <a:tcPr marL="68580" marR="68580" marT="0" marB="0"/>
-                </a:tc>
-                <a:extLst>
-                  <a:ext uri="{0D108BD9-81ED-4DB2-BD59-A6C34878D82A}">
-                    <a16:rowId xmlns:a16="http://schemas.microsoft.com/office/drawing/2014/main" val="2335587797"/>
-                  </a:ext>
-                </a:extLst>
-              </a:tr>
-              <a:tr h="769760">
-                <a:tc>
-                  <a:txBody>
-                    <a:bodyPr/>
-                    <a:lstStyle/>
-                    <a:p>
-                      <a:pPr>
-                        <a:lnSpc>
-                          <a:spcPct val="107000"/>
-                        </a:lnSpc>
-                        <a:spcAft>
-                          <a:spcPts val="0"/>
-                        </a:spcAft>
-                      </a:pPr>
-                      <a:r>
-                        <a:rPr lang="es-ES_tradnl" sz="1000" kern="1200">
-                          <a:effectLst/>
-                        </a:rPr>
-                        <a:t>Nombre del Requerimiento: </a:t>
-                      </a:r>
-                      <a:endParaRPr lang="es-AR" sz="1100">
-                        <a:effectLst/>
-                        <a:latin typeface="Calibri" panose="020F0502020204030204" pitchFamily="34" charset="0"/>
-                        <a:ea typeface="Calibri" panose="020F0502020204030204" pitchFamily="34" charset="0"/>
-                        <a:cs typeface="Times New Roman" panose="02020603050405020304" pitchFamily="18" charset="0"/>
-                      </a:endParaRPr>
-                    </a:p>
-                  </a:txBody>
-                  <a:tcPr marL="68580" marR="68580" marT="0" marB="0"/>
-                </a:tc>
-                <a:tc>
-                  <a:txBody>
-                    <a:bodyPr/>
-                    <a:lstStyle/>
-                    <a:p>
-                      <a:pPr algn="just">
-                        <a:lnSpc>
-                          <a:spcPct val="107000"/>
-                        </a:lnSpc>
-                        <a:spcAft>
-                          <a:spcPts val="0"/>
-                        </a:spcAft>
-                      </a:pPr>
-                      <a:r>
-                        <a:rPr lang="es-ES_tradnl" sz="1000">
-                          <a:effectLst/>
-                        </a:rPr>
-                        <a:t>Eliminar producto.</a:t>
-                      </a:r>
-                      <a:endParaRPr lang="es-AR" sz="1100">
-                        <a:effectLst/>
-                        <a:latin typeface="Calibri" panose="020F0502020204030204" pitchFamily="34" charset="0"/>
-                        <a:ea typeface="Calibri" panose="020F0502020204030204" pitchFamily="34" charset="0"/>
-                        <a:cs typeface="Times New Roman" panose="02020603050405020304" pitchFamily="18" charset="0"/>
-                      </a:endParaRPr>
-                    </a:p>
-                  </a:txBody>
-                  <a:tcPr marL="68580" marR="68580" marT="0" marB="0"/>
-                </a:tc>
-                <a:extLst>
-                  <a:ext uri="{0D108BD9-81ED-4DB2-BD59-A6C34878D82A}">
-                    <a16:rowId xmlns:a16="http://schemas.microsoft.com/office/drawing/2014/main" val="832896208"/>
-                  </a:ext>
-                </a:extLst>
-              </a:tr>
-              <a:tr h="374885">
-                <a:tc>
-                  <a:txBody>
-                    <a:bodyPr/>
-                    <a:lstStyle/>
-                    <a:p>
-                      <a:pPr>
-                        <a:lnSpc>
-                          <a:spcPct val="107000"/>
-                        </a:lnSpc>
-                        <a:spcAft>
-                          <a:spcPts val="0"/>
-                        </a:spcAft>
-                      </a:pPr>
-                      <a:r>
-                        <a:rPr lang="es-ES_tradnl" sz="1000" kern="1200">
-                          <a:effectLst/>
-                        </a:rPr>
-                        <a:t>Características: </a:t>
-                      </a:r>
-                      <a:endParaRPr lang="es-AR" sz="1100">
-                        <a:effectLst/>
-                        <a:latin typeface="Calibri" panose="020F0502020204030204" pitchFamily="34" charset="0"/>
-                        <a:ea typeface="Calibri" panose="020F0502020204030204" pitchFamily="34" charset="0"/>
-                        <a:cs typeface="Times New Roman" panose="02020603050405020304" pitchFamily="18" charset="0"/>
-                      </a:endParaRPr>
-                    </a:p>
-                  </a:txBody>
-                  <a:tcPr marL="68580" marR="68580" marT="0" marB="0"/>
-                </a:tc>
-                <a:tc>
-                  <a:txBody>
-                    <a:bodyPr/>
-                    <a:lstStyle/>
-                    <a:p>
-                      <a:pPr algn="just">
-                        <a:lnSpc>
-                          <a:spcPct val="107000"/>
-                        </a:lnSpc>
-                        <a:spcAft>
-                          <a:spcPts val="0"/>
-                        </a:spcAft>
-                      </a:pPr>
-                      <a:r>
-                        <a:rPr lang="es-ES_tradnl" sz="1000">
-                          <a:effectLst/>
-                        </a:rPr>
-                        <a:t>Permite gestionar información referente al producto.</a:t>
-                      </a:r>
-                      <a:endParaRPr lang="es-AR" sz="1100">
-                        <a:effectLst/>
-                        <a:latin typeface="Calibri" panose="020F0502020204030204" pitchFamily="34" charset="0"/>
-                        <a:ea typeface="Calibri" panose="020F0502020204030204" pitchFamily="34" charset="0"/>
-                        <a:cs typeface="Times New Roman" panose="02020603050405020304" pitchFamily="18" charset="0"/>
-                      </a:endParaRPr>
-                    </a:p>
-                  </a:txBody>
-                  <a:tcPr marL="68580" marR="68580" marT="0" marB="0"/>
-                </a:tc>
-                <a:extLst>
-                  <a:ext uri="{0D108BD9-81ED-4DB2-BD59-A6C34878D82A}">
-                    <a16:rowId xmlns:a16="http://schemas.microsoft.com/office/drawing/2014/main" val="3237759365"/>
-                  </a:ext>
-                </a:extLst>
-              </a:tr>
-              <a:tr h="769760">
-                <a:tc>
-                  <a:txBody>
-                    <a:bodyPr/>
-                    <a:lstStyle/>
-                    <a:p>
-                      <a:pPr>
-                        <a:lnSpc>
-                          <a:spcPct val="107000"/>
-                        </a:lnSpc>
-                        <a:spcAft>
-                          <a:spcPts val="0"/>
-                        </a:spcAft>
-                      </a:pPr>
-                      <a:r>
-                        <a:rPr lang="es-ES_tradnl" sz="1000" kern="1200">
-                          <a:effectLst/>
-                        </a:rPr>
-                        <a:t>Descripción del requerimiento: </a:t>
-                      </a:r>
-                      <a:endParaRPr lang="es-AR" sz="1100">
-                        <a:effectLst/>
-                        <a:latin typeface="Calibri" panose="020F0502020204030204" pitchFamily="34" charset="0"/>
-                        <a:ea typeface="Calibri" panose="020F0502020204030204" pitchFamily="34" charset="0"/>
-                        <a:cs typeface="Times New Roman" panose="02020603050405020304" pitchFamily="18" charset="0"/>
-                      </a:endParaRPr>
-                    </a:p>
-                  </a:txBody>
-                  <a:tcPr marL="68580" marR="68580" marT="0" marB="0"/>
-                </a:tc>
-                <a:tc>
-                  <a:txBody>
-                    <a:bodyPr/>
-                    <a:lstStyle/>
-                    <a:p>
-                      <a:pPr algn="just">
-                        <a:lnSpc>
-                          <a:spcPct val="107000"/>
-                        </a:lnSpc>
-                        <a:spcAft>
-                          <a:spcPts val="0"/>
-                        </a:spcAft>
-                        <a:tabLst>
-                          <a:tab pos="450215" algn="l"/>
-                        </a:tabLst>
-                      </a:pPr>
-                      <a:r>
-                        <a:rPr lang="es-ES_tradnl" sz="1000" dirty="0">
-                          <a:effectLst/>
-                        </a:rPr>
-                        <a:t>Eliminar Producto: El usuario podrá </a:t>
-                      </a:r>
-                      <a:r>
-                        <a:rPr lang="es-ES_tradnl" sz="1000" dirty="0" smtClean="0">
-                          <a:effectLst/>
-                        </a:rPr>
-                        <a:t>eliminar un </a:t>
-                      </a:r>
-                      <a:r>
-                        <a:rPr lang="es-ES_tradnl" sz="1000" dirty="0">
-                          <a:effectLst/>
-                        </a:rPr>
-                        <a:t>producto no deseado ya sea por error o por otra </a:t>
-                      </a:r>
-                      <a:r>
-                        <a:rPr lang="es-ES_tradnl" sz="1000" dirty="0" smtClean="0">
-                          <a:effectLst/>
-                        </a:rPr>
-                        <a:t>decisión</a:t>
-                      </a:r>
-                      <a:r>
-                        <a:rPr lang="es-ES_tradnl" sz="1000" baseline="0" dirty="0" smtClean="0">
-                          <a:effectLst/>
-                        </a:rPr>
-                        <a:t>.</a:t>
-                      </a:r>
-                      <a:endParaRPr lang="es-AR" sz="1100" dirty="0">
-                        <a:effectLst/>
-                        <a:latin typeface="Calibri" panose="020F0502020204030204" pitchFamily="34" charset="0"/>
-                        <a:ea typeface="Calibri" panose="020F0502020204030204" pitchFamily="34" charset="0"/>
-                        <a:cs typeface="Tunga" panose="020B0502040204020203" pitchFamily="34" charset="0"/>
-                      </a:endParaRPr>
-                    </a:p>
-                  </a:txBody>
-                  <a:tcPr marL="68580" marR="68580" marT="0" marB="0"/>
-                </a:tc>
-                <a:extLst>
-                  <a:ext uri="{0D108BD9-81ED-4DB2-BD59-A6C34878D82A}">
-                    <a16:rowId xmlns:a16="http://schemas.microsoft.com/office/drawing/2014/main" val="3762303484"/>
-                  </a:ext>
-                </a:extLst>
-              </a:tr>
-              <a:tr h="1559508">
-                <a:tc>
-                  <a:txBody>
-                    <a:bodyPr/>
-                    <a:lstStyle/>
-                    <a:p>
-                      <a:pPr>
-                        <a:lnSpc>
-                          <a:spcPct val="107000"/>
-                        </a:lnSpc>
-                        <a:spcAft>
-                          <a:spcPts val="0"/>
-                        </a:spcAft>
-                      </a:pPr>
-                      <a:r>
-                        <a:rPr lang="es-ES_tradnl" sz="1000" kern="1200">
-                          <a:effectLst/>
-                        </a:rPr>
-                        <a:t>Requerimiento NO funcional: </a:t>
-                      </a:r>
-                      <a:endParaRPr lang="es-AR" sz="1100">
-                        <a:effectLst/>
-                        <a:latin typeface="Calibri" panose="020F0502020204030204" pitchFamily="34" charset="0"/>
-                        <a:ea typeface="Calibri" panose="020F0502020204030204" pitchFamily="34" charset="0"/>
-                        <a:cs typeface="Times New Roman" panose="02020603050405020304" pitchFamily="18" charset="0"/>
-                      </a:endParaRPr>
-                    </a:p>
-                  </a:txBody>
-                  <a:tcPr marL="68580" marR="68580" marT="0" marB="0"/>
-                </a:tc>
-                <a:tc>
-                  <a:txBody>
-                    <a:bodyPr/>
-                    <a:lstStyle/>
-                    <a:p>
-                      <a:pPr marL="342900" lvl="0" indent="-342900" algn="just">
-                        <a:lnSpc>
-                          <a:spcPct val="107000"/>
-                        </a:lnSpc>
-                        <a:spcAft>
-                          <a:spcPts val="0"/>
-                        </a:spcAft>
-                        <a:buFont typeface="Symbol" panose="05050102010706020507" pitchFamily="18" charset="2"/>
-                        <a:buChar char=""/>
-                      </a:pPr>
-                      <a:r>
-                        <a:rPr lang="es-ES_tradnl" sz="1000">
-                          <a:effectLst/>
-                        </a:rPr>
-                        <a:t>RNF01</a:t>
-                      </a:r>
-                      <a:endParaRPr lang="es-AR" sz="1100">
-                        <a:effectLst/>
-                      </a:endParaRPr>
-                    </a:p>
-                    <a:p>
-                      <a:pPr marL="342900" lvl="0" indent="-342900" algn="just">
-                        <a:lnSpc>
-                          <a:spcPct val="107000"/>
-                        </a:lnSpc>
-                        <a:spcAft>
-                          <a:spcPts val="0"/>
-                        </a:spcAft>
-                        <a:buFont typeface="Symbol" panose="05050102010706020507" pitchFamily="18" charset="2"/>
-                        <a:buChar char=""/>
-                      </a:pPr>
-                      <a:r>
-                        <a:rPr lang="es-ES_tradnl" sz="1000">
-                          <a:effectLst/>
-                        </a:rPr>
-                        <a:t>RNF03</a:t>
-                      </a:r>
-                      <a:endParaRPr lang="es-AR" sz="1100">
-                        <a:effectLst/>
-                      </a:endParaRPr>
-                    </a:p>
-                    <a:p>
-                      <a:pPr marL="342900" lvl="0" indent="-342900" algn="just">
-                        <a:lnSpc>
-                          <a:spcPct val="107000"/>
-                        </a:lnSpc>
-                        <a:spcAft>
-                          <a:spcPts val="0"/>
-                        </a:spcAft>
-                        <a:buFont typeface="Symbol" panose="05050102010706020507" pitchFamily="18" charset="2"/>
-                        <a:buChar char=""/>
-                      </a:pPr>
-                      <a:r>
-                        <a:rPr lang="es-ES_tradnl" sz="1000">
-                          <a:effectLst/>
-                        </a:rPr>
-                        <a:t>RNF08</a:t>
-                      </a:r>
-                      <a:endParaRPr lang="es-AR" sz="1100">
-                        <a:effectLst/>
-                      </a:endParaRPr>
-                    </a:p>
-                    <a:p>
-                      <a:pPr marL="342900" lvl="0" indent="-342900" algn="just">
-                        <a:lnSpc>
-                          <a:spcPct val="107000"/>
-                        </a:lnSpc>
-                        <a:spcAft>
-                          <a:spcPts val="0"/>
-                        </a:spcAft>
-                        <a:buFont typeface="Symbol" panose="05050102010706020507" pitchFamily="18" charset="2"/>
-                        <a:buChar char=""/>
-                      </a:pPr>
-                      <a:r>
-                        <a:rPr lang="es-ES_tradnl" sz="1000">
-                          <a:effectLst/>
-                        </a:rPr>
-                        <a:t>RNF10</a:t>
-                      </a:r>
-                      <a:endParaRPr lang="es-AR" sz="1100">
-                        <a:effectLst/>
-                        <a:latin typeface="Calibri" panose="020F0502020204030204" pitchFamily="34" charset="0"/>
-                        <a:ea typeface="Calibri" panose="020F0502020204030204" pitchFamily="34" charset="0"/>
-                        <a:cs typeface="Times New Roman" panose="02020603050405020304" pitchFamily="18" charset="0"/>
-                      </a:endParaRPr>
-                    </a:p>
-                  </a:txBody>
-                  <a:tcPr marL="68580" marR="68580" marT="0" marB="0"/>
-                </a:tc>
-                <a:extLst>
-                  <a:ext uri="{0D108BD9-81ED-4DB2-BD59-A6C34878D82A}">
-                    <a16:rowId xmlns:a16="http://schemas.microsoft.com/office/drawing/2014/main" val="2705344903"/>
-                  </a:ext>
-                </a:extLst>
-              </a:tr>
-              <a:tr h="769760">
-                <a:tc gridSpan="2">
-                  <a:txBody>
-                    <a:bodyPr/>
-                    <a:lstStyle/>
-                    <a:p>
-                      <a:pPr>
-                        <a:lnSpc>
-                          <a:spcPct val="107000"/>
-                        </a:lnSpc>
-                        <a:spcAft>
-                          <a:spcPts val="0"/>
-                        </a:spcAft>
-                      </a:pPr>
-                      <a:r>
-                        <a:rPr lang="es-ES_tradnl" sz="1000" dirty="0">
-                          <a:effectLst/>
-                        </a:rPr>
-                        <a:t>Prioridad del requerimiento:     </a:t>
-                      </a:r>
-                      <a:endParaRPr lang="es-AR" sz="1100" dirty="0">
-                        <a:effectLst/>
-                      </a:endParaRPr>
-                    </a:p>
-                    <a:p>
-                      <a:pPr>
-                        <a:lnSpc>
-                          <a:spcPct val="107000"/>
-                        </a:lnSpc>
-                        <a:spcAft>
-                          <a:spcPts val="800"/>
-                        </a:spcAft>
-                      </a:pPr>
-                      <a:r>
-                        <a:rPr lang="es-ES_tradnl" sz="1000" dirty="0">
-                          <a:effectLst/>
-                        </a:rPr>
-                        <a:t>Alta</a:t>
-                      </a:r>
-                      <a:endParaRPr lang="es-AR" sz="1100" dirty="0">
-                        <a:effectLst/>
-                        <a:latin typeface="Calibri" panose="020F0502020204030204" pitchFamily="34" charset="0"/>
-                        <a:ea typeface="Calibri" panose="020F0502020204030204" pitchFamily="34" charset="0"/>
-                        <a:cs typeface="Tunga" panose="020B0502040204020203" pitchFamily="34" charset="0"/>
-                      </a:endParaRPr>
-                    </a:p>
-                  </a:txBody>
-                  <a:tcPr marL="68580" marR="68580" marT="0" marB="0"/>
-                </a:tc>
-                <a:tc hMerge="1">
-                  <a:txBody>
-                    <a:bodyPr/>
-                    <a:lstStyle/>
-                    <a:p>
-                      <a:endParaRPr lang="es-AR"/>
-                    </a:p>
-                  </a:txBody>
-                  <a:tcPr/>
-                </a:tc>
-                <a:extLst>
-                  <a:ext uri="{0D108BD9-81ED-4DB2-BD59-A6C34878D82A}">
-                    <a16:rowId xmlns:a16="http://schemas.microsoft.com/office/drawing/2014/main" val="154590771"/>
-                  </a:ext>
-                </a:extLst>
-              </a:tr>
-            </a:tbl>
-          </a:graphicData>
-        </a:graphic>
-      </p:graphicFrame>
-    </p:spTree>
-    <p:extLst>
-      <p:ext uri="{BB962C8B-B14F-4D97-AF65-F5344CB8AC3E}">
-        <p14:creationId xmlns:p14="http://schemas.microsoft.com/office/powerpoint/2010/main" val="1250483121"/>
-      </p:ext>
-    </p:extLst>
-  </p:cSld>
-  <p:clrMapOvr>
-    <a:masterClrMapping/>
-  </p:clrMapOvr>
-  <p:timing>
-    <p:tnLst>
-      <p:par>
-        <p:cTn id="1" dur="indefinite" restart="never" nodeType="tmRoot"/>
-      </p:par>
-    </p:tnLst>
-  </p:timing>
-</p:sld>
-</file>
-
-<file path=ppt/slides/slide21.xml><?xml version="1.0" encoding="utf-8"?>
-<p:sld xmlns:a="http://schemas.openxmlformats.org/drawingml/2006/main" xmlns:r="http://schemas.openxmlformats.org/officeDocument/2006/relationships" xmlns:p="http://schemas.openxmlformats.org/presentationml/2006/main">
-  <p:cSld>
-    <p:spTree>
-      <p:nvGrpSpPr>
-        <p:cNvPr id="1" name=""/>
-        <p:cNvGrpSpPr/>
-        <p:nvPr/>
-      </p:nvGrpSpPr>
-      <p:grpSpPr>
-        <a:xfrm>
-          <a:off x="0" y="0"/>
-          <a:ext cx="0" cy="0"/>
-          <a:chOff x="0" y="0"/>
-          <a:chExt cx="0" cy="0"/>
-        </a:xfrm>
-      </p:grpSpPr>
       <p:sp>
         <p:nvSpPr>
           <p:cNvPr id="2" name="Google Shape;274;p17"/>
@@ -12789,7 +12301,7 @@
 </p:sld>
 </file>
 
-<file path=ppt/slides/slide22.xml><?xml version="1.0" encoding="utf-8"?>
+<file path=ppt/slides/slide21.xml><?xml version="1.0" encoding="utf-8"?>
 <p:sld xmlns:a="http://schemas.openxmlformats.org/drawingml/2006/main" xmlns:r="http://schemas.openxmlformats.org/officeDocument/2006/relationships" xmlns:p="http://schemas.openxmlformats.org/presentationml/2006/main">
   <p:cSld>
     <p:spTree>
@@ -14210,7 +13722,7 @@
 </p:sld>
 </file>
 
-<file path=ppt/slides/slide23.xml><?xml version="1.0" encoding="utf-8"?>
+<file path=ppt/slides/slide22.xml><?xml version="1.0" encoding="utf-8"?>
 <p:sld xmlns:a="http://schemas.openxmlformats.org/drawingml/2006/main" xmlns:r="http://schemas.openxmlformats.org/officeDocument/2006/relationships" xmlns:p="http://schemas.openxmlformats.org/presentationml/2006/main">
   <p:cSld>
     <p:spTree>
@@ -14235,7 +13747,7 @@
         </p:nvSpPr>
         <p:spPr>
           <a:xfrm>
-            <a:off x="730405" y="696450"/>
+            <a:off x="730405" y="569103"/>
             <a:ext cx="8084634" cy="771900"/>
           </a:xfrm>
           <a:prstGeom prst="rect">
@@ -14279,51 +13791,1412 @@
           </a:p>
         </p:txBody>
       </p:sp>
+      <p:sp>
+        <p:nvSpPr>
+          <p:cNvPr id="3" name="CuadroTexto 2"/>
+          <p:cNvSpPr txBox="1"/>
+          <p:nvPr/>
+        </p:nvSpPr>
+        <p:spPr>
+          <a:xfrm>
+            <a:off x="2310372" y="1520602"/>
+            <a:ext cx="4924697" cy="300446"/>
+          </a:xfrm>
+          <a:prstGeom prst="rect">
+            <a:avLst/>
+          </a:prstGeom>
+        </p:spPr>
+        <p:txBody>
+          <a:bodyPr vert="horz" wrap="square" lIns="91440" tIns="45720" rIns="91440" bIns="45720" rtlCol="0" anchor="ctr">
+            <a:noAutofit/>
+          </a:bodyPr>
+          <a:lstStyle/>
+          <a:p>
+            <a:pPr algn="ctr"/>
+            <a:r>
+              <a:rPr lang="es-MX" sz="3200" b="1" dirty="0" smtClean="0">
+                <a:solidFill>
+                  <a:srgbClr val="92D050"/>
+                </a:solidFill>
+              </a:rPr>
+              <a:t>Gestión de productos</a:t>
+            </a:r>
+            <a:endParaRPr lang="es-MX" sz="3200" b="1" dirty="0" smtClean="0">
+              <a:solidFill>
+                <a:srgbClr val="92D050"/>
+              </a:solidFill>
+            </a:endParaRPr>
+          </a:p>
+          <a:p>
+            <a:pPr algn="ctr"/>
+            <a:endParaRPr lang="es-419" sz="3200" b="1" dirty="0" smtClean="0">
+              <a:solidFill>
+                <a:srgbClr val="92D050"/>
+              </a:solidFill>
+            </a:endParaRPr>
+          </a:p>
+        </p:txBody>
+      </p:sp>
       <p:pic>
         <p:nvPicPr>
-          <p:cNvPr id="3076" name="Picture 4" descr="https://lh6.googleusercontent.com/22-Hi1C9NJz3oosZwqsdmyHz8mJLZlokCXnOFdHJdK3vZFGVrm1_ecbYUpSgI1hAFLsX1qfrJ0qxL0U9LNlprOopV2xKVrjQPOY2jNUnVLF3jUcN6RpvLGVBOp_l9pauSZxgc-s"/>
+          <p:cNvPr id="4" name="Imagen 3"/>
           <p:cNvPicPr>
-            <a:picLocks noChangeAspect="1" noChangeArrowheads="1"/>
+            <a:picLocks noChangeAspect="1"/>
           </p:cNvPicPr>
           <p:nvPr/>
         </p:nvPicPr>
         <p:blipFill>
-          <a:blip r:embed="rId2">
-            <a:extLst>
-              <a:ext uri="{28A0092B-C50C-407E-A947-70E740481C1C}">
-                <a14:useLocalDpi xmlns:a14="http://schemas.microsoft.com/office/drawing/2010/main" val="0"/>
-              </a:ext>
-            </a:extLst>
-          </a:blip>
-          <a:srcRect/>
+          <a:blip r:embed="rId2"/>
           <a:stretch>
             <a:fillRect/>
           </a:stretch>
         </p:blipFill>
-        <p:spPr bwMode="auto">
+        <p:spPr>
           <a:xfrm>
-            <a:off x="120042" y="1854926"/>
-            <a:ext cx="9305359" cy="4402183"/>
+            <a:off x="-631643" y="2000647"/>
+            <a:ext cx="9645015" cy="4526908"/>
           </a:xfrm>
           <a:prstGeom prst="rect">
             <a:avLst/>
           </a:prstGeom>
-          <a:noFill/>
-          <a:extLst>
-            <a:ext uri="{909E8E84-426E-40DD-AFC4-6F175D3DCCD1}">
-              <a14:hiddenFill xmlns:a14="http://schemas.microsoft.com/office/drawing/2010/main">
-                <a:solidFill>
-                  <a:srgbClr val="FFFFFF"/>
-                </a:solidFill>
-              </a14:hiddenFill>
-            </a:ext>
-          </a:extLst>
         </p:spPr>
       </p:pic>
     </p:spTree>
     <p:extLst>
       <p:ext uri="{BB962C8B-B14F-4D97-AF65-F5344CB8AC3E}">
         <p14:creationId xmlns:p14="http://schemas.microsoft.com/office/powerpoint/2010/main" val="895490272"/>
+      </p:ext>
+    </p:extLst>
+  </p:cSld>
+  <p:clrMapOvr>
+    <a:masterClrMapping/>
+  </p:clrMapOvr>
+  <p:timing>
+    <p:tnLst>
+      <p:par>
+        <p:cTn id="1" dur="indefinite" restart="never" nodeType="tmRoot"/>
+      </p:par>
+    </p:tnLst>
+  </p:timing>
+</p:sld>
+</file>
+
+<file path=ppt/slides/slide23.xml><?xml version="1.0" encoding="utf-8"?>
+<p:sld xmlns:a="http://schemas.openxmlformats.org/drawingml/2006/main" xmlns:r="http://schemas.openxmlformats.org/officeDocument/2006/relationships" xmlns:p="http://schemas.openxmlformats.org/presentationml/2006/main">
+  <p:cSld>
+    <p:spTree>
+      <p:nvGrpSpPr>
+        <p:cNvPr id="1" name=""/>
+        <p:cNvGrpSpPr/>
+        <p:nvPr/>
+      </p:nvGrpSpPr>
+      <p:grpSpPr>
+        <a:xfrm>
+          <a:off x="0" y="0"/>
+          <a:ext cx="0" cy="0"/>
+          <a:chOff x="0" y="0"/>
+          <a:chExt cx="0" cy="0"/>
+        </a:xfrm>
+      </p:grpSpPr>
+      <p:graphicFrame>
+        <p:nvGraphicFramePr>
+          <p:cNvPr id="2" name="Tabla 1"/>
+          <p:cNvGraphicFramePr>
+            <a:graphicFrameLocks noGrp="1"/>
+          </p:cNvGraphicFramePr>
+          <p:nvPr>
+            <p:extLst>
+              <p:ext uri="{D42A27DB-BD31-4B8C-83A1-F6EECF244321}">
+                <p14:modId xmlns:p14="http://schemas.microsoft.com/office/powerpoint/2010/main" val="2001598522"/>
+              </p:ext>
+            </p:extLst>
+          </p:nvPr>
+        </p:nvGraphicFramePr>
+        <p:xfrm>
+          <a:off x="889149" y="1292771"/>
+          <a:ext cx="7716645" cy="5394213"/>
+        </p:xfrm>
+        <a:graphic>
+          <a:graphicData uri="http://schemas.openxmlformats.org/drawingml/2006/table">
+            <a:tbl>
+              <a:tblPr firstRow="1" firstCol="1" lastRow="1" lastCol="1" bandRow="1" bandCol="1"/>
+              <a:tblGrid>
+                <a:gridCol w="2740752">
+                  <a:extLst>
+                    <a:ext uri="{9D8B030D-6E8A-4147-A177-3AD203B41FA5}">
+                      <a16:colId xmlns:a16="http://schemas.microsoft.com/office/drawing/2014/main" val="4109426167"/>
+                    </a:ext>
+                  </a:extLst>
+                </a:gridCol>
+                <a:gridCol w="74831">
+                  <a:extLst>
+                    <a:ext uri="{9D8B030D-6E8A-4147-A177-3AD203B41FA5}">
+                      <a16:colId xmlns:a16="http://schemas.microsoft.com/office/drawing/2014/main" val="3019291819"/>
+                    </a:ext>
+                  </a:extLst>
+                </a:gridCol>
+                <a:gridCol w="4901062">
+                  <a:extLst>
+                    <a:ext uri="{9D8B030D-6E8A-4147-A177-3AD203B41FA5}">
+                      <a16:colId xmlns:a16="http://schemas.microsoft.com/office/drawing/2014/main" val="3142601985"/>
+                    </a:ext>
+                  </a:extLst>
+                </a:gridCol>
+              </a:tblGrid>
+              <a:tr h="1549390">
+                <a:tc>
+                  <a:txBody>
+                    <a:bodyPr/>
+                    <a:lstStyle/>
+                    <a:p>
+                      <a:pPr marL="67945">
+                        <a:spcBef>
+                          <a:spcPts val="220"/>
+                        </a:spcBef>
+                        <a:spcAft>
+                          <a:spcPts val="0"/>
+                        </a:spcAft>
+                      </a:pPr>
+                      <a:r>
+                        <a:rPr lang="es-ES" sz="1050">
+                          <a:effectLst/>
+                        </a:rPr>
+                        <a:t>Caso de uso N°05</a:t>
+                      </a:r>
+                      <a:endParaRPr lang="es-AR" sz="1050">
+                        <a:effectLst/>
+                        <a:latin typeface="Calibri" panose="020F0502020204030204" pitchFamily="34" charset="0"/>
+                        <a:ea typeface="Calibri" panose="020F0502020204030204" pitchFamily="34" charset="0"/>
+                        <a:cs typeface="Calibri" panose="020F0502020204030204" pitchFamily="34" charset="0"/>
+                      </a:endParaRPr>
+                    </a:p>
+                  </a:txBody>
+                  <a:tcPr marL="0" marR="0" marT="0" marB="0"/>
+                </a:tc>
+                <a:tc gridSpan="2">
+                  <a:txBody>
+                    <a:bodyPr/>
+                    <a:lstStyle/>
+                    <a:p>
+                      <a:pPr marL="68580" marR="1918335">
+                        <a:lnSpc>
+                          <a:spcPts val="1400"/>
+                        </a:lnSpc>
+                        <a:spcBef>
+                          <a:spcPts val="165"/>
+                        </a:spcBef>
+                        <a:spcAft>
+                          <a:spcPts val="0"/>
+                        </a:spcAft>
+                      </a:pPr>
+                      <a:r>
+                        <a:rPr lang="es-ES" sz="1050" dirty="0" smtClean="0">
+                          <a:effectLst/>
+                          <a:latin typeface="+mn-lt"/>
+                          <a:ea typeface="+mn-ea"/>
+                          <a:cs typeface="+mn-cs"/>
+                        </a:rPr>
+                        <a:t>GESTION</a:t>
+                      </a:r>
+                      <a:r>
+                        <a:rPr lang="es-ES" sz="1050" baseline="0" dirty="0" smtClean="0">
+                          <a:effectLst/>
+                          <a:latin typeface="+mn-lt"/>
+                          <a:ea typeface="+mn-ea"/>
+                          <a:cs typeface="+mn-cs"/>
+                        </a:rPr>
+                        <a:t> DE PRODCUTOS</a:t>
+                      </a:r>
+                      <a:endParaRPr lang="es-AR" sz="1050" dirty="0">
+                        <a:effectLst/>
+                        <a:latin typeface="Calibri" panose="020F0502020204030204" pitchFamily="34" charset="0"/>
+                        <a:ea typeface="Calibri" panose="020F0502020204030204" pitchFamily="34" charset="0"/>
+                        <a:cs typeface="Calibri" panose="020F0502020204030204" pitchFamily="34" charset="0"/>
+                      </a:endParaRPr>
+                    </a:p>
+                  </a:txBody>
+                  <a:tcPr marL="0" marR="0" marT="0" marB="0"/>
+                </a:tc>
+                <a:tc hMerge="1">
+                  <a:txBody>
+                    <a:bodyPr/>
+                    <a:lstStyle/>
+                    <a:p>
+                      <a:endParaRPr lang="es-AR"/>
+                    </a:p>
+                  </a:txBody>
+                  <a:tcPr/>
+                </a:tc>
+                <a:extLst>
+                  <a:ext uri="{0D108BD9-81ED-4DB2-BD59-A6C34878D82A}">
+                    <a16:rowId xmlns:a16="http://schemas.microsoft.com/office/drawing/2014/main" val="3368355944"/>
+                  </a:ext>
+                </a:extLst>
+              </a:tr>
+              <a:tr h="324819">
+                <a:tc>
+                  <a:txBody>
+                    <a:bodyPr/>
+                    <a:lstStyle/>
+                    <a:p>
+                      <a:pPr marL="67945">
+                        <a:spcBef>
+                          <a:spcPts val="210"/>
+                        </a:spcBef>
+                        <a:spcAft>
+                          <a:spcPts val="0"/>
+                        </a:spcAft>
+                      </a:pPr>
+                      <a:r>
+                        <a:rPr lang="es-ES" sz="1050">
+                          <a:effectLst/>
+                        </a:rPr>
+                        <a:t>Fecha:</a:t>
+                      </a:r>
+                      <a:endParaRPr lang="es-AR" sz="1050">
+                        <a:effectLst/>
+                      </a:endParaRPr>
+                    </a:p>
+                    <a:p>
+                      <a:pPr marL="67945">
+                        <a:spcBef>
+                          <a:spcPts val="110"/>
+                        </a:spcBef>
+                        <a:spcAft>
+                          <a:spcPts val="0"/>
+                        </a:spcAft>
+                      </a:pPr>
+                      <a:r>
+                        <a:rPr lang="es-ES" sz="1050">
+                          <a:effectLst/>
+                        </a:rPr>
+                        <a:t>23 de junio de 2019</a:t>
+                      </a:r>
+                      <a:endParaRPr lang="es-AR" sz="1050">
+                        <a:effectLst/>
+                        <a:latin typeface="Calibri" panose="020F0502020204030204" pitchFamily="34" charset="0"/>
+                        <a:ea typeface="Calibri" panose="020F0502020204030204" pitchFamily="34" charset="0"/>
+                        <a:cs typeface="Calibri" panose="020F0502020204030204" pitchFamily="34" charset="0"/>
+                      </a:endParaRPr>
+                    </a:p>
+                  </a:txBody>
+                  <a:tcPr marL="0" marR="0" marT="0" marB="0"/>
+                </a:tc>
+                <a:tc gridSpan="2">
+                  <a:txBody>
+                    <a:bodyPr/>
+                    <a:lstStyle/>
+                    <a:p>
+                      <a:pPr marL="68580">
+                        <a:spcBef>
+                          <a:spcPts val="940"/>
+                        </a:spcBef>
+                        <a:spcAft>
+                          <a:spcPts val="0"/>
+                        </a:spcAft>
+                      </a:pPr>
+                      <a:r>
+                        <a:rPr lang="es-ES" sz="1050" dirty="0">
+                          <a:effectLst/>
+                        </a:rPr>
+                        <a:t>ELABORADO POR: Richard </a:t>
+                      </a:r>
+                      <a:r>
+                        <a:rPr lang="es-ES" sz="1050" dirty="0" smtClean="0">
+                          <a:effectLst/>
+                        </a:rPr>
+                        <a:t>Barboza-</a:t>
+                      </a:r>
+                      <a:r>
+                        <a:rPr lang="es-ES" sz="1050" dirty="0" err="1" smtClean="0">
+                          <a:effectLst/>
+                        </a:rPr>
+                        <a:t>Nicolas</a:t>
+                      </a:r>
+                      <a:r>
+                        <a:rPr lang="es-ES" sz="1050" dirty="0" smtClean="0">
+                          <a:effectLst/>
+                        </a:rPr>
+                        <a:t> Ardila</a:t>
+                      </a:r>
+                      <a:endParaRPr lang="es-AR" sz="1050" dirty="0">
+                        <a:effectLst/>
+                        <a:latin typeface="Calibri" panose="020F0502020204030204" pitchFamily="34" charset="0"/>
+                        <a:ea typeface="Calibri" panose="020F0502020204030204" pitchFamily="34" charset="0"/>
+                        <a:cs typeface="Calibri" panose="020F0502020204030204" pitchFamily="34" charset="0"/>
+                      </a:endParaRPr>
+                    </a:p>
+                  </a:txBody>
+                  <a:tcPr marL="0" marR="0" marT="0" marB="0"/>
+                </a:tc>
+                <a:tc hMerge="1">
+                  <a:txBody>
+                    <a:bodyPr/>
+                    <a:lstStyle/>
+                    <a:p>
+                      <a:endParaRPr lang="es-AR"/>
+                    </a:p>
+                  </a:txBody>
+                  <a:tcPr/>
+                </a:tc>
+                <a:extLst>
+                  <a:ext uri="{0D108BD9-81ED-4DB2-BD59-A6C34878D82A}">
+                    <a16:rowId xmlns:a16="http://schemas.microsoft.com/office/drawing/2014/main" val="3626453775"/>
+                  </a:ext>
+                </a:extLst>
+              </a:tr>
+              <a:tr h="156211">
+                <a:tc>
+                  <a:txBody>
+                    <a:bodyPr/>
+                    <a:lstStyle/>
+                    <a:p>
+                      <a:pPr marL="67945">
+                        <a:spcBef>
+                          <a:spcPts val="210"/>
+                        </a:spcBef>
+                        <a:spcAft>
+                          <a:spcPts val="0"/>
+                        </a:spcAft>
+                      </a:pPr>
+                      <a:r>
+                        <a:rPr lang="es-ES" sz="1050">
+                          <a:effectLst/>
+                        </a:rPr>
+                        <a:t>ACTORES</a:t>
+                      </a:r>
+                      <a:endParaRPr lang="es-AR" sz="1050">
+                        <a:effectLst/>
+                        <a:latin typeface="Calibri" panose="020F0502020204030204" pitchFamily="34" charset="0"/>
+                        <a:ea typeface="Calibri" panose="020F0502020204030204" pitchFamily="34" charset="0"/>
+                        <a:cs typeface="Calibri" panose="020F0502020204030204" pitchFamily="34" charset="0"/>
+                      </a:endParaRPr>
+                    </a:p>
+                  </a:txBody>
+                  <a:tcPr marL="0" marR="0" marT="0" marB="0"/>
+                </a:tc>
+                <a:tc gridSpan="2">
+                  <a:txBody>
+                    <a:bodyPr/>
+                    <a:lstStyle/>
+                    <a:p>
+                      <a:pPr marL="68580">
+                        <a:spcBef>
+                          <a:spcPts val="210"/>
+                        </a:spcBef>
+                        <a:spcAft>
+                          <a:spcPts val="0"/>
+                        </a:spcAft>
+                      </a:pPr>
+                      <a:r>
+                        <a:rPr lang="es-ES" sz="1050" dirty="0">
+                          <a:effectLst/>
+                        </a:rPr>
+                        <a:t>Administrador.</a:t>
+                      </a:r>
+                      <a:endParaRPr lang="es-AR" sz="1050" dirty="0">
+                        <a:effectLst/>
+                        <a:latin typeface="Calibri" panose="020F0502020204030204" pitchFamily="34" charset="0"/>
+                        <a:ea typeface="Calibri" panose="020F0502020204030204" pitchFamily="34" charset="0"/>
+                        <a:cs typeface="Calibri" panose="020F0502020204030204" pitchFamily="34" charset="0"/>
+                      </a:endParaRPr>
+                    </a:p>
+                  </a:txBody>
+                  <a:tcPr marL="0" marR="0" marT="0" marB="0"/>
+                </a:tc>
+                <a:tc hMerge="1">
+                  <a:txBody>
+                    <a:bodyPr/>
+                    <a:lstStyle/>
+                    <a:p>
+                      <a:endParaRPr lang="es-AR"/>
+                    </a:p>
+                  </a:txBody>
+                  <a:tcPr/>
+                </a:tc>
+                <a:extLst>
+                  <a:ext uri="{0D108BD9-81ED-4DB2-BD59-A6C34878D82A}">
+                    <a16:rowId xmlns:a16="http://schemas.microsoft.com/office/drawing/2014/main" val="1820231986"/>
+                  </a:ext>
+                </a:extLst>
+              </a:tr>
+              <a:tr h="322679">
+                <a:tc>
+                  <a:txBody>
+                    <a:bodyPr/>
+                    <a:lstStyle/>
+                    <a:p>
+                      <a:pPr marL="67945">
+                        <a:spcBef>
+                          <a:spcPts val="210"/>
+                        </a:spcBef>
+                        <a:spcAft>
+                          <a:spcPts val="0"/>
+                        </a:spcAft>
+                      </a:pPr>
+                      <a:r>
+                        <a:rPr lang="es-ES" sz="1050">
+                          <a:effectLst/>
+                        </a:rPr>
+                        <a:t>OBJETIVO</a:t>
+                      </a:r>
+                      <a:endParaRPr lang="es-AR" sz="1050">
+                        <a:effectLst/>
+                        <a:latin typeface="Calibri" panose="020F0502020204030204" pitchFamily="34" charset="0"/>
+                        <a:ea typeface="Calibri" panose="020F0502020204030204" pitchFamily="34" charset="0"/>
+                        <a:cs typeface="Calibri" panose="020F0502020204030204" pitchFamily="34" charset="0"/>
+                      </a:endParaRPr>
+                    </a:p>
+                  </a:txBody>
+                  <a:tcPr marL="0" marR="0" marT="0" marB="0"/>
+                </a:tc>
+                <a:tc gridSpan="2">
+                  <a:txBody>
+                    <a:bodyPr/>
+                    <a:lstStyle/>
+                    <a:p>
+                      <a:pPr marL="342900" lvl="0" indent="-342900">
+                        <a:spcBef>
+                          <a:spcPts val="210"/>
+                        </a:spcBef>
+                        <a:spcAft>
+                          <a:spcPts val="0"/>
+                        </a:spcAft>
+                        <a:buFont typeface="Symbol" panose="05050102010706020507" pitchFamily="18" charset="2"/>
+                        <a:buChar char=""/>
+                      </a:pPr>
+                      <a:r>
+                        <a:rPr lang="es-ES" sz="1050" dirty="0" smtClean="0">
+                          <a:effectLst/>
+                        </a:rPr>
+                        <a:t>Agregar,eliminar,actualizar,prestar</a:t>
+                      </a:r>
+                      <a:r>
+                        <a:rPr lang="es-ES" sz="1050" baseline="0" dirty="0" smtClean="0">
+                          <a:effectLst/>
+                        </a:rPr>
+                        <a:t> o consultar </a:t>
+                      </a:r>
+                      <a:r>
+                        <a:rPr lang="es-ES" sz="1050" dirty="0" smtClean="0">
+                          <a:effectLst/>
+                        </a:rPr>
+                        <a:t> </a:t>
+                      </a:r>
+                      <a:r>
+                        <a:rPr lang="es-ES" sz="1050" dirty="0">
+                          <a:effectLst/>
+                        </a:rPr>
+                        <a:t>un artículo </a:t>
+                      </a:r>
+                      <a:r>
+                        <a:rPr lang="es-ES" sz="1050" dirty="0" smtClean="0">
+                          <a:effectLst/>
+                        </a:rPr>
+                        <a:t>del</a:t>
+                      </a:r>
+                      <a:r>
+                        <a:rPr lang="es-ES" sz="1050" baseline="0" dirty="0" smtClean="0">
+                          <a:effectLst/>
+                        </a:rPr>
+                        <a:t> </a:t>
+                      </a:r>
+                      <a:r>
+                        <a:rPr lang="es-ES" sz="1050" dirty="0" smtClean="0">
+                          <a:effectLst/>
+                        </a:rPr>
+                        <a:t>inventario </a:t>
+                      </a:r>
+                      <a:r>
+                        <a:rPr lang="es-ES" sz="1050" dirty="0">
+                          <a:effectLst/>
+                        </a:rPr>
+                        <a:t>del sistema.</a:t>
+                      </a:r>
+                      <a:endParaRPr lang="es-AR" sz="1050" dirty="0">
+                        <a:effectLst/>
+                        <a:latin typeface="Calibri" panose="020F0502020204030204" pitchFamily="34" charset="0"/>
+                        <a:ea typeface="Calibri" panose="020F0502020204030204" pitchFamily="34" charset="0"/>
+                        <a:cs typeface="Calibri" panose="020F0502020204030204" pitchFamily="34" charset="0"/>
+                      </a:endParaRPr>
+                    </a:p>
+                  </a:txBody>
+                  <a:tcPr marL="0" marR="0" marT="0" marB="0"/>
+                </a:tc>
+                <a:tc hMerge="1">
+                  <a:txBody>
+                    <a:bodyPr/>
+                    <a:lstStyle/>
+                    <a:p>
+                      <a:endParaRPr lang="es-AR"/>
+                    </a:p>
+                  </a:txBody>
+                  <a:tcPr/>
+                </a:tc>
+                <a:extLst>
+                  <a:ext uri="{0D108BD9-81ED-4DB2-BD59-A6C34878D82A}">
+                    <a16:rowId xmlns:a16="http://schemas.microsoft.com/office/drawing/2014/main" val="51410399"/>
+                  </a:ext>
+                </a:extLst>
+              </a:tr>
+              <a:tr h="712619">
+                <a:tc>
+                  <a:txBody>
+                    <a:bodyPr/>
+                    <a:lstStyle/>
+                    <a:p>
+                      <a:pPr marL="67945">
+                        <a:spcBef>
+                          <a:spcPts val="220"/>
+                        </a:spcBef>
+                        <a:spcAft>
+                          <a:spcPts val="0"/>
+                        </a:spcAft>
+                      </a:pPr>
+                      <a:r>
+                        <a:rPr lang="es-ES" sz="1050">
+                          <a:effectLst/>
+                        </a:rPr>
+                        <a:t>PRECONDICIONES</a:t>
+                      </a:r>
+                      <a:endParaRPr lang="es-AR" sz="1050">
+                        <a:effectLst/>
+                        <a:latin typeface="Calibri" panose="020F0502020204030204" pitchFamily="34" charset="0"/>
+                        <a:ea typeface="Calibri" panose="020F0502020204030204" pitchFamily="34" charset="0"/>
+                        <a:cs typeface="Calibri" panose="020F0502020204030204" pitchFamily="34" charset="0"/>
+                      </a:endParaRPr>
+                    </a:p>
+                  </a:txBody>
+                  <a:tcPr marL="0" marR="0" marT="0" marB="0"/>
+                </a:tc>
+                <a:tc gridSpan="2">
+                  <a:txBody>
+                    <a:bodyPr/>
+                    <a:lstStyle/>
+                    <a:p>
+                      <a:pPr marL="342900" lvl="0" indent="-342900">
+                        <a:spcBef>
+                          <a:spcPts val="220"/>
+                        </a:spcBef>
+                        <a:spcAft>
+                          <a:spcPts val="0"/>
+                        </a:spcAft>
+                        <a:buFont typeface="Symbol" panose="05050102010706020507" pitchFamily="18" charset="2"/>
+                        <a:buChar char=""/>
+                        <a:tabLst>
+                          <a:tab pos="525780" algn="l"/>
+                          <a:tab pos="526415" algn="l"/>
+                        </a:tabLst>
+                      </a:pPr>
+                      <a:r>
+                        <a:rPr lang="es-ES" sz="1050" dirty="0">
+                          <a:effectLst/>
+                        </a:rPr>
+                        <a:t>El Administrador debe estar registrado en el</a:t>
+                      </a:r>
+                      <a:r>
+                        <a:rPr lang="es-ES" sz="1050" spc="-25" dirty="0">
+                          <a:effectLst/>
+                        </a:rPr>
+                        <a:t> </a:t>
+                      </a:r>
+                      <a:r>
+                        <a:rPr lang="es-ES" sz="1050" dirty="0">
+                          <a:effectLst/>
+                        </a:rPr>
+                        <a:t>sistema.</a:t>
+                      </a:r>
+                      <a:endParaRPr lang="es-AR" sz="1050" dirty="0">
+                        <a:effectLst/>
+                      </a:endParaRPr>
+                    </a:p>
+                    <a:p>
+                      <a:pPr marL="342900" lvl="0" indent="-342900">
+                        <a:spcBef>
+                          <a:spcPts val="320"/>
+                        </a:spcBef>
+                        <a:spcAft>
+                          <a:spcPts val="0"/>
+                        </a:spcAft>
+                        <a:buFont typeface="Symbol" panose="05050102010706020507" pitchFamily="18" charset="2"/>
+                        <a:buChar char=""/>
+                        <a:tabLst>
+                          <a:tab pos="525780" algn="l"/>
+                          <a:tab pos="526415" algn="l"/>
+                        </a:tabLst>
+                      </a:pPr>
+                      <a:r>
+                        <a:rPr lang="es-ES" sz="1050" dirty="0">
+                          <a:effectLst/>
+                        </a:rPr>
+                        <a:t>El Administrador debe haber iniciado sesión en el</a:t>
+                      </a:r>
+                      <a:r>
+                        <a:rPr lang="es-ES" sz="1050" spc="-60" dirty="0">
+                          <a:effectLst/>
+                        </a:rPr>
+                        <a:t> </a:t>
+                      </a:r>
+                      <a:r>
+                        <a:rPr lang="es-ES" sz="1050" dirty="0">
+                          <a:effectLst/>
+                        </a:rPr>
+                        <a:t>sistema.</a:t>
+                      </a:r>
+                      <a:endParaRPr lang="es-AR" sz="1050" dirty="0">
+                        <a:effectLst/>
+                      </a:endParaRPr>
+                    </a:p>
+                    <a:p>
+                      <a:pPr marL="342900" marR="417195" lvl="0" indent="-342900">
+                        <a:lnSpc>
+                          <a:spcPct val="107000"/>
+                        </a:lnSpc>
+                        <a:spcBef>
+                          <a:spcPts val="290"/>
+                        </a:spcBef>
+                        <a:spcAft>
+                          <a:spcPts val="0"/>
+                        </a:spcAft>
+                        <a:buFont typeface="Symbol" panose="05050102010706020507" pitchFamily="18" charset="2"/>
+                        <a:buChar char=""/>
+                        <a:tabLst>
+                          <a:tab pos="525780" algn="l"/>
+                          <a:tab pos="526415" algn="l"/>
+                        </a:tabLst>
+                      </a:pPr>
+                      <a:r>
+                        <a:rPr lang="es-ES" sz="1050" dirty="0">
+                          <a:effectLst/>
+                        </a:rPr>
+                        <a:t>El sistema proveerá al </a:t>
+                      </a:r>
+                      <a:r>
+                        <a:rPr lang="es-ES" sz="1050" dirty="0" smtClean="0">
+                          <a:effectLst/>
+                        </a:rPr>
+                        <a:t>Administrador</a:t>
+                      </a:r>
+                      <a:r>
+                        <a:rPr lang="es-ES" sz="1050" baseline="0" dirty="0" smtClean="0">
+                          <a:effectLst/>
+                        </a:rPr>
+                        <a:t> un modulo con las opciones de la gestión de productos.</a:t>
+                      </a:r>
+                      <a:endParaRPr lang="es-AR" sz="1050" dirty="0">
+                        <a:effectLst/>
+                        <a:latin typeface="Calibri" panose="020F0502020204030204" pitchFamily="34" charset="0"/>
+                        <a:ea typeface="Calibri" panose="020F0502020204030204" pitchFamily="34" charset="0"/>
+                        <a:cs typeface="Calibri" panose="020F0502020204030204" pitchFamily="34" charset="0"/>
+                      </a:endParaRPr>
+                    </a:p>
+                  </a:txBody>
+                  <a:tcPr marL="0" marR="0" marT="0" marB="0"/>
+                </a:tc>
+                <a:tc hMerge="1">
+                  <a:txBody>
+                    <a:bodyPr/>
+                    <a:lstStyle/>
+                    <a:p>
+                      <a:endParaRPr lang="es-AR"/>
+                    </a:p>
+                  </a:txBody>
+                  <a:tcPr/>
+                </a:tc>
+                <a:extLst>
+                  <a:ext uri="{0D108BD9-81ED-4DB2-BD59-A6C34878D82A}">
+                    <a16:rowId xmlns:a16="http://schemas.microsoft.com/office/drawing/2014/main" val="1113057777"/>
+                  </a:ext>
+                </a:extLst>
+              </a:tr>
+              <a:tr h="220652">
+                <a:tc>
+                  <a:txBody>
+                    <a:bodyPr/>
+                    <a:lstStyle/>
+                    <a:p>
+                      <a:pPr marL="67945">
+                        <a:spcBef>
+                          <a:spcPts val="210"/>
+                        </a:spcBef>
+                        <a:spcAft>
+                          <a:spcPts val="0"/>
+                        </a:spcAft>
+                      </a:pPr>
+                      <a:r>
+                        <a:rPr lang="es-ES" sz="1050">
+                          <a:effectLst/>
+                        </a:rPr>
+                        <a:t>POSCONDICIONES</a:t>
+                      </a:r>
+                      <a:endParaRPr lang="es-AR" sz="1050">
+                        <a:effectLst/>
+                        <a:latin typeface="Calibri" panose="020F0502020204030204" pitchFamily="34" charset="0"/>
+                        <a:ea typeface="Calibri" panose="020F0502020204030204" pitchFamily="34" charset="0"/>
+                        <a:cs typeface="Calibri" panose="020F0502020204030204" pitchFamily="34" charset="0"/>
+                      </a:endParaRPr>
+                    </a:p>
+                  </a:txBody>
+                  <a:tcPr marL="0" marR="0" marT="0" marB="0"/>
+                </a:tc>
+                <a:tc gridSpan="2">
+                  <a:txBody>
+                    <a:bodyPr/>
+                    <a:lstStyle/>
+                    <a:p>
+                      <a:pPr marL="342900" marR="367030" lvl="0" indent="-342900">
+                        <a:spcBef>
+                          <a:spcPts val="225"/>
+                        </a:spcBef>
+                        <a:spcAft>
+                          <a:spcPts val="0"/>
+                        </a:spcAft>
+                        <a:buFont typeface="Symbol" panose="05050102010706020507" pitchFamily="18" charset="2"/>
+                        <a:buChar char=""/>
+                      </a:pPr>
+                      <a:r>
+                        <a:rPr lang="es-ES" sz="1050">
+                          <a:effectLst/>
+                        </a:rPr>
+                        <a:t>El usuario podrá agregar un artículo al inventario del sistema.</a:t>
+                      </a:r>
+                      <a:endParaRPr lang="es-AR" sz="1050">
+                        <a:effectLst/>
+                        <a:latin typeface="Calibri" panose="020F0502020204030204" pitchFamily="34" charset="0"/>
+                        <a:ea typeface="Calibri" panose="020F0502020204030204" pitchFamily="34" charset="0"/>
+                        <a:cs typeface="Calibri" panose="020F0502020204030204" pitchFamily="34" charset="0"/>
+                      </a:endParaRPr>
+                    </a:p>
+                  </a:txBody>
+                  <a:tcPr marL="0" marR="0" marT="0" marB="0"/>
+                </a:tc>
+                <a:tc hMerge="1">
+                  <a:txBody>
+                    <a:bodyPr/>
+                    <a:lstStyle/>
+                    <a:p>
+                      <a:endParaRPr lang="es-AR"/>
+                    </a:p>
+                  </a:txBody>
+                  <a:tcPr/>
+                </a:tc>
+                <a:extLst>
+                  <a:ext uri="{0D108BD9-81ED-4DB2-BD59-A6C34878D82A}">
+                    <a16:rowId xmlns:a16="http://schemas.microsoft.com/office/drawing/2014/main" val="856707442"/>
+                  </a:ext>
+                </a:extLst>
+              </a:tr>
+              <a:tr h="156211">
+                <a:tc gridSpan="3">
+                  <a:txBody>
+                    <a:bodyPr/>
+                    <a:lstStyle/>
+                    <a:p>
+                      <a:pPr marL="67945" algn="ctr">
+                        <a:spcBef>
+                          <a:spcPts val="210"/>
+                        </a:spcBef>
+                        <a:spcAft>
+                          <a:spcPts val="0"/>
+                        </a:spcAft>
+                      </a:pPr>
+                      <a:r>
+                        <a:rPr lang="es-ES" sz="1050">
+                          <a:effectLst/>
+                        </a:rPr>
+                        <a:t>FLUJO DE EVENTOS</a:t>
+                      </a:r>
+                      <a:endParaRPr lang="es-AR" sz="1050">
+                        <a:effectLst/>
+                        <a:latin typeface="Calibri" panose="020F0502020204030204" pitchFamily="34" charset="0"/>
+                        <a:ea typeface="Calibri" panose="020F0502020204030204" pitchFamily="34" charset="0"/>
+                        <a:cs typeface="Calibri" panose="020F0502020204030204" pitchFamily="34" charset="0"/>
+                      </a:endParaRPr>
+                    </a:p>
+                  </a:txBody>
+                  <a:tcPr marL="0" marR="0" marT="0" marB="0"/>
+                </a:tc>
+                <a:tc hMerge="1">
+                  <a:txBody>
+                    <a:bodyPr/>
+                    <a:lstStyle/>
+                    <a:p>
+                      <a:endParaRPr lang="es-AR"/>
+                    </a:p>
+                  </a:txBody>
+                  <a:tcPr/>
+                </a:tc>
+                <a:tc hMerge="1">
+                  <a:txBody>
+                    <a:bodyPr/>
+                    <a:lstStyle/>
+                    <a:p>
+                      <a:endParaRPr lang="es-AR"/>
+                    </a:p>
+                  </a:txBody>
+                  <a:tcPr/>
+                </a:tc>
+                <a:extLst>
+                  <a:ext uri="{0D108BD9-81ED-4DB2-BD59-A6C34878D82A}">
+                    <a16:rowId xmlns:a16="http://schemas.microsoft.com/office/drawing/2014/main" val="941261319"/>
+                  </a:ext>
+                </a:extLst>
+              </a:tr>
+              <a:tr h="156211">
+                <a:tc gridSpan="2">
+                  <a:txBody>
+                    <a:bodyPr/>
+                    <a:lstStyle/>
+                    <a:p>
+                      <a:pPr marL="67945">
+                        <a:spcBef>
+                          <a:spcPts val="210"/>
+                        </a:spcBef>
+                        <a:spcAft>
+                          <a:spcPts val="0"/>
+                        </a:spcAft>
+                      </a:pPr>
+                      <a:r>
+                        <a:rPr lang="es-ES" sz="1050">
+                          <a:effectLst/>
+                        </a:rPr>
+                        <a:t>ACCION DEL ACTOR</a:t>
+                      </a:r>
+                      <a:endParaRPr lang="es-AR" sz="1050">
+                        <a:effectLst/>
+                        <a:latin typeface="Calibri" panose="020F0502020204030204" pitchFamily="34" charset="0"/>
+                        <a:ea typeface="Calibri" panose="020F0502020204030204" pitchFamily="34" charset="0"/>
+                        <a:cs typeface="Calibri" panose="020F0502020204030204" pitchFamily="34" charset="0"/>
+                      </a:endParaRPr>
+                    </a:p>
+                  </a:txBody>
+                  <a:tcPr marL="0" marR="0" marT="0" marB="0"/>
+                </a:tc>
+                <a:tc hMerge="1">
+                  <a:txBody>
+                    <a:bodyPr/>
+                    <a:lstStyle/>
+                    <a:p>
+                      <a:endParaRPr lang="es-AR"/>
+                    </a:p>
+                  </a:txBody>
+                  <a:tcPr/>
+                </a:tc>
+                <a:tc>
+                  <a:txBody>
+                    <a:bodyPr/>
+                    <a:lstStyle/>
+                    <a:p>
+                      <a:pPr marL="68580">
+                        <a:spcBef>
+                          <a:spcPts val="210"/>
+                        </a:spcBef>
+                        <a:spcAft>
+                          <a:spcPts val="0"/>
+                        </a:spcAft>
+                      </a:pPr>
+                      <a:r>
+                        <a:rPr lang="es-ES" sz="1050">
+                          <a:effectLst/>
+                        </a:rPr>
+                        <a:t>RESPUESTA DEL SISTEMA</a:t>
+                      </a:r>
+                      <a:endParaRPr lang="es-AR" sz="1050">
+                        <a:effectLst/>
+                        <a:latin typeface="Calibri" panose="020F0502020204030204" pitchFamily="34" charset="0"/>
+                        <a:ea typeface="Calibri" panose="020F0502020204030204" pitchFamily="34" charset="0"/>
+                        <a:cs typeface="Calibri" panose="020F0502020204030204" pitchFamily="34" charset="0"/>
+                      </a:endParaRPr>
+                    </a:p>
+                  </a:txBody>
+                  <a:tcPr marL="0" marR="0" marT="0" marB="0"/>
+                </a:tc>
+                <a:extLst>
+                  <a:ext uri="{0D108BD9-81ED-4DB2-BD59-A6C34878D82A}">
+                    <a16:rowId xmlns:a16="http://schemas.microsoft.com/office/drawing/2014/main" val="4272305014"/>
+                  </a:ext>
+                </a:extLst>
+              </a:tr>
+              <a:tr h="686707">
+                <a:tc gridSpan="2">
+                  <a:txBody>
+                    <a:bodyPr/>
+                    <a:lstStyle/>
+                    <a:p>
+                      <a:pPr marL="67945">
+                        <a:spcBef>
+                          <a:spcPts val="210"/>
+                        </a:spcBef>
+                        <a:spcAft>
+                          <a:spcPts val="0"/>
+                        </a:spcAft>
+                      </a:pPr>
+                      <a:r>
+                        <a:rPr lang="es-ES" sz="1050" dirty="0">
+                          <a:effectLst/>
+                        </a:rPr>
+                        <a:t>1. Ingresar al módulo de Ingresar nuevo Producto/Artículo.</a:t>
+                      </a:r>
+                      <a:endParaRPr lang="es-AR" sz="1050" dirty="0">
+                        <a:effectLst/>
+                      </a:endParaRPr>
+                    </a:p>
+                    <a:p>
+                      <a:pPr marL="67945">
+                        <a:lnSpc>
+                          <a:spcPts val="1340"/>
+                        </a:lnSpc>
+                        <a:spcBef>
+                          <a:spcPts val="210"/>
+                        </a:spcBef>
+                        <a:spcAft>
+                          <a:spcPts val="0"/>
+                        </a:spcAft>
+                        <a:tabLst>
+                          <a:tab pos="302260" algn="l"/>
+                        </a:tabLst>
+                      </a:pPr>
+                      <a:r>
+                        <a:rPr lang="es-ES" sz="1050" dirty="0" smtClean="0">
+                          <a:effectLst/>
+                        </a:rPr>
+                        <a:t>3.Ingresar </a:t>
+                      </a:r>
+                      <a:r>
+                        <a:rPr lang="es-ES" sz="1050" dirty="0">
+                          <a:effectLst/>
+                        </a:rPr>
+                        <a:t>información del</a:t>
+                      </a:r>
+                      <a:r>
+                        <a:rPr lang="es-ES" sz="1050" spc="-15" dirty="0">
+                          <a:effectLst/>
+                        </a:rPr>
+                        <a:t> </a:t>
+                      </a:r>
+                      <a:r>
+                        <a:rPr lang="es-ES" sz="1050" dirty="0">
+                          <a:effectLst/>
+                        </a:rPr>
+                        <a:t>Producto.</a:t>
+                      </a:r>
+                      <a:endParaRPr lang="es-AR" sz="1050" dirty="0">
+                        <a:effectLst/>
+                        <a:latin typeface="Calibri" panose="020F0502020204030204" pitchFamily="34" charset="0"/>
+                        <a:ea typeface="Calibri" panose="020F0502020204030204" pitchFamily="34" charset="0"/>
+                        <a:cs typeface="Calibri" panose="020F0502020204030204" pitchFamily="34" charset="0"/>
+                      </a:endParaRPr>
+                    </a:p>
+                  </a:txBody>
+                  <a:tcPr marL="0" marR="0" marT="0" marB="0"/>
+                </a:tc>
+                <a:tc hMerge="1">
+                  <a:txBody>
+                    <a:bodyPr/>
+                    <a:lstStyle/>
+                    <a:p>
+                      <a:endParaRPr lang="es-AR"/>
+                    </a:p>
+                  </a:txBody>
+                  <a:tcPr/>
+                </a:tc>
+                <a:tc>
+                  <a:txBody>
+                    <a:bodyPr/>
+                    <a:lstStyle/>
+                    <a:p>
+                      <a:pPr marL="68580">
+                        <a:spcBef>
+                          <a:spcPts val="210"/>
+                        </a:spcBef>
+                        <a:spcAft>
+                          <a:spcPts val="0"/>
+                        </a:spcAft>
+                      </a:pPr>
+                      <a:r>
+                        <a:rPr lang="es-ES" sz="1050" dirty="0">
+                          <a:effectLst/>
+                        </a:rPr>
+                        <a:t>2. Carga un formulario para la creación de artículos.</a:t>
+                      </a:r>
+                      <a:endParaRPr lang="es-AR" sz="1050" dirty="0">
+                        <a:effectLst/>
+                      </a:endParaRPr>
+                    </a:p>
+                    <a:p>
+                      <a:pPr marL="342900" lvl="0" indent="-342900">
+                        <a:lnSpc>
+                          <a:spcPts val="1335"/>
+                        </a:lnSpc>
+                        <a:spcBef>
+                          <a:spcPts val="210"/>
+                        </a:spcBef>
+                        <a:spcAft>
+                          <a:spcPts val="0"/>
+                        </a:spcAft>
+                        <a:buSzPts val="1100"/>
+                        <a:buFont typeface="Calibri" panose="020F0502020204030204" pitchFamily="34" charset="0"/>
+                        <a:buAutoNum type="arabicPeriod" startAt="4"/>
+                        <a:tabLst>
+                          <a:tab pos="518795" algn="l"/>
+                          <a:tab pos="519430" algn="l"/>
+                        </a:tabLst>
+                      </a:pPr>
+                      <a:r>
+                        <a:rPr lang="es-ES" sz="1050" dirty="0">
+                          <a:effectLst/>
+                        </a:rPr>
+                        <a:t>Valida información</a:t>
+                      </a:r>
+                      <a:r>
+                        <a:rPr lang="es-ES" sz="1050" spc="-25" dirty="0">
+                          <a:effectLst/>
+                        </a:rPr>
+                        <a:t> </a:t>
+                      </a:r>
+                      <a:r>
+                        <a:rPr lang="es-ES" sz="1050" dirty="0">
+                          <a:effectLst/>
+                        </a:rPr>
+                        <a:t>ingresada.</a:t>
+                      </a:r>
+                      <a:endParaRPr lang="es-AR" sz="1050" dirty="0">
+                        <a:effectLst/>
+                      </a:endParaRPr>
+                    </a:p>
+                    <a:p>
+                      <a:pPr marL="342900" lvl="0" indent="-342900">
+                        <a:spcBef>
+                          <a:spcPts val="110"/>
+                        </a:spcBef>
+                        <a:spcAft>
+                          <a:spcPts val="0"/>
+                        </a:spcAft>
+                        <a:buSzPts val="1100"/>
+                        <a:buFont typeface="Calibri" panose="020F0502020204030204" pitchFamily="34" charset="0"/>
+                        <a:buAutoNum type="arabicPeriod" startAt="4"/>
+                        <a:tabLst>
+                          <a:tab pos="518795" algn="l"/>
+                          <a:tab pos="519430" algn="l"/>
+                        </a:tabLst>
+                      </a:pPr>
+                      <a:r>
+                        <a:rPr lang="es-ES" sz="1050" dirty="0">
+                          <a:effectLst/>
+                        </a:rPr>
+                        <a:t>Almacena la</a:t>
+                      </a:r>
+                      <a:r>
+                        <a:rPr lang="es-ES" sz="1050" spc="-20" dirty="0">
+                          <a:effectLst/>
+                        </a:rPr>
+                        <a:t> </a:t>
+                      </a:r>
+                      <a:r>
+                        <a:rPr lang="es-ES" sz="1050" dirty="0">
+                          <a:effectLst/>
+                        </a:rPr>
+                        <a:t>información.</a:t>
+                      </a:r>
+                      <a:endParaRPr lang="es-AR" sz="1050" dirty="0">
+                        <a:effectLst/>
+                      </a:endParaRPr>
+                    </a:p>
+                    <a:p>
+                      <a:pPr marL="342900" marR="537210" lvl="0" indent="-342900">
+                        <a:lnSpc>
+                          <a:spcPts val="1400"/>
+                        </a:lnSpc>
+                        <a:spcBef>
+                          <a:spcPts val="50"/>
+                        </a:spcBef>
+                        <a:spcAft>
+                          <a:spcPts val="0"/>
+                        </a:spcAft>
+                        <a:buSzPts val="1100"/>
+                        <a:buFont typeface="Calibri" panose="020F0502020204030204" pitchFamily="34" charset="0"/>
+                        <a:buAutoNum type="arabicPeriod" startAt="4"/>
+                        <a:tabLst>
+                          <a:tab pos="518795" algn="l"/>
+                          <a:tab pos="519430" algn="l"/>
+                        </a:tabLst>
+                      </a:pPr>
+                      <a:r>
+                        <a:rPr lang="es-ES" sz="1050" dirty="0">
+                          <a:effectLst/>
+                        </a:rPr>
+                        <a:t>Notifica al usuario el estado de la operación (exitosa o</a:t>
+                      </a:r>
+                      <a:r>
+                        <a:rPr lang="es-ES" sz="1050" spc="-20" dirty="0">
+                          <a:effectLst/>
+                        </a:rPr>
+                        <a:t> </a:t>
+                      </a:r>
+                      <a:r>
+                        <a:rPr lang="es-ES" sz="1050" dirty="0">
+                          <a:effectLst/>
+                        </a:rPr>
+                        <a:t>fallida).</a:t>
+                      </a:r>
+                      <a:endParaRPr lang="es-AR" sz="1050" dirty="0">
+                        <a:effectLst/>
+                        <a:latin typeface="Calibri" panose="020F0502020204030204" pitchFamily="34" charset="0"/>
+                        <a:ea typeface="Calibri" panose="020F0502020204030204" pitchFamily="34" charset="0"/>
+                        <a:cs typeface="Calibri" panose="020F0502020204030204" pitchFamily="34" charset="0"/>
+                      </a:endParaRPr>
+                    </a:p>
+                  </a:txBody>
+                  <a:tcPr marL="0" marR="0" marT="0" marB="0"/>
+                </a:tc>
+                <a:extLst>
+                  <a:ext uri="{0D108BD9-81ED-4DB2-BD59-A6C34878D82A}">
+                    <a16:rowId xmlns:a16="http://schemas.microsoft.com/office/drawing/2014/main" val="899692863"/>
+                  </a:ext>
+                </a:extLst>
+              </a:tr>
+              <a:tr h="1011651">
+                <a:tc gridSpan="3">
+                  <a:txBody>
+                    <a:bodyPr/>
+                    <a:lstStyle/>
+                    <a:p>
+                      <a:pPr marL="67945">
+                        <a:spcBef>
+                          <a:spcPts val="220"/>
+                        </a:spcBef>
+                        <a:spcAft>
+                          <a:spcPts val="0"/>
+                        </a:spcAft>
+                      </a:pPr>
+                      <a:r>
+                        <a:rPr lang="es-ES" sz="1050" dirty="0">
+                          <a:effectLst/>
+                        </a:rPr>
+                        <a:t>Situaciones excepcionales</a:t>
+                      </a:r>
+                      <a:endParaRPr lang="es-AR" sz="1050" dirty="0">
+                        <a:effectLst/>
+                      </a:endParaRPr>
+                    </a:p>
+                    <a:p>
+                      <a:pPr marL="342900" lvl="0" indent="-342900">
+                        <a:spcBef>
+                          <a:spcPts val="220"/>
+                        </a:spcBef>
+                        <a:spcAft>
+                          <a:spcPts val="0"/>
+                        </a:spcAft>
+                        <a:buSzPts val="1100"/>
+                        <a:buFont typeface="Arial" panose="020B0604020202020204" pitchFamily="34" charset="0"/>
+                        <a:buChar char="•"/>
+                        <a:tabLst>
+                          <a:tab pos="296545" algn="l"/>
+                          <a:tab pos="297180" algn="l"/>
+                        </a:tabLst>
+                      </a:pPr>
+                      <a:r>
+                        <a:rPr lang="es-ES" sz="1050" dirty="0">
+                          <a:effectLst/>
+                        </a:rPr>
+                        <a:t>No se puede cargar el formulario de Ingresar nuevo</a:t>
+                      </a:r>
+                      <a:r>
+                        <a:rPr lang="es-ES" sz="1050" spc="-55" dirty="0">
+                          <a:effectLst/>
+                        </a:rPr>
+                        <a:t> </a:t>
+                      </a:r>
+                      <a:r>
+                        <a:rPr lang="es-ES" sz="1050" dirty="0">
+                          <a:effectLst/>
+                        </a:rPr>
+                        <a:t>artículo.</a:t>
+                      </a:r>
+                      <a:endParaRPr lang="es-AR" sz="1050" dirty="0">
+                        <a:effectLst/>
+                      </a:endParaRPr>
+                    </a:p>
+                    <a:p>
+                      <a:pPr marL="342900" lvl="0" indent="-342900">
+                        <a:spcBef>
+                          <a:spcPts val="110"/>
+                        </a:spcBef>
+                        <a:spcAft>
+                          <a:spcPts val="0"/>
+                        </a:spcAft>
+                        <a:buSzPts val="1100"/>
+                        <a:buFont typeface="Arial" panose="020B0604020202020204" pitchFamily="34" charset="0"/>
+                        <a:buChar char="•"/>
+                        <a:tabLst>
+                          <a:tab pos="296545" algn="l"/>
+                          <a:tab pos="297180" algn="l"/>
+                        </a:tabLst>
+                      </a:pPr>
+                      <a:r>
+                        <a:rPr lang="es-ES" sz="1050" dirty="0">
+                          <a:effectLst/>
+                        </a:rPr>
+                        <a:t>No se puede conectar a la base de</a:t>
+                      </a:r>
+                      <a:r>
+                        <a:rPr lang="es-ES" sz="1050" spc="-25" dirty="0">
+                          <a:effectLst/>
+                        </a:rPr>
+                        <a:t> </a:t>
+                      </a:r>
+                      <a:r>
+                        <a:rPr lang="es-ES" sz="1050" dirty="0">
+                          <a:effectLst/>
+                        </a:rPr>
+                        <a:t>datos.</a:t>
+                      </a:r>
+                      <a:endParaRPr lang="es-AR" sz="1050" dirty="0">
+                        <a:effectLst/>
+                      </a:endParaRPr>
+                    </a:p>
+                    <a:p>
+                      <a:pPr marL="342900" lvl="0" indent="-342900">
+                        <a:spcBef>
+                          <a:spcPts val="110"/>
+                        </a:spcBef>
+                        <a:spcAft>
+                          <a:spcPts val="0"/>
+                        </a:spcAft>
+                        <a:buSzPts val="1100"/>
+                        <a:buFont typeface="Arial" panose="020B0604020202020204" pitchFamily="34" charset="0"/>
+                        <a:buChar char="•"/>
+                        <a:tabLst>
+                          <a:tab pos="296545" algn="l"/>
+                          <a:tab pos="297180" algn="l"/>
+                        </a:tabLst>
+                      </a:pPr>
+                      <a:r>
+                        <a:rPr lang="es-ES" sz="1050" dirty="0">
+                          <a:effectLst/>
+                        </a:rPr>
+                        <a:t>El Usuario no ingresó los campos requeridos.</a:t>
+                      </a:r>
+                      <a:endParaRPr lang="es-AR" sz="1050" dirty="0">
+                        <a:effectLst/>
+                      </a:endParaRPr>
+                    </a:p>
+                    <a:p>
+                      <a:pPr marL="342900" lvl="0" indent="-342900">
+                        <a:spcBef>
+                          <a:spcPts val="105"/>
+                        </a:spcBef>
+                        <a:spcAft>
+                          <a:spcPts val="0"/>
+                        </a:spcAft>
+                        <a:buSzPts val="1100"/>
+                        <a:buFont typeface="Arial" panose="020B0604020202020204" pitchFamily="34" charset="0"/>
+                        <a:buChar char="•"/>
+                        <a:tabLst>
+                          <a:tab pos="296545" algn="l"/>
+                          <a:tab pos="297180" algn="l"/>
+                        </a:tabLst>
+                      </a:pPr>
+                      <a:r>
+                        <a:rPr lang="es-ES" sz="1050" dirty="0">
+                          <a:effectLst/>
+                        </a:rPr>
+                        <a:t>Los datos ingresados son</a:t>
+                      </a:r>
+                      <a:r>
+                        <a:rPr lang="es-ES" sz="1050" spc="-25" dirty="0">
+                          <a:effectLst/>
+                        </a:rPr>
+                        <a:t> </a:t>
+                      </a:r>
+                      <a:r>
+                        <a:rPr lang="es-ES" sz="1050" dirty="0">
+                          <a:effectLst/>
+                        </a:rPr>
+                        <a:t>incorrectos.</a:t>
+                      </a:r>
+                      <a:endParaRPr lang="es-AR" sz="1050" dirty="0">
+                        <a:effectLst/>
+                      </a:endParaRPr>
+                    </a:p>
+                    <a:p>
+                      <a:pPr marL="342900" lvl="0" indent="-342900">
+                        <a:spcBef>
+                          <a:spcPts val="100"/>
+                        </a:spcBef>
+                        <a:spcAft>
+                          <a:spcPts val="0"/>
+                        </a:spcAft>
+                        <a:buSzPts val="1100"/>
+                        <a:buFont typeface="Arial" panose="020B0604020202020204" pitchFamily="34" charset="0"/>
+                        <a:buChar char="•"/>
+                        <a:tabLst>
+                          <a:tab pos="296545" algn="l"/>
+                          <a:tab pos="297180" algn="l"/>
+                        </a:tabLst>
+                      </a:pPr>
+                      <a:r>
+                        <a:rPr lang="es-ES" sz="1050" dirty="0">
+                          <a:effectLst/>
+                        </a:rPr>
+                        <a:t>El artículo ya</a:t>
+                      </a:r>
+                      <a:r>
+                        <a:rPr lang="es-ES" sz="1050" spc="-10" dirty="0">
+                          <a:effectLst/>
+                        </a:rPr>
+                        <a:t> </a:t>
+                      </a:r>
+                      <a:r>
+                        <a:rPr lang="es-ES" sz="1050" dirty="0">
+                          <a:effectLst/>
+                        </a:rPr>
+                        <a:t>existe.</a:t>
+                      </a:r>
+                      <a:endParaRPr lang="es-AR" sz="1050" dirty="0">
+                        <a:effectLst/>
+                        <a:latin typeface="Calibri" panose="020F0502020204030204" pitchFamily="34" charset="0"/>
+                        <a:ea typeface="Arial" panose="020B0604020202020204" pitchFamily="34" charset="0"/>
+                        <a:cs typeface="Calibri" panose="020F0502020204030204" pitchFamily="34" charset="0"/>
+                      </a:endParaRPr>
+                    </a:p>
+                  </a:txBody>
+                  <a:tcPr marL="0" marR="0" marT="0" marB="0"/>
+                </a:tc>
+                <a:tc hMerge="1">
+                  <a:txBody>
+                    <a:bodyPr/>
+                    <a:lstStyle/>
+                    <a:p>
+                      <a:endParaRPr lang="es-AR"/>
+                    </a:p>
+                  </a:txBody>
+                  <a:tcPr/>
+                </a:tc>
+                <a:tc hMerge="1">
+                  <a:txBody>
+                    <a:bodyPr/>
+                    <a:lstStyle/>
+                    <a:p>
+                      <a:endParaRPr lang="es-AR"/>
+                    </a:p>
+                  </a:txBody>
+                  <a:tcPr/>
+                </a:tc>
+                <a:extLst>
+                  <a:ext uri="{0D108BD9-81ED-4DB2-BD59-A6C34878D82A}">
+                    <a16:rowId xmlns:a16="http://schemas.microsoft.com/office/drawing/2014/main" val="4158196707"/>
+                  </a:ext>
+                </a:extLst>
+              </a:tr>
+            </a:tbl>
+          </a:graphicData>
+        </a:graphic>
+      </p:graphicFrame>
+    </p:spTree>
+    <p:extLst>
+      <p:ext uri="{BB962C8B-B14F-4D97-AF65-F5344CB8AC3E}">
+        <p14:creationId xmlns:p14="http://schemas.microsoft.com/office/powerpoint/2010/main" val="3735661310"/>
       </p:ext>
     </p:extLst>
   </p:cSld>
@@ -14357,1233 +15230,72 @@
           <a:chExt cx="0" cy="0"/>
         </a:xfrm>
       </p:grpSpPr>
-      <p:graphicFrame>
-        <p:nvGraphicFramePr>
-          <p:cNvPr id="2" name="Tabla 1"/>
-          <p:cNvGraphicFramePr>
-            <a:graphicFrameLocks noGrp="1"/>
-          </p:cNvGraphicFramePr>
-          <p:nvPr>
-            <p:extLst>
-              <p:ext uri="{D42A27DB-BD31-4B8C-83A1-F6EECF244321}">
-                <p14:modId xmlns:p14="http://schemas.microsoft.com/office/powerpoint/2010/main" val="3728692600"/>
-              </p:ext>
-            </p:extLst>
-          </p:nvPr>
-        </p:nvGraphicFramePr>
-        <p:xfrm>
-          <a:off x="889149" y="1292771"/>
-          <a:ext cx="7716645" cy="5231554"/>
-        </p:xfrm>
-        <a:graphic>
-          <a:graphicData uri="http://schemas.openxmlformats.org/drawingml/2006/table">
-            <a:tbl>
-              <a:tblPr firstRow="1" firstCol="1" lastRow="1" lastCol="1" bandRow="1" bandCol="1"/>
-              <a:tblGrid>
-                <a:gridCol w="2740752">
-                  <a:extLst>
-                    <a:ext uri="{9D8B030D-6E8A-4147-A177-3AD203B41FA5}">
-                      <a16:colId xmlns:a16="http://schemas.microsoft.com/office/drawing/2014/main" val="4109426167"/>
-                    </a:ext>
-                  </a:extLst>
-                </a:gridCol>
-                <a:gridCol w="74831">
-                  <a:extLst>
-                    <a:ext uri="{9D8B030D-6E8A-4147-A177-3AD203B41FA5}">
-                      <a16:colId xmlns:a16="http://schemas.microsoft.com/office/drawing/2014/main" val="3019291819"/>
-                    </a:ext>
-                  </a:extLst>
-                </a:gridCol>
-                <a:gridCol w="4901062">
-                  <a:extLst>
-                    <a:ext uri="{9D8B030D-6E8A-4147-A177-3AD203B41FA5}">
-                      <a16:colId xmlns:a16="http://schemas.microsoft.com/office/drawing/2014/main" val="3142601985"/>
-                    </a:ext>
-                  </a:extLst>
-                </a:gridCol>
-              </a:tblGrid>
-              <a:tr h="1549390">
-                <a:tc>
-                  <a:txBody>
-                    <a:bodyPr/>
-                    <a:lstStyle/>
-                    <a:p>
-                      <a:pPr marL="67945">
-                        <a:spcBef>
-                          <a:spcPts val="220"/>
-                        </a:spcBef>
-                        <a:spcAft>
-                          <a:spcPts val="0"/>
-                        </a:spcAft>
-                      </a:pPr>
-                      <a:r>
-                        <a:rPr lang="es-ES" sz="1050">
-                          <a:effectLst/>
-                        </a:rPr>
-                        <a:t>Caso de uso N°05</a:t>
-                      </a:r>
-                      <a:endParaRPr lang="es-AR" sz="1050">
-                        <a:effectLst/>
-                        <a:latin typeface="Calibri" panose="020F0502020204030204" pitchFamily="34" charset="0"/>
-                        <a:ea typeface="Calibri" panose="020F0502020204030204" pitchFamily="34" charset="0"/>
-                        <a:cs typeface="Calibri" panose="020F0502020204030204" pitchFamily="34" charset="0"/>
-                      </a:endParaRPr>
-                    </a:p>
-                  </a:txBody>
-                  <a:tcPr marL="0" marR="0" marT="0" marB="0"/>
-                </a:tc>
-                <a:tc gridSpan="2">
-                  <a:txBody>
-                    <a:bodyPr/>
-                    <a:lstStyle/>
-                    <a:p>
-                      <a:pPr marL="68580" marR="1918335">
-                        <a:lnSpc>
-                          <a:spcPts val="1400"/>
-                        </a:lnSpc>
-                        <a:spcBef>
-                          <a:spcPts val="165"/>
-                        </a:spcBef>
-                        <a:spcAft>
-                          <a:spcPts val="0"/>
-                        </a:spcAft>
-                      </a:pPr>
-                      <a:r>
-                        <a:rPr lang="es-ES" sz="1050" dirty="0">
-                          <a:effectLst/>
-                        </a:rPr>
-                        <a:t>Crear Producto</a:t>
-                      </a:r>
-                      <a:endParaRPr lang="es-AR" sz="1050" dirty="0">
-                        <a:effectLst/>
-                        <a:latin typeface="Calibri" panose="020F0502020204030204" pitchFamily="34" charset="0"/>
-                        <a:ea typeface="Calibri" panose="020F0502020204030204" pitchFamily="34" charset="0"/>
-                        <a:cs typeface="Calibri" panose="020F0502020204030204" pitchFamily="34" charset="0"/>
-                      </a:endParaRPr>
-                    </a:p>
-                  </a:txBody>
-                  <a:tcPr marL="0" marR="0" marT="0" marB="0"/>
-                </a:tc>
-                <a:tc hMerge="1">
-                  <a:txBody>
-                    <a:bodyPr/>
-                    <a:lstStyle/>
-                    <a:p>
-                      <a:endParaRPr lang="es-AR"/>
-                    </a:p>
-                  </a:txBody>
-                  <a:tcPr/>
-                </a:tc>
-                <a:extLst>
-                  <a:ext uri="{0D108BD9-81ED-4DB2-BD59-A6C34878D82A}">
-                    <a16:rowId xmlns:a16="http://schemas.microsoft.com/office/drawing/2014/main" val="3368355944"/>
-                  </a:ext>
-                </a:extLst>
-              </a:tr>
-              <a:tr h="324819">
-                <a:tc>
-                  <a:txBody>
-                    <a:bodyPr/>
-                    <a:lstStyle/>
-                    <a:p>
-                      <a:pPr marL="67945">
-                        <a:spcBef>
-                          <a:spcPts val="210"/>
-                        </a:spcBef>
-                        <a:spcAft>
-                          <a:spcPts val="0"/>
-                        </a:spcAft>
-                      </a:pPr>
-                      <a:r>
-                        <a:rPr lang="es-ES" sz="1050">
-                          <a:effectLst/>
-                        </a:rPr>
-                        <a:t>Fecha:</a:t>
-                      </a:r>
-                      <a:endParaRPr lang="es-AR" sz="1050">
-                        <a:effectLst/>
-                      </a:endParaRPr>
-                    </a:p>
-                    <a:p>
-                      <a:pPr marL="67945">
-                        <a:spcBef>
-                          <a:spcPts val="110"/>
-                        </a:spcBef>
-                        <a:spcAft>
-                          <a:spcPts val="0"/>
-                        </a:spcAft>
-                      </a:pPr>
-                      <a:r>
-                        <a:rPr lang="es-ES" sz="1050">
-                          <a:effectLst/>
-                        </a:rPr>
-                        <a:t>23 de junio de 2019</a:t>
-                      </a:r>
-                      <a:endParaRPr lang="es-AR" sz="1050">
-                        <a:effectLst/>
-                        <a:latin typeface="Calibri" panose="020F0502020204030204" pitchFamily="34" charset="0"/>
-                        <a:ea typeface="Calibri" panose="020F0502020204030204" pitchFamily="34" charset="0"/>
-                        <a:cs typeface="Calibri" panose="020F0502020204030204" pitchFamily="34" charset="0"/>
-                      </a:endParaRPr>
-                    </a:p>
-                  </a:txBody>
-                  <a:tcPr marL="0" marR="0" marT="0" marB="0"/>
-                </a:tc>
-                <a:tc gridSpan="2">
-                  <a:txBody>
-                    <a:bodyPr/>
-                    <a:lstStyle/>
-                    <a:p>
-                      <a:pPr marL="68580">
-                        <a:spcBef>
-                          <a:spcPts val="940"/>
-                        </a:spcBef>
-                        <a:spcAft>
-                          <a:spcPts val="0"/>
-                        </a:spcAft>
-                      </a:pPr>
-                      <a:r>
-                        <a:rPr lang="es-ES" sz="1050">
-                          <a:effectLst/>
-                        </a:rPr>
-                        <a:t>ELABORADO POR: Richard Barboza</a:t>
-                      </a:r>
-                      <a:endParaRPr lang="es-AR" sz="1050">
-                        <a:effectLst/>
-                        <a:latin typeface="Calibri" panose="020F0502020204030204" pitchFamily="34" charset="0"/>
-                        <a:ea typeface="Calibri" panose="020F0502020204030204" pitchFamily="34" charset="0"/>
-                        <a:cs typeface="Calibri" panose="020F0502020204030204" pitchFamily="34" charset="0"/>
-                      </a:endParaRPr>
-                    </a:p>
-                  </a:txBody>
-                  <a:tcPr marL="0" marR="0" marT="0" marB="0"/>
-                </a:tc>
-                <a:tc hMerge="1">
-                  <a:txBody>
-                    <a:bodyPr/>
-                    <a:lstStyle/>
-                    <a:p>
-                      <a:endParaRPr lang="es-AR"/>
-                    </a:p>
-                  </a:txBody>
-                  <a:tcPr/>
-                </a:tc>
-                <a:extLst>
-                  <a:ext uri="{0D108BD9-81ED-4DB2-BD59-A6C34878D82A}">
-                    <a16:rowId xmlns:a16="http://schemas.microsoft.com/office/drawing/2014/main" val="3626453775"/>
-                  </a:ext>
-                </a:extLst>
-              </a:tr>
-              <a:tr h="156211">
-                <a:tc>
-                  <a:txBody>
-                    <a:bodyPr/>
-                    <a:lstStyle/>
-                    <a:p>
-                      <a:pPr marL="67945">
-                        <a:spcBef>
-                          <a:spcPts val="210"/>
-                        </a:spcBef>
-                        <a:spcAft>
-                          <a:spcPts val="0"/>
-                        </a:spcAft>
-                      </a:pPr>
-                      <a:r>
-                        <a:rPr lang="es-ES" sz="1050">
-                          <a:effectLst/>
-                        </a:rPr>
-                        <a:t>ACTORES</a:t>
-                      </a:r>
-                      <a:endParaRPr lang="es-AR" sz="1050">
-                        <a:effectLst/>
-                        <a:latin typeface="Calibri" panose="020F0502020204030204" pitchFamily="34" charset="0"/>
-                        <a:ea typeface="Calibri" panose="020F0502020204030204" pitchFamily="34" charset="0"/>
-                        <a:cs typeface="Calibri" panose="020F0502020204030204" pitchFamily="34" charset="0"/>
-                      </a:endParaRPr>
-                    </a:p>
-                  </a:txBody>
-                  <a:tcPr marL="0" marR="0" marT="0" marB="0"/>
-                </a:tc>
-                <a:tc gridSpan="2">
-                  <a:txBody>
-                    <a:bodyPr/>
-                    <a:lstStyle/>
-                    <a:p>
-                      <a:pPr marL="68580">
-                        <a:spcBef>
-                          <a:spcPts val="210"/>
-                        </a:spcBef>
-                        <a:spcAft>
-                          <a:spcPts val="0"/>
-                        </a:spcAft>
-                      </a:pPr>
-                      <a:r>
-                        <a:rPr lang="es-ES" sz="1050">
-                          <a:effectLst/>
-                        </a:rPr>
-                        <a:t>Administrador.</a:t>
-                      </a:r>
-                      <a:endParaRPr lang="es-AR" sz="1050">
-                        <a:effectLst/>
-                        <a:latin typeface="Calibri" panose="020F0502020204030204" pitchFamily="34" charset="0"/>
-                        <a:ea typeface="Calibri" panose="020F0502020204030204" pitchFamily="34" charset="0"/>
-                        <a:cs typeface="Calibri" panose="020F0502020204030204" pitchFamily="34" charset="0"/>
-                      </a:endParaRPr>
-                    </a:p>
-                  </a:txBody>
-                  <a:tcPr marL="0" marR="0" marT="0" marB="0"/>
-                </a:tc>
-                <a:tc hMerge="1">
-                  <a:txBody>
-                    <a:bodyPr/>
-                    <a:lstStyle/>
-                    <a:p>
-                      <a:endParaRPr lang="es-AR"/>
-                    </a:p>
-                  </a:txBody>
-                  <a:tcPr/>
-                </a:tc>
-                <a:extLst>
-                  <a:ext uri="{0D108BD9-81ED-4DB2-BD59-A6C34878D82A}">
-                    <a16:rowId xmlns:a16="http://schemas.microsoft.com/office/drawing/2014/main" val="1820231986"/>
-                  </a:ext>
-                </a:extLst>
-              </a:tr>
-              <a:tr h="156211">
-                <a:tc>
-                  <a:txBody>
-                    <a:bodyPr/>
-                    <a:lstStyle/>
-                    <a:p>
-                      <a:pPr marL="67945">
-                        <a:spcBef>
-                          <a:spcPts val="210"/>
-                        </a:spcBef>
-                        <a:spcAft>
-                          <a:spcPts val="0"/>
-                        </a:spcAft>
-                      </a:pPr>
-                      <a:r>
-                        <a:rPr lang="es-ES" sz="1050">
-                          <a:effectLst/>
-                        </a:rPr>
-                        <a:t>OBJETIVO</a:t>
-                      </a:r>
-                      <a:endParaRPr lang="es-AR" sz="1050">
-                        <a:effectLst/>
-                        <a:latin typeface="Calibri" panose="020F0502020204030204" pitchFamily="34" charset="0"/>
-                        <a:ea typeface="Calibri" panose="020F0502020204030204" pitchFamily="34" charset="0"/>
-                        <a:cs typeface="Calibri" panose="020F0502020204030204" pitchFamily="34" charset="0"/>
-                      </a:endParaRPr>
-                    </a:p>
-                  </a:txBody>
-                  <a:tcPr marL="0" marR="0" marT="0" marB="0"/>
-                </a:tc>
-                <a:tc gridSpan="2">
-                  <a:txBody>
-                    <a:bodyPr/>
-                    <a:lstStyle/>
-                    <a:p>
-                      <a:pPr marL="342900" lvl="0" indent="-342900">
-                        <a:spcBef>
-                          <a:spcPts val="210"/>
-                        </a:spcBef>
-                        <a:spcAft>
-                          <a:spcPts val="0"/>
-                        </a:spcAft>
-                        <a:buFont typeface="Symbol" panose="05050102010706020507" pitchFamily="18" charset="2"/>
-                        <a:buChar char=""/>
-                      </a:pPr>
-                      <a:r>
-                        <a:rPr lang="es-ES" sz="1050">
-                          <a:effectLst/>
-                        </a:rPr>
-                        <a:t>Agregar un artículo al inventario del sistema.</a:t>
-                      </a:r>
-                      <a:endParaRPr lang="es-AR" sz="1050">
-                        <a:effectLst/>
-                        <a:latin typeface="Calibri" panose="020F0502020204030204" pitchFamily="34" charset="0"/>
-                        <a:ea typeface="Calibri" panose="020F0502020204030204" pitchFamily="34" charset="0"/>
-                        <a:cs typeface="Calibri" panose="020F0502020204030204" pitchFamily="34" charset="0"/>
-                      </a:endParaRPr>
-                    </a:p>
-                  </a:txBody>
-                  <a:tcPr marL="0" marR="0" marT="0" marB="0"/>
-                </a:tc>
-                <a:tc hMerge="1">
-                  <a:txBody>
-                    <a:bodyPr/>
-                    <a:lstStyle/>
-                    <a:p>
-                      <a:endParaRPr lang="es-AR"/>
-                    </a:p>
-                  </a:txBody>
-                  <a:tcPr/>
-                </a:tc>
-                <a:extLst>
-                  <a:ext uri="{0D108BD9-81ED-4DB2-BD59-A6C34878D82A}">
-                    <a16:rowId xmlns:a16="http://schemas.microsoft.com/office/drawing/2014/main" val="51410399"/>
-                  </a:ext>
-                </a:extLst>
-              </a:tr>
-              <a:tr h="712619">
-                <a:tc>
-                  <a:txBody>
-                    <a:bodyPr/>
-                    <a:lstStyle/>
-                    <a:p>
-                      <a:pPr marL="67945">
-                        <a:spcBef>
-                          <a:spcPts val="220"/>
-                        </a:spcBef>
-                        <a:spcAft>
-                          <a:spcPts val="0"/>
-                        </a:spcAft>
-                      </a:pPr>
-                      <a:r>
-                        <a:rPr lang="es-ES" sz="1050">
-                          <a:effectLst/>
-                        </a:rPr>
-                        <a:t>PRECONDICIONES</a:t>
-                      </a:r>
-                      <a:endParaRPr lang="es-AR" sz="1050">
-                        <a:effectLst/>
-                        <a:latin typeface="Calibri" panose="020F0502020204030204" pitchFamily="34" charset="0"/>
-                        <a:ea typeface="Calibri" panose="020F0502020204030204" pitchFamily="34" charset="0"/>
-                        <a:cs typeface="Calibri" panose="020F0502020204030204" pitchFamily="34" charset="0"/>
-                      </a:endParaRPr>
-                    </a:p>
-                  </a:txBody>
-                  <a:tcPr marL="0" marR="0" marT="0" marB="0"/>
-                </a:tc>
-                <a:tc gridSpan="2">
-                  <a:txBody>
-                    <a:bodyPr/>
-                    <a:lstStyle/>
-                    <a:p>
-                      <a:pPr marL="342900" lvl="0" indent="-342900">
-                        <a:spcBef>
-                          <a:spcPts val="220"/>
-                        </a:spcBef>
-                        <a:spcAft>
-                          <a:spcPts val="0"/>
-                        </a:spcAft>
-                        <a:buFont typeface="Symbol" panose="05050102010706020507" pitchFamily="18" charset="2"/>
-                        <a:buChar char=""/>
-                        <a:tabLst>
-                          <a:tab pos="525780" algn="l"/>
-                          <a:tab pos="526415" algn="l"/>
-                        </a:tabLst>
-                      </a:pPr>
-                      <a:r>
-                        <a:rPr lang="es-ES" sz="1050">
-                          <a:effectLst/>
-                        </a:rPr>
-                        <a:t>El Administrador debe estar registrado en el</a:t>
-                      </a:r>
-                      <a:r>
-                        <a:rPr lang="es-ES" sz="1050" spc="-25">
-                          <a:effectLst/>
-                        </a:rPr>
-                        <a:t> </a:t>
-                      </a:r>
-                      <a:r>
-                        <a:rPr lang="es-ES" sz="1050">
-                          <a:effectLst/>
-                        </a:rPr>
-                        <a:t>sistema.</a:t>
-                      </a:r>
-                      <a:endParaRPr lang="es-AR" sz="1050">
-                        <a:effectLst/>
-                      </a:endParaRPr>
-                    </a:p>
-                    <a:p>
-                      <a:pPr marL="342900" lvl="0" indent="-342900">
-                        <a:spcBef>
-                          <a:spcPts val="320"/>
-                        </a:spcBef>
-                        <a:spcAft>
-                          <a:spcPts val="0"/>
-                        </a:spcAft>
-                        <a:buFont typeface="Symbol" panose="05050102010706020507" pitchFamily="18" charset="2"/>
-                        <a:buChar char=""/>
-                        <a:tabLst>
-                          <a:tab pos="525780" algn="l"/>
-                          <a:tab pos="526415" algn="l"/>
-                        </a:tabLst>
-                      </a:pPr>
-                      <a:r>
-                        <a:rPr lang="es-ES" sz="1050">
-                          <a:effectLst/>
-                        </a:rPr>
-                        <a:t>El Administrador debe haber iniciado sesión en el</a:t>
-                      </a:r>
-                      <a:r>
-                        <a:rPr lang="es-ES" sz="1050" spc="-60">
-                          <a:effectLst/>
-                        </a:rPr>
-                        <a:t> </a:t>
-                      </a:r>
-                      <a:r>
-                        <a:rPr lang="es-ES" sz="1050">
-                          <a:effectLst/>
-                        </a:rPr>
-                        <a:t>sistema.</a:t>
-                      </a:r>
-                      <a:endParaRPr lang="es-AR" sz="1050">
-                        <a:effectLst/>
-                      </a:endParaRPr>
-                    </a:p>
-                    <a:p>
-                      <a:pPr marL="342900" marR="417195" lvl="0" indent="-342900">
-                        <a:lnSpc>
-                          <a:spcPct val="107000"/>
-                        </a:lnSpc>
-                        <a:spcBef>
-                          <a:spcPts val="290"/>
-                        </a:spcBef>
-                        <a:spcAft>
-                          <a:spcPts val="0"/>
-                        </a:spcAft>
-                        <a:buFont typeface="Symbol" panose="05050102010706020507" pitchFamily="18" charset="2"/>
-                        <a:buChar char=""/>
-                        <a:tabLst>
-                          <a:tab pos="525780" algn="l"/>
-                          <a:tab pos="526415" algn="l"/>
-                        </a:tabLst>
-                      </a:pPr>
-                      <a:r>
-                        <a:rPr lang="es-ES" sz="1050">
-                          <a:effectLst/>
-                        </a:rPr>
-                        <a:t>El sistema proveerá al Administrador un formulario donde ingresará un artículo al</a:t>
-                      </a:r>
-                      <a:r>
-                        <a:rPr lang="es-ES" sz="1050" spc="-10">
-                          <a:effectLst/>
-                        </a:rPr>
-                        <a:t> </a:t>
-                      </a:r>
-                      <a:r>
-                        <a:rPr lang="es-ES" sz="1050">
-                          <a:effectLst/>
-                        </a:rPr>
-                        <a:t>inventario.</a:t>
-                      </a:r>
-                      <a:endParaRPr lang="es-AR" sz="1050">
-                        <a:effectLst/>
-                        <a:latin typeface="Calibri" panose="020F0502020204030204" pitchFamily="34" charset="0"/>
-                        <a:ea typeface="Calibri" panose="020F0502020204030204" pitchFamily="34" charset="0"/>
-                        <a:cs typeface="Calibri" panose="020F0502020204030204" pitchFamily="34" charset="0"/>
-                      </a:endParaRPr>
-                    </a:p>
-                  </a:txBody>
-                  <a:tcPr marL="0" marR="0" marT="0" marB="0"/>
-                </a:tc>
-                <a:tc hMerge="1">
-                  <a:txBody>
-                    <a:bodyPr/>
-                    <a:lstStyle/>
-                    <a:p>
-                      <a:endParaRPr lang="es-AR"/>
-                    </a:p>
-                  </a:txBody>
-                  <a:tcPr/>
-                </a:tc>
-                <a:extLst>
-                  <a:ext uri="{0D108BD9-81ED-4DB2-BD59-A6C34878D82A}">
-                    <a16:rowId xmlns:a16="http://schemas.microsoft.com/office/drawing/2014/main" val="1113057777"/>
-                  </a:ext>
-                </a:extLst>
-              </a:tr>
-              <a:tr h="220652">
-                <a:tc>
-                  <a:txBody>
-                    <a:bodyPr/>
-                    <a:lstStyle/>
-                    <a:p>
-                      <a:pPr marL="67945">
-                        <a:spcBef>
-                          <a:spcPts val="210"/>
-                        </a:spcBef>
-                        <a:spcAft>
-                          <a:spcPts val="0"/>
-                        </a:spcAft>
-                      </a:pPr>
-                      <a:r>
-                        <a:rPr lang="es-ES" sz="1050">
-                          <a:effectLst/>
-                        </a:rPr>
-                        <a:t>POSCONDICIONES</a:t>
-                      </a:r>
-                      <a:endParaRPr lang="es-AR" sz="1050">
-                        <a:effectLst/>
-                        <a:latin typeface="Calibri" panose="020F0502020204030204" pitchFamily="34" charset="0"/>
-                        <a:ea typeface="Calibri" panose="020F0502020204030204" pitchFamily="34" charset="0"/>
-                        <a:cs typeface="Calibri" panose="020F0502020204030204" pitchFamily="34" charset="0"/>
-                      </a:endParaRPr>
-                    </a:p>
-                  </a:txBody>
-                  <a:tcPr marL="0" marR="0" marT="0" marB="0"/>
-                </a:tc>
-                <a:tc gridSpan="2">
-                  <a:txBody>
-                    <a:bodyPr/>
-                    <a:lstStyle/>
-                    <a:p>
-                      <a:pPr marL="342900" marR="367030" lvl="0" indent="-342900">
-                        <a:spcBef>
-                          <a:spcPts val="225"/>
-                        </a:spcBef>
-                        <a:spcAft>
-                          <a:spcPts val="0"/>
-                        </a:spcAft>
-                        <a:buFont typeface="Symbol" panose="05050102010706020507" pitchFamily="18" charset="2"/>
-                        <a:buChar char=""/>
-                      </a:pPr>
-                      <a:r>
-                        <a:rPr lang="es-ES" sz="1050">
-                          <a:effectLst/>
-                        </a:rPr>
-                        <a:t>El usuario podrá agregar un artículo al inventario del sistema.</a:t>
-                      </a:r>
-                      <a:endParaRPr lang="es-AR" sz="1050">
-                        <a:effectLst/>
-                        <a:latin typeface="Calibri" panose="020F0502020204030204" pitchFamily="34" charset="0"/>
-                        <a:ea typeface="Calibri" panose="020F0502020204030204" pitchFamily="34" charset="0"/>
-                        <a:cs typeface="Calibri" panose="020F0502020204030204" pitchFamily="34" charset="0"/>
-                      </a:endParaRPr>
-                    </a:p>
-                  </a:txBody>
-                  <a:tcPr marL="0" marR="0" marT="0" marB="0"/>
-                </a:tc>
-                <a:tc hMerge="1">
-                  <a:txBody>
-                    <a:bodyPr/>
-                    <a:lstStyle/>
-                    <a:p>
-                      <a:endParaRPr lang="es-AR"/>
-                    </a:p>
-                  </a:txBody>
-                  <a:tcPr/>
-                </a:tc>
-                <a:extLst>
-                  <a:ext uri="{0D108BD9-81ED-4DB2-BD59-A6C34878D82A}">
-                    <a16:rowId xmlns:a16="http://schemas.microsoft.com/office/drawing/2014/main" val="856707442"/>
-                  </a:ext>
-                </a:extLst>
-              </a:tr>
-              <a:tr h="156211">
-                <a:tc gridSpan="3">
-                  <a:txBody>
-                    <a:bodyPr/>
-                    <a:lstStyle/>
-                    <a:p>
-                      <a:pPr marL="67945" algn="ctr">
-                        <a:spcBef>
-                          <a:spcPts val="210"/>
-                        </a:spcBef>
-                        <a:spcAft>
-                          <a:spcPts val="0"/>
-                        </a:spcAft>
-                      </a:pPr>
-                      <a:r>
-                        <a:rPr lang="es-ES" sz="1050">
-                          <a:effectLst/>
-                        </a:rPr>
-                        <a:t>FLUJO DE EVENTOS</a:t>
-                      </a:r>
-                      <a:endParaRPr lang="es-AR" sz="1050">
-                        <a:effectLst/>
-                        <a:latin typeface="Calibri" panose="020F0502020204030204" pitchFamily="34" charset="0"/>
-                        <a:ea typeface="Calibri" panose="020F0502020204030204" pitchFamily="34" charset="0"/>
-                        <a:cs typeface="Calibri" panose="020F0502020204030204" pitchFamily="34" charset="0"/>
-                      </a:endParaRPr>
-                    </a:p>
-                  </a:txBody>
-                  <a:tcPr marL="0" marR="0" marT="0" marB="0"/>
-                </a:tc>
-                <a:tc hMerge="1">
-                  <a:txBody>
-                    <a:bodyPr/>
-                    <a:lstStyle/>
-                    <a:p>
-                      <a:endParaRPr lang="es-AR"/>
-                    </a:p>
-                  </a:txBody>
-                  <a:tcPr/>
-                </a:tc>
-                <a:tc hMerge="1">
-                  <a:txBody>
-                    <a:bodyPr/>
-                    <a:lstStyle/>
-                    <a:p>
-                      <a:endParaRPr lang="es-AR"/>
-                    </a:p>
-                  </a:txBody>
-                  <a:tcPr/>
-                </a:tc>
-                <a:extLst>
-                  <a:ext uri="{0D108BD9-81ED-4DB2-BD59-A6C34878D82A}">
-                    <a16:rowId xmlns:a16="http://schemas.microsoft.com/office/drawing/2014/main" val="941261319"/>
-                  </a:ext>
-                </a:extLst>
-              </a:tr>
-              <a:tr h="156211">
-                <a:tc gridSpan="2">
-                  <a:txBody>
-                    <a:bodyPr/>
-                    <a:lstStyle/>
-                    <a:p>
-                      <a:pPr marL="67945">
-                        <a:spcBef>
-                          <a:spcPts val="210"/>
-                        </a:spcBef>
-                        <a:spcAft>
-                          <a:spcPts val="0"/>
-                        </a:spcAft>
-                      </a:pPr>
-                      <a:r>
-                        <a:rPr lang="es-ES" sz="1050">
-                          <a:effectLst/>
-                        </a:rPr>
-                        <a:t>ACCION DEL ACTOR</a:t>
-                      </a:r>
-                      <a:endParaRPr lang="es-AR" sz="1050">
-                        <a:effectLst/>
-                        <a:latin typeface="Calibri" panose="020F0502020204030204" pitchFamily="34" charset="0"/>
-                        <a:ea typeface="Calibri" panose="020F0502020204030204" pitchFamily="34" charset="0"/>
-                        <a:cs typeface="Calibri" panose="020F0502020204030204" pitchFamily="34" charset="0"/>
-                      </a:endParaRPr>
-                    </a:p>
-                  </a:txBody>
-                  <a:tcPr marL="0" marR="0" marT="0" marB="0"/>
-                </a:tc>
-                <a:tc hMerge="1">
-                  <a:txBody>
-                    <a:bodyPr/>
-                    <a:lstStyle/>
-                    <a:p>
-                      <a:endParaRPr lang="es-AR"/>
-                    </a:p>
-                  </a:txBody>
-                  <a:tcPr/>
-                </a:tc>
-                <a:tc>
-                  <a:txBody>
-                    <a:bodyPr/>
-                    <a:lstStyle/>
-                    <a:p>
-                      <a:pPr marL="68580">
-                        <a:spcBef>
-                          <a:spcPts val="210"/>
-                        </a:spcBef>
-                        <a:spcAft>
-                          <a:spcPts val="0"/>
-                        </a:spcAft>
-                      </a:pPr>
-                      <a:r>
-                        <a:rPr lang="es-ES" sz="1050">
-                          <a:effectLst/>
-                        </a:rPr>
-                        <a:t>RESPUESTA DEL SISTEMA</a:t>
-                      </a:r>
-                      <a:endParaRPr lang="es-AR" sz="1050">
-                        <a:effectLst/>
-                        <a:latin typeface="Calibri" panose="020F0502020204030204" pitchFamily="34" charset="0"/>
-                        <a:ea typeface="Calibri" panose="020F0502020204030204" pitchFamily="34" charset="0"/>
-                        <a:cs typeface="Calibri" panose="020F0502020204030204" pitchFamily="34" charset="0"/>
-                      </a:endParaRPr>
-                    </a:p>
-                  </a:txBody>
-                  <a:tcPr marL="0" marR="0" marT="0" marB="0"/>
-                </a:tc>
-                <a:extLst>
-                  <a:ext uri="{0D108BD9-81ED-4DB2-BD59-A6C34878D82A}">
-                    <a16:rowId xmlns:a16="http://schemas.microsoft.com/office/drawing/2014/main" val="4272305014"/>
-                  </a:ext>
-                </a:extLst>
-              </a:tr>
-              <a:tr h="686707">
-                <a:tc gridSpan="2">
-                  <a:txBody>
-                    <a:bodyPr/>
-                    <a:lstStyle/>
-                    <a:p>
-                      <a:pPr marL="67945">
-                        <a:spcBef>
-                          <a:spcPts val="210"/>
-                        </a:spcBef>
-                        <a:spcAft>
-                          <a:spcPts val="0"/>
-                        </a:spcAft>
-                      </a:pPr>
-                      <a:r>
-                        <a:rPr lang="es-ES" sz="1050" dirty="0">
-                          <a:effectLst/>
-                        </a:rPr>
-                        <a:t>1. Ingresar al módulo de Ingresar nuevo Producto/Artículo.</a:t>
-                      </a:r>
-                      <a:endParaRPr lang="es-AR" sz="1050" dirty="0">
-                        <a:effectLst/>
-                      </a:endParaRPr>
-                    </a:p>
-                    <a:p>
-                      <a:pPr marL="67945">
-                        <a:lnSpc>
-                          <a:spcPts val="1340"/>
-                        </a:lnSpc>
-                        <a:spcBef>
-                          <a:spcPts val="210"/>
-                        </a:spcBef>
-                        <a:spcAft>
-                          <a:spcPts val="0"/>
-                        </a:spcAft>
-                        <a:tabLst>
-                          <a:tab pos="302260" algn="l"/>
-                        </a:tabLst>
-                      </a:pPr>
-                      <a:r>
-                        <a:rPr lang="es-ES" sz="1050" dirty="0" smtClean="0">
-                          <a:effectLst/>
-                        </a:rPr>
-                        <a:t>3.Ingresar </a:t>
-                      </a:r>
-                      <a:r>
-                        <a:rPr lang="es-ES" sz="1050" dirty="0">
-                          <a:effectLst/>
-                        </a:rPr>
-                        <a:t>información del</a:t>
-                      </a:r>
-                      <a:r>
-                        <a:rPr lang="es-ES" sz="1050" spc="-15" dirty="0">
-                          <a:effectLst/>
-                        </a:rPr>
-                        <a:t> </a:t>
-                      </a:r>
-                      <a:r>
-                        <a:rPr lang="es-ES" sz="1050" dirty="0">
-                          <a:effectLst/>
-                        </a:rPr>
-                        <a:t>Producto.</a:t>
-                      </a:r>
-                      <a:endParaRPr lang="es-AR" sz="1050" dirty="0">
-                        <a:effectLst/>
-                        <a:latin typeface="Calibri" panose="020F0502020204030204" pitchFamily="34" charset="0"/>
-                        <a:ea typeface="Calibri" panose="020F0502020204030204" pitchFamily="34" charset="0"/>
-                        <a:cs typeface="Calibri" panose="020F0502020204030204" pitchFamily="34" charset="0"/>
-                      </a:endParaRPr>
-                    </a:p>
-                  </a:txBody>
-                  <a:tcPr marL="0" marR="0" marT="0" marB="0"/>
-                </a:tc>
-                <a:tc hMerge="1">
-                  <a:txBody>
-                    <a:bodyPr/>
-                    <a:lstStyle/>
-                    <a:p>
-                      <a:endParaRPr lang="es-AR"/>
-                    </a:p>
-                  </a:txBody>
-                  <a:tcPr/>
-                </a:tc>
-                <a:tc>
-                  <a:txBody>
-                    <a:bodyPr/>
-                    <a:lstStyle/>
-                    <a:p>
-                      <a:pPr marL="68580">
-                        <a:spcBef>
-                          <a:spcPts val="210"/>
-                        </a:spcBef>
-                        <a:spcAft>
-                          <a:spcPts val="0"/>
-                        </a:spcAft>
-                      </a:pPr>
-                      <a:r>
-                        <a:rPr lang="es-ES" sz="1050" dirty="0">
-                          <a:effectLst/>
-                        </a:rPr>
-                        <a:t>2. Carga un formulario para la creación de artículos.</a:t>
-                      </a:r>
-                      <a:endParaRPr lang="es-AR" sz="1050" dirty="0">
-                        <a:effectLst/>
-                      </a:endParaRPr>
-                    </a:p>
-                    <a:p>
-                      <a:pPr marL="342900" lvl="0" indent="-342900">
-                        <a:lnSpc>
-                          <a:spcPts val="1335"/>
-                        </a:lnSpc>
-                        <a:spcBef>
-                          <a:spcPts val="210"/>
-                        </a:spcBef>
-                        <a:spcAft>
-                          <a:spcPts val="0"/>
-                        </a:spcAft>
-                        <a:buSzPts val="1100"/>
-                        <a:buFont typeface="Calibri" panose="020F0502020204030204" pitchFamily="34" charset="0"/>
-                        <a:buAutoNum type="arabicPeriod" startAt="4"/>
-                        <a:tabLst>
-                          <a:tab pos="518795" algn="l"/>
-                          <a:tab pos="519430" algn="l"/>
-                        </a:tabLst>
-                      </a:pPr>
-                      <a:r>
-                        <a:rPr lang="es-ES" sz="1050" dirty="0">
-                          <a:effectLst/>
-                        </a:rPr>
-                        <a:t>Valida información</a:t>
-                      </a:r>
-                      <a:r>
-                        <a:rPr lang="es-ES" sz="1050" spc="-25" dirty="0">
-                          <a:effectLst/>
-                        </a:rPr>
-                        <a:t> </a:t>
-                      </a:r>
-                      <a:r>
-                        <a:rPr lang="es-ES" sz="1050" dirty="0">
-                          <a:effectLst/>
-                        </a:rPr>
-                        <a:t>ingresada.</a:t>
-                      </a:r>
-                      <a:endParaRPr lang="es-AR" sz="1050" dirty="0">
-                        <a:effectLst/>
-                      </a:endParaRPr>
-                    </a:p>
-                    <a:p>
-                      <a:pPr marL="342900" lvl="0" indent="-342900">
-                        <a:spcBef>
-                          <a:spcPts val="110"/>
-                        </a:spcBef>
-                        <a:spcAft>
-                          <a:spcPts val="0"/>
-                        </a:spcAft>
-                        <a:buSzPts val="1100"/>
-                        <a:buFont typeface="Calibri" panose="020F0502020204030204" pitchFamily="34" charset="0"/>
-                        <a:buAutoNum type="arabicPeriod" startAt="4"/>
-                        <a:tabLst>
-                          <a:tab pos="518795" algn="l"/>
-                          <a:tab pos="519430" algn="l"/>
-                        </a:tabLst>
-                      </a:pPr>
-                      <a:r>
-                        <a:rPr lang="es-ES" sz="1050" dirty="0">
-                          <a:effectLst/>
-                        </a:rPr>
-                        <a:t>Almacena la</a:t>
-                      </a:r>
-                      <a:r>
-                        <a:rPr lang="es-ES" sz="1050" spc="-20" dirty="0">
-                          <a:effectLst/>
-                        </a:rPr>
-                        <a:t> </a:t>
-                      </a:r>
-                      <a:r>
-                        <a:rPr lang="es-ES" sz="1050" dirty="0">
-                          <a:effectLst/>
-                        </a:rPr>
-                        <a:t>información.</a:t>
-                      </a:r>
-                      <a:endParaRPr lang="es-AR" sz="1050" dirty="0">
-                        <a:effectLst/>
-                      </a:endParaRPr>
-                    </a:p>
-                    <a:p>
-                      <a:pPr marL="342900" marR="537210" lvl="0" indent="-342900">
-                        <a:lnSpc>
-                          <a:spcPts val="1400"/>
-                        </a:lnSpc>
-                        <a:spcBef>
-                          <a:spcPts val="50"/>
-                        </a:spcBef>
-                        <a:spcAft>
-                          <a:spcPts val="0"/>
-                        </a:spcAft>
-                        <a:buSzPts val="1100"/>
-                        <a:buFont typeface="Calibri" panose="020F0502020204030204" pitchFamily="34" charset="0"/>
-                        <a:buAutoNum type="arabicPeriod" startAt="4"/>
-                        <a:tabLst>
-                          <a:tab pos="518795" algn="l"/>
-                          <a:tab pos="519430" algn="l"/>
-                        </a:tabLst>
-                      </a:pPr>
-                      <a:r>
-                        <a:rPr lang="es-ES" sz="1050" dirty="0">
-                          <a:effectLst/>
-                        </a:rPr>
-                        <a:t>Notifica al usuario el estado de la operación (exitosa o</a:t>
-                      </a:r>
-                      <a:r>
-                        <a:rPr lang="es-ES" sz="1050" spc="-20" dirty="0">
-                          <a:effectLst/>
-                        </a:rPr>
-                        <a:t> </a:t>
-                      </a:r>
-                      <a:r>
-                        <a:rPr lang="es-ES" sz="1050" dirty="0">
-                          <a:effectLst/>
-                        </a:rPr>
-                        <a:t>fallida).</a:t>
-                      </a:r>
-                      <a:endParaRPr lang="es-AR" sz="1050" dirty="0">
-                        <a:effectLst/>
-                        <a:latin typeface="Calibri" panose="020F0502020204030204" pitchFamily="34" charset="0"/>
-                        <a:ea typeface="Calibri" panose="020F0502020204030204" pitchFamily="34" charset="0"/>
-                        <a:cs typeface="Calibri" panose="020F0502020204030204" pitchFamily="34" charset="0"/>
-                      </a:endParaRPr>
-                    </a:p>
-                  </a:txBody>
-                  <a:tcPr marL="0" marR="0" marT="0" marB="0"/>
-                </a:tc>
-                <a:extLst>
-                  <a:ext uri="{0D108BD9-81ED-4DB2-BD59-A6C34878D82A}">
-                    <a16:rowId xmlns:a16="http://schemas.microsoft.com/office/drawing/2014/main" val="899692863"/>
-                  </a:ext>
-                </a:extLst>
-              </a:tr>
-              <a:tr h="1011651">
-                <a:tc gridSpan="3">
-                  <a:txBody>
-                    <a:bodyPr/>
-                    <a:lstStyle/>
-                    <a:p>
-                      <a:pPr marL="67945">
-                        <a:spcBef>
-                          <a:spcPts val="220"/>
-                        </a:spcBef>
-                        <a:spcAft>
-                          <a:spcPts val="0"/>
-                        </a:spcAft>
-                      </a:pPr>
-                      <a:r>
-                        <a:rPr lang="es-ES" sz="1050" dirty="0">
-                          <a:effectLst/>
-                        </a:rPr>
-                        <a:t>Situaciones excepcionales</a:t>
-                      </a:r>
-                      <a:endParaRPr lang="es-AR" sz="1050" dirty="0">
-                        <a:effectLst/>
-                      </a:endParaRPr>
-                    </a:p>
-                    <a:p>
-                      <a:pPr marL="342900" lvl="0" indent="-342900">
-                        <a:spcBef>
-                          <a:spcPts val="220"/>
-                        </a:spcBef>
-                        <a:spcAft>
-                          <a:spcPts val="0"/>
-                        </a:spcAft>
-                        <a:buSzPts val="1100"/>
-                        <a:buFont typeface="Arial" panose="020B0604020202020204" pitchFamily="34" charset="0"/>
-                        <a:buChar char="•"/>
-                        <a:tabLst>
-                          <a:tab pos="296545" algn="l"/>
-                          <a:tab pos="297180" algn="l"/>
-                        </a:tabLst>
-                      </a:pPr>
-                      <a:r>
-                        <a:rPr lang="es-ES" sz="1050" dirty="0">
-                          <a:effectLst/>
-                        </a:rPr>
-                        <a:t>No se puede cargar el formulario de Ingresar nuevo</a:t>
-                      </a:r>
-                      <a:r>
-                        <a:rPr lang="es-ES" sz="1050" spc="-55" dirty="0">
-                          <a:effectLst/>
-                        </a:rPr>
-                        <a:t> </a:t>
-                      </a:r>
-                      <a:r>
-                        <a:rPr lang="es-ES" sz="1050" dirty="0">
-                          <a:effectLst/>
-                        </a:rPr>
-                        <a:t>artículo.</a:t>
-                      </a:r>
-                      <a:endParaRPr lang="es-AR" sz="1050" dirty="0">
-                        <a:effectLst/>
-                      </a:endParaRPr>
-                    </a:p>
-                    <a:p>
-                      <a:pPr marL="342900" lvl="0" indent="-342900">
-                        <a:spcBef>
-                          <a:spcPts val="110"/>
-                        </a:spcBef>
-                        <a:spcAft>
-                          <a:spcPts val="0"/>
-                        </a:spcAft>
-                        <a:buSzPts val="1100"/>
-                        <a:buFont typeface="Arial" panose="020B0604020202020204" pitchFamily="34" charset="0"/>
-                        <a:buChar char="•"/>
-                        <a:tabLst>
-                          <a:tab pos="296545" algn="l"/>
-                          <a:tab pos="297180" algn="l"/>
-                        </a:tabLst>
-                      </a:pPr>
-                      <a:r>
-                        <a:rPr lang="es-ES" sz="1050" dirty="0">
-                          <a:effectLst/>
-                        </a:rPr>
-                        <a:t>No se puede conectar a la base de</a:t>
-                      </a:r>
-                      <a:r>
-                        <a:rPr lang="es-ES" sz="1050" spc="-25" dirty="0">
-                          <a:effectLst/>
-                        </a:rPr>
-                        <a:t> </a:t>
-                      </a:r>
-                      <a:r>
-                        <a:rPr lang="es-ES" sz="1050" dirty="0">
-                          <a:effectLst/>
-                        </a:rPr>
-                        <a:t>datos.</a:t>
-                      </a:r>
-                      <a:endParaRPr lang="es-AR" sz="1050" dirty="0">
-                        <a:effectLst/>
-                      </a:endParaRPr>
-                    </a:p>
-                    <a:p>
-                      <a:pPr marL="342900" lvl="0" indent="-342900">
-                        <a:spcBef>
-                          <a:spcPts val="110"/>
-                        </a:spcBef>
-                        <a:spcAft>
-                          <a:spcPts val="0"/>
-                        </a:spcAft>
-                        <a:buSzPts val="1100"/>
-                        <a:buFont typeface="Arial" panose="020B0604020202020204" pitchFamily="34" charset="0"/>
-                        <a:buChar char="•"/>
-                        <a:tabLst>
-                          <a:tab pos="296545" algn="l"/>
-                          <a:tab pos="297180" algn="l"/>
-                        </a:tabLst>
-                      </a:pPr>
-                      <a:r>
-                        <a:rPr lang="es-ES" sz="1050" dirty="0">
-                          <a:effectLst/>
-                        </a:rPr>
-                        <a:t>El Usuario no ingresó los campos requeridos.</a:t>
-                      </a:r>
-                      <a:endParaRPr lang="es-AR" sz="1050" dirty="0">
-                        <a:effectLst/>
-                      </a:endParaRPr>
-                    </a:p>
-                    <a:p>
-                      <a:pPr marL="342900" lvl="0" indent="-342900">
-                        <a:spcBef>
-                          <a:spcPts val="105"/>
-                        </a:spcBef>
-                        <a:spcAft>
-                          <a:spcPts val="0"/>
-                        </a:spcAft>
-                        <a:buSzPts val="1100"/>
-                        <a:buFont typeface="Arial" panose="020B0604020202020204" pitchFamily="34" charset="0"/>
-                        <a:buChar char="•"/>
-                        <a:tabLst>
-                          <a:tab pos="296545" algn="l"/>
-                          <a:tab pos="297180" algn="l"/>
-                        </a:tabLst>
-                      </a:pPr>
-                      <a:r>
-                        <a:rPr lang="es-ES" sz="1050" dirty="0">
-                          <a:effectLst/>
-                        </a:rPr>
-                        <a:t>Los datos ingresados son</a:t>
-                      </a:r>
-                      <a:r>
-                        <a:rPr lang="es-ES" sz="1050" spc="-25" dirty="0">
-                          <a:effectLst/>
-                        </a:rPr>
-                        <a:t> </a:t>
-                      </a:r>
-                      <a:r>
-                        <a:rPr lang="es-ES" sz="1050" dirty="0">
-                          <a:effectLst/>
-                        </a:rPr>
-                        <a:t>incorrectos.</a:t>
-                      </a:r>
-                      <a:endParaRPr lang="es-AR" sz="1050" dirty="0">
-                        <a:effectLst/>
-                      </a:endParaRPr>
-                    </a:p>
-                    <a:p>
-                      <a:pPr marL="342900" lvl="0" indent="-342900">
-                        <a:spcBef>
-                          <a:spcPts val="100"/>
-                        </a:spcBef>
-                        <a:spcAft>
-                          <a:spcPts val="0"/>
-                        </a:spcAft>
-                        <a:buSzPts val="1100"/>
-                        <a:buFont typeface="Arial" panose="020B0604020202020204" pitchFamily="34" charset="0"/>
-                        <a:buChar char="•"/>
-                        <a:tabLst>
-                          <a:tab pos="296545" algn="l"/>
-                          <a:tab pos="297180" algn="l"/>
-                        </a:tabLst>
-                      </a:pPr>
-                      <a:r>
-                        <a:rPr lang="es-ES" sz="1050" dirty="0">
-                          <a:effectLst/>
-                        </a:rPr>
-                        <a:t>El artículo ya</a:t>
-                      </a:r>
-                      <a:r>
-                        <a:rPr lang="es-ES" sz="1050" spc="-10" dirty="0">
-                          <a:effectLst/>
-                        </a:rPr>
-                        <a:t> </a:t>
-                      </a:r>
-                      <a:r>
-                        <a:rPr lang="es-ES" sz="1050" dirty="0">
-                          <a:effectLst/>
-                        </a:rPr>
-                        <a:t>existe.</a:t>
-                      </a:r>
-                      <a:endParaRPr lang="es-AR" sz="1050" dirty="0">
-                        <a:effectLst/>
-                        <a:latin typeface="Calibri" panose="020F0502020204030204" pitchFamily="34" charset="0"/>
-                        <a:ea typeface="Arial" panose="020B0604020202020204" pitchFamily="34" charset="0"/>
-                        <a:cs typeface="Calibri" panose="020F0502020204030204" pitchFamily="34" charset="0"/>
-                      </a:endParaRPr>
-                    </a:p>
-                  </a:txBody>
-                  <a:tcPr marL="0" marR="0" marT="0" marB="0"/>
-                </a:tc>
-                <a:tc hMerge="1">
-                  <a:txBody>
-                    <a:bodyPr/>
-                    <a:lstStyle/>
-                    <a:p>
-                      <a:endParaRPr lang="es-AR"/>
-                    </a:p>
-                  </a:txBody>
-                  <a:tcPr/>
-                </a:tc>
-                <a:tc hMerge="1">
-                  <a:txBody>
-                    <a:bodyPr/>
-                    <a:lstStyle/>
-                    <a:p>
-                      <a:endParaRPr lang="es-AR"/>
-                    </a:p>
-                  </a:txBody>
-                  <a:tcPr/>
-                </a:tc>
-                <a:extLst>
-                  <a:ext uri="{0D108BD9-81ED-4DB2-BD59-A6C34878D82A}">
-                    <a16:rowId xmlns:a16="http://schemas.microsoft.com/office/drawing/2014/main" val="4158196707"/>
-                  </a:ext>
-                </a:extLst>
-              </a:tr>
-            </a:tbl>
-          </a:graphicData>
-        </a:graphic>
-      </p:graphicFrame>
+      <p:sp>
+        <p:nvSpPr>
+          <p:cNvPr id="4" name="CuadroTexto 3"/>
+          <p:cNvSpPr txBox="1"/>
+          <p:nvPr/>
+        </p:nvSpPr>
+        <p:spPr>
+          <a:xfrm>
+            <a:off x="979714" y="600891"/>
+            <a:ext cx="7302137" cy="718458"/>
+          </a:xfrm>
+          <a:prstGeom prst="rect">
+            <a:avLst/>
+          </a:prstGeom>
+        </p:spPr>
+        <p:txBody>
+          <a:bodyPr vert="horz" wrap="square" lIns="91440" tIns="45720" rIns="91440" bIns="45720" rtlCol="0" anchor="ctr">
+            <a:noAutofit/>
+          </a:bodyPr>
+          <a:lstStyle/>
+          <a:p>
+            <a:pPr algn="ctr"/>
+            <a:r>
+              <a:rPr lang="es-MX" sz="4400" b="1" dirty="0" smtClean="0">
+                <a:solidFill>
+                  <a:srgbClr val="92D050"/>
+                </a:solidFill>
+              </a:rPr>
+              <a:t>Gestión de usuario</a:t>
+            </a:r>
+            <a:endParaRPr lang="es-419" sz="4400" b="1" dirty="0" smtClean="0">
+              <a:solidFill>
+                <a:srgbClr val="92D050"/>
+              </a:solidFill>
+            </a:endParaRPr>
+          </a:p>
+        </p:txBody>
+      </p:sp>
+      <p:pic>
+        <p:nvPicPr>
+          <p:cNvPr id="5" name="Imagen 4"/>
+          <p:cNvPicPr>
+            <a:picLocks noChangeAspect="1"/>
+          </p:cNvPicPr>
+          <p:nvPr/>
+        </p:nvPicPr>
+        <p:blipFill>
+          <a:blip r:embed="rId2"/>
+          <a:stretch>
+            <a:fillRect/>
+          </a:stretch>
+        </p:blipFill>
+        <p:spPr>
+          <a:xfrm>
+            <a:off x="104503" y="1813488"/>
+            <a:ext cx="9039497" cy="4273803"/>
+          </a:xfrm>
+          <a:prstGeom prst="rect">
+            <a:avLst/>
+          </a:prstGeom>
+        </p:spPr>
+      </p:pic>
     </p:spTree>
     <p:extLst>
       <p:ext uri="{BB962C8B-B14F-4D97-AF65-F5344CB8AC3E}">
-        <p14:creationId xmlns:p14="http://schemas.microsoft.com/office/powerpoint/2010/main" val="3735661310"/>
+        <p14:creationId xmlns:p14="http://schemas.microsoft.com/office/powerpoint/2010/main" val="1791717706"/>
       </p:ext>
     </p:extLst>
   </p:cSld>
@@ -15617,111 +15329,6 @@
           <a:chExt cx="0" cy="0"/>
         </a:xfrm>
       </p:grpSpPr>
-      <p:pic>
-        <p:nvPicPr>
-          <p:cNvPr id="3" name="Imagen 2">
-            <a:extLst>
-              <a:ext uri="{FF2B5EF4-FFF2-40B4-BE49-F238E27FC236}">
-                <a16:creationId xmlns:a16="http://schemas.microsoft.com/office/drawing/2014/main" id="{44309767-735F-48D6-A35D-47B18ACC9E1E}"/>
-              </a:ext>
-            </a:extLst>
-          </p:cNvPr>
-          <p:cNvPicPr>
-            <a:picLocks noChangeAspect="1"/>
-          </p:cNvPicPr>
-          <p:nvPr/>
-        </p:nvPicPr>
-        <p:blipFill>
-          <a:blip r:embed="rId2"/>
-          <a:stretch>
-            <a:fillRect/>
-          </a:stretch>
-        </p:blipFill>
-        <p:spPr>
-          <a:xfrm>
-            <a:off x="302456" y="1793615"/>
-            <a:ext cx="8539089" cy="5064385"/>
-          </a:xfrm>
-          <a:prstGeom prst="rect">
-            <a:avLst/>
-          </a:prstGeom>
-        </p:spPr>
-      </p:pic>
-      <p:sp>
-        <p:nvSpPr>
-          <p:cNvPr id="4" name="CuadroTexto 3"/>
-          <p:cNvSpPr txBox="1"/>
-          <p:nvPr/>
-        </p:nvSpPr>
-        <p:spPr>
-          <a:xfrm>
-            <a:off x="979714" y="600891"/>
-            <a:ext cx="7302137" cy="718458"/>
-          </a:xfrm>
-          <a:prstGeom prst="rect">
-            <a:avLst/>
-          </a:prstGeom>
-        </p:spPr>
-        <p:txBody>
-          <a:bodyPr vert="horz" wrap="square" lIns="91440" tIns="45720" rIns="91440" bIns="45720" rtlCol="0" anchor="ctr">
-            <a:noAutofit/>
-          </a:bodyPr>
-          <a:lstStyle/>
-          <a:p>
-            <a:pPr algn="ctr"/>
-            <a:r>
-              <a:rPr lang="es-MX" sz="4400" b="1" dirty="0" smtClean="0">
-                <a:solidFill>
-                  <a:srgbClr val="92D050"/>
-                </a:solidFill>
-              </a:rPr>
-              <a:t>Consultar producto</a:t>
-            </a:r>
-            <a:endParaRPr lang="es-419" sz="4400" b="1" dirty="0" smtClean="0">
-              <a:solidFill>
-                <a:srgbClr val="92D050"/>
-              </a:solidFill>
-            </a:endParaRPr>
-          </a:p>
-        </p:txBody>
-      </p:sp>
-    </p:spTree>
-    <p:extLst>
-      <p:ext uri="{BB962C8B-B14F-4D97-AF65-F5344CB8AC3E}">
-        <p14:creationId xmlns:p14="http://schemas.microsoft.com/office/powerpoint/2010/main" val="1791717706"/>
-      </p:ext>
-    </p:extLst>
-  </p:cSld>
-  <p:clrMapOvr>
-    <a:masterClrMapping/>
-  </p:clrMapOvr>
-  <p:timing>
-    <p:tnLst>
-      <p:par>
-        <p:cTn id="1" dur="indefinite" restart="never" nodeType="tmRoot"/>
-      </p:par>
-    </p:tnLst>
-  </p:timing>
-</p:sld>
-</file>
-
-<file path=ppt/slides/slide26.xml><?xml version="1.0" encoding="utf-8"?>
-<p:sld xmlns:a="http://schemas.openxmlformats.org/drawingml/2006/main" xmlns:r="http://schemas.openxmlformats.org/officeDocument/2006/relationships" xmlns:p="http://schemas.openxmlformats.org/presentationml/2006/main">
-  <p:cSld>
-    <p:spTree>
-      <p:nvGrpSpPr>
-        <p:cNvPr id="1" name=""/>
-        <p:cNvGrpSpPr/>
-        <p:nvPr/>
-      </p:nvGrpSpPr>
-      <p:grpSpPr>
-        <a:xfrm>
-          <a:off x="0" y="0"/>
-          <a:ext cx="0" cy="0"/>
-          <a:chOff x="0" y="0"/>
-          <a:chExt cx="0" cy="0"/>
-        </a:xfrm>
-      </p:grpSpPr>
       <p:graphicFrame>
         <p:nvGraphicFramePr>
           <p:cNvPr id="2" name="Tabla 1"/>
@@ -15731,7 +15338,7 @@
           <p:nvPr>
             <p:extLst>
               <p:ext uri="{D42A27DB-BD31-4B8C-83A1-F6EECF244321}">
-                <p14:modId xmlns:p14="http://schemas.microsoft.com/office/powerpoint/2010/main" val="1125671288"/>
+                <p14:modId xmlns:p14="http://schemas.microsoft.com/office/powerpoint/2010/main" val="3494087698"/>
               </p:ext>
             </p:extLst>
           </p:nvPr>
@@ -15814,12 +15421,12 @@
                         </a:spcAft>
                       </a:pPr>
                       <a:r>
-                        <a:rPr lang="es-ES" sz="1050">
-                          <a:effectLst/>
-                        </a:rPr>
-                        <a:t>Consultar producto</a:t>
-                      </a:r>
-                      <a:endParaRPr lang="es-AR" sz="1050">
+                        <a:rPr lang="es-ES" sz="1050" dirty="0" smtClean="0">
+                          <a:effectLst/>
+                        </a:rPr>
+                        <a:t>Gestionar usuarios</a:t>
+                      </a:r>
+                      <a:endParaRPr lang="es-AR" sz="1050" dirty="0">
                         <a:effectLst/>
                         <a:latin typeface="Calibri" panose="020F0502020204030204" pitchFamily="34" charset="0"/>
                         <a:ea typeface="Calibri" panose="020F0502020204030204" pitchFamily="34" charset="0"/>
@@ -15908,12 +15515,30 @@
                         </a:spcAft>
                       </a:pPr>
                       <a:r>
-                        <a:rPr lang="es-ES" sz="1050">
-                          <a:effectLst/>
-                        </a:rPr>
-                        <a:t>ELABORADO POR: Richard Barboza</a:t>
-                      </a:r>
-                      <a:endParaRPr lang="es-AR" sz="1050">
+                        <a:rPr lang="es-ES" sz="1050" dirty="0">
+                          <a:effectLst/>
+                        </a:rPr>
+                        <a:t>ELABORADO POR: Richard </a:t>
+                      </a:r>
+                      <a:r>
+                        <a:rPr lang="es-ES" sz="1050" dirty="0" smtClean="0">
+                          <a:effectLst/>
+                        </a:rPr>
+                        <a:t>Barboza-</a:t>
+                      </a:r>
+                      <a:r>
+                        <a:rPr lang="es-ES" sz="1050" dirty="0" err="1" smtClean="0">
+                          <a:effectLst/>
+                        </a:rPr>
+                        <a:t>Nicolas</a:t>
+                      </a:r>
+                      <a:r>
+                        <a:rPr lang="es-ES" sz="1050" dirty="0" smtClean="0">
+                          <a:effectLst/>
+                        </a:rPr>
+                        <a:t> Ardila</a:t>
+                      </a:r>
+                      <a:endParaRPr lang="es-AR" sz="1050" dirty="0">
                         <a:effectLst/>
                         <a:latin typeface="Calibri" panose="020F0502020204030204" pitchFamily="34" charset="0"/>
                         <a:ea typeface="Calibri" panose="020F0502020204030204" pitchFamily="34" charset="0"/>
@@ -16058,12 +15683,30 @@
                         </a:spcAft>
                       </a:pPr>
                       <a:r>
-                        <a:rPr lang="es-ES" sz="1050">
-                          <a:effectLst/>
-                        </a:rPr>
-                        <a:t>Consultar la información de un producto registrado en el sistema.</a:t>
-                      </a:r>
-                      <a:endParaRPr lang="es-AR" sz="1050">
+                        <a:rPr lang="es-ES" sz="1050" dirty="0" smtClean="0">
+                          <a:effectLst/>
+                        </a:rPr>
+                        <a:t>Modificar</a:t>
+                      </a:r>
+                      <a:r>
+                        <a:rPr lang="es-ES" sz="1050" baseline="0" dirty="0" smtClean="0">
+                          <a:effectLst/>
+                        </a:rPr>
+                        <a:t> las opciones de los usuarios </a:t>
+                      </a:r>
+                      <a:r>
+                        <a:rPr lang="es-ES" sz="1050" dirty="0" smtClean="0">
+                          <a:effectLst/>
+                        </a:rPr>
+                        <a:t>en </a:t>
+                      </a:r>
+                      <a:r>
+                        <a:rPr lang="es-ES" sz="1050" dirty="0">
+                          <a:effectLst/>
+                        </a:rPr>
+                        <a:t>el sistema.</a:t>
+                      </a:r>
+                      <a:endParaRPr lang="es-AR" sz="1050" dirty="0">
                         <a:effectLst/>
                         <a:latin typeface="Calibri" panose="020F0502020204030204" pitchFamily="34" charset="0"/>
                         <a:ea typeface="Calibri" panose="020F0502020204030204" pitchFamily="34" charset="0"/>
@@ -16140,24 +15783,24 @@
                         </a:tabLst>
                       </a:pPr>
                       <a:r>
-                        <a:rPr lang="es-ES" sz="1050">
+                        <a:rPr lang="es-ES" sz="1050" dirty="0">
                           <a:effectLst/>
                         </a:rPr>
                         <a:t>El Administrador debe estar registrado en el</a:t>
                       </a:r>
                       <a:r>
-                        <a:rPr lang="es-ES" sz="1050" spc="-25">
+                        <a:rPr lang="es-ES" sz="1050" spc="-25" dirty="0">
                           <a:effectLst/>
                         </a:rPr>
                         <a:t> </a:t>
                       </a:r>
                       <a:r>
-                        <a:rPr lang="es-ES" sz="1050">
+                        <a:rPr lang="es-ES" sz="1050" dirty="0">
                           <a:effectLst/>
                         </a:rPr>
                         <a:t>sistema.</a:t>
                       </a:r>
-                      <a:endParaRPr lang="es-AR" sz="1050">
+                      <a:endParaRPr lang="es-AR" sz="1050" dirty="0">
                         <a:effectLst/>
                       </a:endParaRPr>
                     </a:p>
@@ -16178,24 +15821,24 @@
                         </a:tabLst>
                       </a:pPr>
                       <a:r>
-                        <a:rPr lang="es-ES" sz="1050">
+                        <a:rPr lang="es-ES" sz="1050" dirty="0">
                           <a:effectLst/>
                         </a:rPr>
                         <a:t>El Administrador debe haber iniciado sesión en el</a:t>
                       </a:r>
                       <a:r>
-                        <a:rPr lang="es-ES" sz="1050" spc="-105">
+                        <a:rPr lang="es-ES" sz="1050" spc="-105" dirty="0">
                           <a:effectLst/>
                         </a:rPr>
                         <a:t> </a:t>
                       </a:r>
                       <a:r>
-                        <a:rPr lang="es-ES" sz="1050">
+                        <a:rPr lang="es-ES" sz="1050" dirty="0">
                           <a:effectLst/>
                         </a:rPr>
                         <a:t>sistema.</a:t>
                       </a:r>
-                      <a:endParaRPr lang="es-AR" sz="1050">
+                      <a:endParaRPr lang="es-AR" sz="1050" dirty="0">
                         <a:effectLst/>
                       </a:endParaRPr>
                     </a:p>
@@ -16219,24 +15862,36 @@
                         </a:tabLst>
                       </a:pPr>
                       <a:r>
-                        <a:rPr lang="es-ES" sz="1050">
-                          <a:effectLst/>
-                        </a:rPr>
-                        <a:t>El sistema proveerá al usuario un formulario donde consultará la información de un</a:t>
-                      </a:r>
-                      <a:r>
-                        <a:rPr lang="es-ES" sz="1050" spc="-15">
-                          <a:effectLst/>
-                        </a:rPr>
-                        <a:t> </a:t>
-                      </a:r>
-                      <a:r>
-                        <a:rPr lang="es-ES" sz="1050">
-                          <a:effectLst/>
-                        </a:rPr>
-                        <a:t>producto.</a:t>
-                      </a:r>
-                      <a:endParaRPr lang="es-AR" sz="1050">
+                        <a:rPr lang="es-ES" sz="1050" dirty="0">
+                          <a:effectLst/>
+                        </a:rPr>
+                        <a:t>El sistema proveerá al usuario </a:t>
+                      </a:r>
+                      <a:r>
+                        <a:rPr lang="es-ES" sz="1050" dirty="0" smtClean="0">
+                          <a:effectLst/>
+                        </a:rPr>
+                        <a:t>las opciones de actualizar</a:t>
+                      </a:r>
+                      <a:r>
+                        <a:rPr lang="es-ES" sz="1050" baseline="0" dirty="0" smtClean="0">
+                          <a:effectLst/>
+                        </a:rPr>
+                        <a:t> ,eliminar, </a:t>
+                      </a:r>
+                      <a:r>
+                        <a:rPr lang="es-ES" sz="1050" baseline="0" dirty="0" err="1" smtClean="0">
+                          <a:effectLst/>
+                        </a:rPr>
+                        <a:t>bloquear,etc</a:t>
+                      </a:r>
+                      <a:r>
+                        <a:rPr lang="es-ES" sz="1050" baseline="0" dirty="0" smtClean="0">
+                          <a:effectLst/>
+                        </a:rPr>
+                        <a:t>.</a:t>
+                      </a:r>
+                      <a:endParaRPr lang="es-AR" sz="1050" dirty="0">
                         <a:effectLst/>
                         <a:latin typeface="Calibri" panose="020F0502020204030204" pitchFamily="34" charset="0"/>
                         <a:ea typeface="Arial" panose="020B0604020202020204" pitchFamily="34" charset="0"/>
@@ -16309,12 +15964,24 @@
                         </a:spcAft>
                       </a:pPr>
                       <a:r>
-                        <a:rPr lang="es-ES" sz="1050">
-                          <a:effectLst/>
-                        </a:rPr>
-                        <a:t>El usuario podrá consultar la información un producto registrado en el sistema.</a:t>
-                      </a:r>
-                      <a:endParaRPr lang="es-AR" sz="1050">
+                        <a:rPr lang="es-ES" sz="1050" dirty="0">
+                          <a:effectLst/>
+                        </a:rPr>
+                        <a:t>El usuario podrá consultar la información </a:t>
+                      </a:r>
+                      <a:r>
+                        <a:rPr lang="es-ES" sz="1050" dirty="0" smtClean="0">
+                          <a:effectLst/>
+                        </a:rPr>
+                        <a:t>de los usuarios registrado </a:t>
+                      </a:r>
+                      <a:r>
+                        <a:rPr lang="es-ES" sz="1050" dirty="0">
+                          <a:effectLst/>
+                        </a:rPr>
+                        <a:t>en el sistema.</a:t>
+                      </a:r>
+                      <a:endParaRPr lang="es-AR" sz="1050" dirty="0">
                         <a:effectLst/>
                         <a:latin typeface="Calibri" panose="020F0502020204030204" pitchFamily="34" charset="0"/>
                         <a:ea typeface="Calibri" panose="020F0502020204030204" pitchFamily="34" charset="0"/>
@@ -16762,7 +16429,7 @@
 </p:sld>
 </file>
 
-<file path=ppt/slides/slide27.xml><?xml version="1.0" encoding="utf-8"?>
+<file path=ppt/slides/slide26.xml><?xml version="1.0" encoding="utf-8"?>
 <p:sld xmlns:a="http://schemas.openxmlformats.org/drawingml/2006/main" xmlns:r="http://schemas.openxmlformats.org/officeDocument/2006/relationships" xmlns:p="http://schemas.openxmlformats.org/presentationml/2006/main">
   <p:cSld>
     <p:spTree>
@@ -16779,47 +16446,6 @@
           <a:chExt cx="0" cy="0"/>
         </a:xfrm>
       </p:grpSpPr>
-      <p:pic>
-        <p:nvPicPr>
-          <p:cNvPr id="2050" name="Picture 2" descr="https://lh6.googleusercontent.com/m-fHNJHLLvtKKZfvmT0UmO1f4AnWX3pRPgYyYCtoF0avMyCEwu6-AqOXKP9ao2ucwVUeQJjdbfbThUDyRuYdtlXKGSHP8s3Dsg6GHTQ3ZjNNeNqpvPSURXqGFMOveAEcHhIQo2U"/>
-          <p:cNvPicPr>
-            <a:picLocks noChangeAspect="1" noChangeArrowheads="1"/>
-          </p:cNvPicPr>
-          <p:nvPr/>
-        </p:nvPicPr>
-        <p:blipFill>
-          <a:blip r:embed="rId2">
-            <a:extLst>
-              <a:ext uri="{28A0092B-C50C-407E-A947-70E740481C1C}">
-                <a14:useLocalDpi xmlns:a14="http://schemas.microsoft.com/office/drawing/2010/main" val="0"/>
-              </a:ext>
-            </a:extLst>
-          </a:blip>
-          <a:srcRect/>
-          <a:stretch>
-            <a:fillRect/>
-          </a:stretch>
-        </p:blipFill>
-        <p:spPr bwMode="auto">
-          <a:xfrm>
-            <a:off x="222069" y="1977934"/>
-            <a:ext cx="8820150" cy="4686300"/>
-          </a:xfrm>
-          <a:prstGeom prst="rect">
-            <a:avLst/>
-          </a:prstGeom>
-          <a:noFill/>
-          <a:extLst>
-            <a:ext uri="{909E8E84-426E-40DD-AFC4-6F175D3DCCD1}">
-              <a14:hiddenFill xmlns:a14="http://schemas.microsoft.com/office/drawing/2010/main">
-                <a:solidFill>
-                  <a:srgbClr val="FFFFFF"/>
-                </a:solidFill>
-              </a14:hiddenFill>
-            </a:ext>
-          </a:extLst>
-        </p:spPr>
-      </p:pic>
       <p:sp>
         <p:nvSpPr>
           <p:cNvPr id="3" name="CuadroTexto 2"/>
@@ -16848,8 +16474,13 @@
                   <a:srgbClr val="92D050"/>
                 </a:solidFill>
               </a:rPr>
-              <a:t>Actualizar productos</a:t>
+              <a:t>REPORTES</a:t>
             </a:r>
+            <a:endParaRPr lang="es-MX" sz="4000" b="1" dirty="0" smtClean="0">
+              <a:solidFill>
+                <a:srgbClr val="92D050"/>
+              </a:solidFill>
+            </a:endParaRPr>
           </a:p>
           <a:p>
             <a:pPr algn="ctr"/>
@@ -16861,6 +16492,30 @@
           </a:p>
         </p:txBody>
       </p:sp>
+      <p:pic>
+        <p:nvPicPr>
+          <p:cNvPr id="2" name="Imagen 1"/>
+          <p:cNvPicPr>
+            <a:picLocks noChangeAspect="1"/>
+          </p:cNvPicPr>
+          <p:nvPr/>
+        </p:nvPicPr>
+        <p:blipFill>
+          <a:blip r:embed="rId2"/>
+          <a:stretch>
+            <a:fillRect/>
+          </a:stretch>
+        </p:blipFill>
+        <p:spPr>
+          <a:xfrm>
+            <a:off x="55276" y="1899829"/>
+            <a:ext cx="9088724" cy="4827542"/>
+          </a:xfrm>
+          <a:prstGeom prst="rect">
+            <a:avLst/>
+          </a:prstGeom>
+        </p:spPr>
+      </p:pic>
     </p:spTree>
     <p:extLst>
       <p:ext uri="{BB962C8B-B14F-4D97-AF65-F5344CB8AC3E}">
@@ -16881,7 +16536,7 @@
 </p:sld>
 </file>
 
-<file path=ppt/slides/slide28.xml><?xml version="1.0" encoding="utf-8"?>
+<file path=ppt/slides/slide27.xml><?xml version="1.0" encoding="utf-8"?>
 <p:sld xmlns:a="http://schemas.openxmlformats.org/drawingml/2006/main" xmlns:r="http://schemas.openxmlformats.org/officeDocument/2006/relationships" xmlns:p="http://schemas.openxmlformats.org/presentationml/2006/main">
   <p:cSld>
     <p:spTree>
@@ -16907,7 +16562,7 @@
           <p:nvPr>
             <p:extLst>
               <p:ext uri="{D42A27DB-BD31-4B8C-83A1-F6EECF244321}">
-                <p14:modId xmlns:p14="http://schemas.microsoft.com/office/powerpoint/2010/main" val="665613767"/>
+                <p14:modId xmlns:p14="http://schemas.microsoft.com/office/powerpoint/2010/main" val="243576899"/>
               </p:ext>
             </p:extLst>
           </p:nvPr>
@@ -17001,12 +16656,12 @@
                         </a:spcAft>
                       </a:pPr>
                       <a:r>
-                        <a:rPr lang="es-ES" sz="1050">
-                          <a:effectLst/>
-                        </a:rPr>
-                        <a:t>Actualizar producto</a:t>
-                      </a:r>
-                      <a:endParaRPr lang="es-AR" sz="1050">
+                        <a:rPr lang="es-ES" sz="1050" dirty="0" smtClean="0">
+                          <a:effectLst/>
+                        </a:rPr>
+                        <a:t>Reportes</a:t>
+                      </a:r>
+                      <a:endParaRPr lang="es-AR" sz="1050" dirty="0">
                         <a:effectLst/>
                         <a:latin typeface="Calibri" panose="020F0502020204030204" pitchFamily="34" charset="0"/>
                         <a:ea typeface="Calibri" panose="020F0502020204030204" pitchFamily="34" charset="0"/>
@@ -17095,12 +16750,12 @@
                         </a:spcAft>
                       </a:pPr>
                       <a:r>
-                        <a:rPr lang="es-ES" sz="1050">
+                        <a:rPr lang="es-ES" sz="1050" dirty="0">
                           <a:effectLst/>
                         </a:rPr>
                         <a:t>ELABORADO POR: Richard Barboza</a:t>
                       </a:r>
-                      <a:endParaRPr lang="es-AR" sz="1050">
+                      <a:endParaRPr lang="es-AR" sz="1050" dirty="0">
                         <a:effectLst/>
                         <a:latin typeface="Calibri" panose="020F0502020204030204" pitchFamily="34" charset="0"/>
                         <a:ea typeface="Calibri" panose="020F0502020204030204" pitchFamily="34" charset="0"/>
@@ -17170,12 +16825,12 @@
                         </a:spcAft>
                       </a:pPr>
                       <a:r>
-                        <a:rPr lang="es-ES" sz="1050">
+                        <a:rPr lang="es-ES" sz="1050" dirty="0">
                           <a:effectLst/>
                         </a:rPr>
                         <a:t>Administrador.</a:t>
                       </a:r>
-                      <a:endParaRPr lang="es-AR" sz="1050">
+                      <a:endParaRPr lang="es-AR" sz="1050" dirty="0">
                         <a:effectLst/>
                         <a:latin typeface="Calibri" panose="020F0502020204030204" pitchFamily="34" charset="0"/>
                         <a:ea typeface="Calibri" panose="020F0502020204030204" pitchFamily="34" charset="0"/>
@@ -17247,12 +16902,24 @@
                         <a:buChar char=""/>
                       </a:pPr>
                       <a:r>
-                        <a:rPr lang="es-ES" sz="1050">
-                          <a:effectLst/>
-                        </a:rPr>
-                        <a:t>Actualizar la información de un Producto.</a:t>
-                      </a:r>
-                      <a:endParaRPr lang="es-AR" sz="1050">
+                        <a:rPr lang="es-ES" sz="1050" dirty="0" smtClean="0">
+                          <a:effectLst/>
+                        </a:rPr>
+                        <a:t>Gestionar los</a:t>
+                      </a:r>
+                      <a:r>
+                        <a:rPr lang="es-ES" sz="1050" baseline="0" dirty="0" smtClean="0">
+                          <a:effectLst/>
+                        </a:rPr>
+                        <a:t> reportes de los</a:t>
+                      </a:r>
+                      <a:r>
+                        <a:rPr lang="es-ES" sz="1050" dirty="0" smtClean="0">
+                          <a:effectLst/>
+                        </a:rPr>
+                        <a:t> Productos.</a:t>
+                      </a:r>
+                      <a:endParaRPr lang="es-AR" sz="1050" dirty="0">
                         <a:effectLst/>
                         <a:latin typeface="Calibri" panose="020F0502020204030204" pitchFamily="34" charset="0"/>
                         <a:ea typeface="Calibri" panose="020F0502020204030204" pitchFamily="34" charset="0"/>
@@ -17328,24 +16995,24 @@
                         </a:tabLst>
                       </a:pPr>
                       <a:r>
-                        <a:rPr lang="es-ES" sz="1050">
+                        <a:rPr lang="es-ES" sz="1050" dirty="0">
                           <a:effectLst/>
                         </a:rPr>
                         <a:t>El Administrador debe estar registrado en el</a:t>
                       </a:r>
                       <a:r>
-                        <a:rPr lang="es-ES" sz="1050" spc="-25">
+                        <a:rPr lang="es-ES" sz="1050" spc="-25" dirty="0">
                           <a:effectLst/>
                         </a:rPr>
                         <a:t> </a:t>
                       </a:r>
                       <a:r>
-                        <a:rPr lang="es-ES" sz="1050">
+                        <a:rPr lang="es-ES" sz="1050" dirty="0">
                           <a:effectLst/>
                         </a:rPr>
                         <a:t>sistema.</a:t>
                       </a:r>
-                      <a:endParaRPr lang="es-AR" sz="1050">
+                      <a:endParaRPr lang="es-AR" sz="1050" dirty="0">
                         <a:effectLst/>
                       </a:endParaRPr>
                     </a:p>
@@ -17365,24 +17032,24 @@
                         </a:tabLst>
                       </a:pPr>
                       <a:r>
-                        <a:rPr lang="es-ES" sz="1050">
+                        <a:rPr lang="es-ES" sz="1050" dirty="0">
                           <a:effectLst/>
                         </a:rPr>
                         <a:t>El Administrador debe haber iniciado sesión en el</a:t>
                       </a:r>
                       <a:r>
-                        <a:rPr lang="es-ES" sz="1050" spc="-70">
+                        <a:rPr lang="es-ES" sz="1050" spc="-70" dirty="0">
                           <a:effectLst/>
                         </a:rPr>
                         <a:t> </a:t>
                       </a:r>
                       <a:r>
-                        <a:rPr lang="es-ES" sz="1050">
+                        <a:rPr lang="es-ES" sz="1050" dirty="0">
                           <a:effectLst/>
                         </a:rPr>
                         <a:t>sistema.</a:t>
                       </a:r>
-                      <a:endParaRPr lang="es-AR" sz="1050">
+                      <a:endParaRPr lang="es-AR" sz="1050" dirty="0">
                         <a:effectLst/>
                       </a:endParaRPr>
                     </a:p>
@@ -17405,12 +17072,12 @@
                         </a:tabLst>
                       </a:pPr>
                       <a:r>
-                        <a:rPr lang="es-ES" sz="1050">
+                        <a:rPr lang="es-ES" sz="1050" dirty="0">
                           <a:effectLst/>
                         </a:rPr>
                         <a:t>El sistema proveerá al usuario un formulario donde actualizará la información de un producto registrado en el sistema.</a:t>
                       </a:r>
-                      <a:endParaRPr lang="es-AR" sz="1050">
+                      <a:endParaRPr lang="es-AR" sz="1050" dirty="0">
                         <a:effectLst/>
                         <a:latin typeface="Calibri" panose="020F0502020204030204" pitchFamily="34" charset="0"/>
                         <a:ea typeface="Calibri" panose="020F0502020204030204" pitchFamily="34" charset="0"/>
@@ -17482,24 +17149,36 @@
                         <a:buChar char=""/>
                       </a:pPr>
                       <a:r>
-                        <a:rPr lang="es-ES" sz="1050">
-                          <a:effectLst/>
-                        </a:rPr>
-                        <a:t>El usuario podrá actualizar la información de un producto registrado en el</a:t>
-                      </a:r>
-                      <a:r>
-                        <a:rPr lang="es-ES" sz="1050" spc="-35">
+                        <a:rPr lang="es-ES" sz="1050" dirty="0">
+                          <a:effectLst/>
+                        </a:rPr>
+                        <a:t>El usuario podrá </a:t>
+                      </a:r>
+                      <a:r>
+                        <a:rPr lang="es-ES" sz="1050" dirty="0" smtClean="0">
+                          <a:effectLst/>
+                        </a:rPr>
+                        <a:t>actualizar o eliminar </a:t>
+                      </a:r>
+                      <a:r>
+                        <a:rPr lang="es-ES" sz="1050" dirty="0">
+                          <a:effectLst/>
+                        </a:rPr>
+                        <a:t>la información de un producto registrado en el</a:t>
+                      </a:r>
+                      <a:r>
+                        <a:rPr lang="es-ES" sz="1050" spc="-35" dirty="0">
                           <a:effectLst/>
                         </a:rPr>
                         <a:t> </a:t>
                       </a:r>
                       <a:r>
-                        <a:rPr lang="es-ES" sz="1050">
+                        <a:rPr lang="es-ES" sz="1050" dirty="0">
                           <a:effectLst/>
                         </a:rPr>
                         <a:t>sistema.</a:t>
                       </a:r>
-                      <a:endParaRPr lang="es-AR" sz="1050">
+                      <a:endParaRPr lang="es-AR" sz="1050" dirty="0">
                         <a:effectLst/>
                         <a:latin typeface="Calibri" panose="020F0502020204030204" pitchFamily="34" charset="0"/>
                         <a:ea typeface="Calibri" panose="020F0502020204030204" pitchFamily="34" charset="0"/>
@@ -17540,12 +17219,12 @@
                         </a:spcAft>
                       </a:pPr>
                       <a:r>
-                        <a:rPr lang="es-ES" sz="1050">
+                        <a:rPr lang="es-ES" sz="1050" dirty="0">
                           <a:effectLst/>
                         </a:rPr>
                         <a:t>FLUJO DE EVENTOS</a:t>
                       </a:r>
-                      <a:endParaRPr lang="es-AR" sz="1050">
+                      <a:endParaRPr lang="es-AR" sz="1050" dirty="0">
                         <a:effectLst/>
                         <a:latin typeface="Calibri" panose="020F0502020204030204" pitchFamily="34" charset="0"/>
                         <a:ea typeface="Calibri" panose="020F0502020204030204" pitchFamily="34" charset="0"/>
@@ -18245,7 +17924,7 @@
 </p:sld>
 </file>
 
-<file path=ppt/slides/slide29.xml><?xml version="1.0" encoding="utf-8"?>
+<file path=ppt/slides/slide28.xml><?xml version="1.0" encoding="utf-8"?>
 <p:sld xmlns:a="http://schemas.openxmlformats.org/drawingml/2006/main" xmlns:r="http://schemas.openxmlformats.org/officeDocument/2006/relationships" xmlns:p="http://schemas.openxmlformats.org/presentationml/2006/main">
   <p:cSld>
     <p:spTree>

</xml_diff>